<commit_message>
Updated Technical User Guides to include the Check catalog of SummaryAudit table (with tips)
</commit_message>
<xml_diff>
--- a/assets/templates_pptx/UserGuideTemplate.pptx
+++ b/assets/templates_pptx/UserGuideTemplate.pptx
@@ -901,7 +901,7 @@
           <a:p>
             <a:fld id="{044512AF-DD4E-4B73-98EF-EA3A4CA19885}" type="datetimeFigureOut">
               <a:rPr lang="en-US" smtClean="0"/>
-              <a:t>2/14/2026</a:t>
+              <a:t>2/17/2026</a:t>
             </a:fld>
             <a:endParaRPr lang="en-US"/>
           </a:p>
@@ -1187,7 +1187,7 @@
           <a:p>
             <a:fld id="{5BCAD085-E8A6-8845-BD4E-CB4CCA059FC4}" type="datetimeFigureOut">
               <a:rPr lang="en-US" smtClean="0"/>
-              <a:t>2/14/2026</a:t>
+              <a:t>2/17/2026</a:t>
             </a:fld>
             <a:endParaRPr lang="en-US" dirty="0"/>
           </a:p>
@@ -1249,6 +1249,425 @@
 </file>
 
 <file path=ppt/slideLayouts/slideLayout10.xml><?xml version="1.0" encoding="utf-8"?>
+<p:sldLayout xmlns:a="http://schemas.openxmlformats.org/drawingml/2006/main" xmlns:r="http://schemas.openxmlformats.org/officeDocument/2006/relationships" xmlns:p="http://schemas.openxmlformats.org/presentationml/2006/main" type="twoTxTwoObj" preserve="1">
+  <p:cSld name="Comparison">
+    <p:spTree>
+      <p:nvGrpSpPr>
+        <p:cNvPr id="1" name=""/>
+        <p:cNvGrpSpPr/>
+        <p:nvPr/>
+      </p:nvGrpSpPr>
+      <p:grpSpPr>
+        <a:xfrm>
+          <a:off x="0" y="0"/>
+          <a:ext cx="0" cy="0"/>
+          <a:chOff x="0" y="0"/>
+          <a:chExt cx="0" cy="0"/>
+        </a:xfrm>
+      </p:grpSpPr>
+      <p:sp>
+        <p:nvSpPr>
+          <p:cNvPr id="2" name="Title 1"/>
+          <p:cNvSpPr>
+            <a:spLocks noGrp="1"/>
+          </p:cNvSpPr>
+          <p:nvPr>
+            <p:ph type="title"/>
+          </p:nvPr>
+        </p:nvSpPr>
+        <p:spPr/>
+        <p:txBody>
+          <a:bodyPr/>
+          <a:lstStyle>
+            <a:lvl1pPr>
+              <a:defRPr/>
+            </a:lvl1pPr>
+          </a:lstStyle>
+          <a:p>
+            <a:r>
+              <a:rPr lang="en-US"/>
+              <a:t>Click to edit Master title style</a:t>
+            </a:r>
+          </a:p>
+        </p:txBody>
+      </p:sp>
+      <p:sp>
+        <p:nvSpPr>
+          <p:cNvPr id="3" name="Text Placeholder 2"/>
+          <p:cNvSpPr>
+            <a:spLocks noGrp="1"/>
+          </p:cNvSpPr>
+          <p:nvPr>
+            <p:ph type="body" idx="1"/>
+          </p:nvPr>
+        </p:nvSpPr>
+        <p:spPr>
+          <a:xfrm>
+            <a:off x="457200" y="1535113"/>
+            <a:ext cx="4040188" cy="639762"/>
+          </a:xfrm>
+        </p:spPr>
+        <p:txBody>
+          <a:bodyPr anchor="b"/>
+          <a:lstStyle>
+            <a:lvl1pPr marL="0" indent="0">
+              <a:buNone/>
+              <a:defRPr sz="2400" b="1"/>
+            </a:lvl1pPr>
+            <a:lvl2pPr marL="457200" indent="0">
+              <a:buNone/>
+              <a:defRPr sz="2000" b="1"/>
+            </a:lvl2pPr>
+            <a:lvl3pPr marL="914400" indent="0">
+              <a:buNone/>
+              <a:defRPr sz="1800" b="1"/>
+            </a:lvl3pPr>
+            <a:lvl4pPr marL="1371600" indent="0">
+              <a:buNone/>
+              <a:defRPr sz="1600" b="1"/>
+            </a:lvl4pPr>
+            <a:lvl5pPr marL="1828800" indent="0">
+              <a:buNone/>
+              <a:defRPr sz="1600" b="1"/>
+            </a:lvl5pPr>
+            <a:lvl6pPr marL="2286000" indent="0">
+              <a:buNone/>
+              <a:defRPr sz="1600" b="1"/>
+            </a:lvl6pPr>
+            <a:lvl7pPr marL="2743200" indent="0">
+              <a:buNone/>
+              <a:defRPr sz="1600" b="1"/>
+            </a:lvl7pPr>
+            <a:lvl8pPr marL="3200400" indent="0">
+              <a:buNone/>
+              <a:defRPr sz="1600" b="1"/>
+            </a:lvl8pPr>
+            <a:lvl9pPr marL="3657600" indent="0">
+              <a:buNone/>
+              <a:defRPr sz="1600" b="1"/>
+            </a:lvl9pPr>
+          </a:lstStyle>
+          <a:p>
+            <a:pPr lvl="0"/>
+            <a:r>
+              <a:rPr lang="en-US"/>
+              <a:t>Click to edit Master text styles</a:t>
+            </a:r>
+          </a:p>
+        </p:txBody>
+      </p:sp>
+      <p:sp>
+        <p:nvSpPr>
+          <p:cNvPr id="4" name="Content Placeholder 3"/>
+          <p:cNvSpPr>
+            <a:spLocks noGrp="1"/>
+          </p:cNvSpPr>
+          <p:nvPr>
+            <p:ph sz="half" idx="2"/>
+          </p:nvPr>
+        </p:nvSpPr>
+        <p:spPr>
+          <a:xfrm>
+            <a:off x="457200" y="2174875"/>
+            <a:ext cx="4040188" cy="3951288"/>
+          </a:xfrm>
+        </p:spPr>
+        <p:txBody>
+          <a:bodyPr/>
+          <a:lstStyle>
+            <a:lvl1pPr>
+              <a:defRPr sz="2400"/>
+            </a:lvl1pPr>
+            <a:lvl2pPr>
+              <a:defRPr sz="2000"/>
+            </a:lvl2pPr>
+            <a:lvl3pPr>
+              <a:defRPr sz="1800"/>
+            </a:lvl3pPr>
+            <a:lvl4pPr>
+              <a:defRPr sz="1600"/>
+            </a:lvl4pPr>
+            <a:lvl5pPr>
+              <a:defRPr sz="1600"/>
+            </a:lvl5pPr>
+            <a:lvl6pPr>
+              <a:defRPr sz="1600"/>
+            </a:lvl6pPr>
+            <a:lvl7pPr>
+              <a:defRPr sz="1600"/>
+            </a:lvl7pPr>
+            <a:lvl8pPr>
+              <a:defRPr sz="1600"/>
+            </a:lvl8pPr>
+            <a:lvl9pPr>
+              <a:defRPr sz="1600"/>
+            </a:lvl9pPr>
+          </a:lstStyle>
+          <a:p>
+            <a:pPr lvl="0"/>
+            <a:r>
+              <a:rPr lang="en-US"/>
+              <a:t>Click to edit Master text styles</a:t>
+            </a:r>
+          </a:p>
+          <a:p>
+            <a:pPr lvl="1"/>
+            <a:r>
+              <a:rPr lang="en-US"/>
+              <a:t>Second level</a:t>
+            </a:r>
+          </a:p>
+          <a:p>
+            <a:pPr lvl="2"/>
+            <a:r>
+              <a:rPr lang="en-US"/>
+              <a:t>Third level</a:t>
+            </a:r>
+          </a:p>
+          <a:p>
+            <a:pPr lvl="3"/>
+            <a:r>
+              <a:rPr lang="en-US"/>
+              <a:t>Fourth level</a:t>
+            </a:r>
+          </a:p>
+          <a:p>
+            <a:pPr lvl="4"/>
+            <a:r>
+              <a:rPr lang="en-US"/>
+              <a:t>Fifth level</a:t>
+            </a:r>
+          </a:p>
+        </p:txBody>
+      </p:sp>
+      <p:sp>
+        <p:nvSpPr>
+          <p:cNvPr id="5" name="Text Placeholder 4"/>
+          <p:cNvSpPr>
+            <a:spLocks noGrp="1"/>
+          </p:cNvSpPr>
+          <p:nvPr>
+            <p:ph type="body" sz="quarter" idx="3"/>
+          </p:nvPr>
+        </p:nvSpPr>
+        <p:spPr>
+          <a:xfrm>
+            <a:off x="4645025" y="1535113"/>
+            <a:ext cx="4041775" cy="639762"/>
+          </a:xfrm>
+        </p:spPr>
+        <p:txBody>
+          <a:bodyPr anchor="b"/>
+          <a:lstStyle>
+            <a:lvl1pPr marL="0" indent="0">
+              <a:buNone/>
+              <a:defRPr sz="2400" b="1"/>
+            </a:lvl1pPr>
+            <a:lvl2pPr marL="457200" indent="0">
+              <a:buNone/>
+              <a:defRPr sz="2000" b="1"/>
+            </a:lvl2pPr>
+            <a:lvl3pPr marL="914400" indent="0">
+              <a:buNone/>
+              <a:defRPr sz="1800" b="1"/>
+            </a:lvl3pPr>
+            <a:lvl4pPr marL="1371600" indent="0">
+              <a:buNone/>
+              <a:defRPr sz="1600" b="1"/>
+            </a:lvl4pPr>
+            <a:lvl5pPr marL="1828800" indent="0">
+              <a:buNone/>
+              <a:defRPr sz="1600" b="1"/>
+            </a:lvl5pPr>
+            <a:lvl6pPr marL="2286000" indent="0">
+              <a:buNone/>
+              <a:defRPr sz="1600" b="1"/>
+            </a:lvl6pPr>
+            <a:lvl7pPr marL="2743200" indent="0">
+              <a:buNone/>
+              <a:defRPr sz="1600" b="1"/>
+            </a:lvl7pPr>
+            <a:lvl8pPr marL="3200400" indent="0">
+              <a:buNone/>
+              <a:defRPr sz="1600" b="1"/>
+            </a:lvl8pPr>
+            <a:lvl9pPr marL="3657600" indent="0">
+              <a:buNone/>
+              <a:defRPr sz="1600" b="1"/>
+            </a:lvl9pPr>
+          </a:lstStyle>
+          <a:p>
+            <a:pPr lvl="0"/>
+            <a:r>
+              <a:rPr lang="en-US"/>
+              <a:t>Click to edit Master text styles</a:t>
+            </a:r>
+          </a:p>
+        </p:txBody>
+      </p:sp>
+      <p:sp>
+        <p:nvSpPr>
+          <p:cNvPr id="6" name="Content Placeholder 5"/>
+          <p:cNvSpPr>
+            <a:spLocks noGrp="1"/>
+          </p:cNvSpPr>
+          <p:nvPr>
+            <p:ph sz="quarter" idx="4"/>
+          </p:nvPr>
+        </p:nvSpPr>
+        <p:spPr>
+          <a:xfrm>
+            <a:off x="4645025" y="2174875"/>
+            <a:ext cx="4041775" cy="3951288"/>
+          </a:xfrm>
+        </p:spPr>
+        <p:txBody>
+          <a:bodyPr/>
+          <a:lstStyle>
+            <a:lvl1pPr>
+              <a:defRPr sz="2400"/>
+            </a:lvl1pPr>
+            <a:lvl2pPr>
+              <a:defRPr sz="2000"/>
+            </a:lvl2pPr>
+            <a:lvl3pPr>
+              <a:defRPr sz="1800"/>
+            </a:lvl3pPr>
+            <a:lvl4pPr>
+              <a:defRPr sz="1600"/>
+            </a:lvl4pPr>
+            <a:lvl5pPr>
+              <a:defRPr sz="1600"/>
+            </a:lvl5pPr>
+            <a:lvl6pPr>
+              <a:defRPr sz="1600"/>
+            </a:lvl6pPr>
+            <a:lvl7pPr>
+              <a:defRPr sz="1600"/>
+            </a:lvl7pPr>
+            <a:lvl8pPr>
+              <a:defRPr sz="1600"/>
+            </a:lvl8pPr>
+            <a:lvl9pPr>
+              <a:defRPr sz="1600"/>
+            </a:lvl9pPr>
+          </a:lstStyle>
+          <a:p>
+            <a:pPr lvl="0"/>
+            <a:r>
+              <a:rPr lang="en-US"/>
+              <a:t>Click to edit Master text styles</a:t>
+            </a:r>
+          </a:p>
+          <a:p>
+            <a:pPr lvl="1"/>
+            <a:r>
+              <a:rPr lang="en-US"/>
+              <a:t>Second level</a:t>
+            </a:r>
+          </a:p>
+          <a:p>
+            <a:pPr lvl="2"/>
+            <a:r>
+              <a:rPr lang="en-US"/>
+              <a:t>Third level</a:t>
+            </a:r>
+          </a:p>
+          <a:p>
+            <a:pPr lvl="3"/>
+            <a:r>
+              <a:rPr lang="en-US"/>
+              <a:t>Fourth level</a:t>
+            </a:r>
+          </a:p>
+          <a:p>
+            <a:pPr lvl="4"/>
+            <a:r>
+              <a:rPr lang="en-US"/>
+              <a:t>Fifth level</a:t>
+            </a:r>
+          </a:p>
+        </p:txBody>
+      </p:sp>
+      <p:sp>
+        <p:nvSpPr>
+          <p:cNvPr id="7" name="Date Placeholder 6"/>
+          <p:cNvSpPr>
+            <a:spLocks noGrp="1"/>
+          </p:cNvSpPr>
+          <p:nvPr>
+            <p:ph type="dt" sz="half" idx="10"/>
+          </p:nvPr>
+        </p:nvSpPr>
+        <p:spPr/>
+        <p:txBody>
+          <a:bodyPr/>
+          <a:lstStyle/>
+          <a:p>
+            <a:fld id="{5BCAD085-E8A6-8845-BD4E-CB4CCA059FC4}" type="datetimeFigureOut">
+              <a:rPr lang="en-US" smtClean="0"/>
+              <a:t>2/17/2026</a:t>
+            </a:fld>
+            <a:endParaRPr lang="en-US"/>
+          </a:p>
+        </p:txBody>
+      </p:sp>
+      <p:sp>
+        <p:nvSpPr>
+          <p:cNvPr id="8" name="Footer Placeholder 7"/>
+          <p:cNvSpPr>
+            <a:spLocks noGrp="1"/>
+          </p:cNvSpPr>
+          <p:nvPr>
+            <p:ph type="ftr" sz="quarter" idx="11"/>
+          </p:nvPr>
+        </p:nvSpPr>
+        <p:spPr/>
+        <p:txBody>
+          <a:bodyPr/>
+          <a:lstStyle/>
+          <a:p>
+            <a:endParaRPr lang="en-US"/>
+          </a:p>
+        </p:txBody>
+      </p:sp>
+      <p:sp>
+        <p:nvSpPr>
+          <p:cNvPr id="9" name="Slide Number Placeholder 8"/>
+          <p:cNvSpPr>
+            <a:spLocks noGrp="1"/>
+          </p:cNvSpPr>
+          <p:nvPr>
+            <p:ph type="sldNum" sz="quarter" idx="12"/>
+          </p:nvPr>
+        </p:nvSpPr>
+        <p:spPr/>
+        <p:txBody>
+          <a:bodyPr/>
+          <a:lstStyle/>
+          <a:p>
+            <a:fld id="{C1FF6DA9-008F-8B48-92A6-B652298478BF}" type="slidenum">
+              <a:rPr lang="en-US" smtClean="0"/>
+              <a:t>‹#›</a:t>
+            </a:fld>
+            <a:endParaRPr lang="en-US"/>
+          </a:p>
+        </p:txBody>
+      </p:sp>
+    </p:spTree>
+    <p:extLst>
+      <p:ext uri="{BB962C8B-B14F-4D97-AF65-F5344CB8AC3E}">
+        <p14:creationId xmlns:p14="http://schemas.microsoft.com/office/powerpoint/2010/main" val="990158736"/>
+      </p:ext>
+    </p:extLst>
+  </p:cSld>
+  <p:clrMapOvr>
+    <a:masterClrMapping/>
+  </p:clrMapOvr>
+</p:sldLayout>
+</file>
+
+<file path=ppt/slideLayouts/slideLayout11.xml><?xml version="1.0" encoding="utf-8"?>
 <p:sldLayout xmlns:a="http://schemas.openxmlformats.org/drawingml/2006/main" xmlns:r="http://schemas.openxmlformats.org/officeDocument/2006/relationships" xmlns:p="http://schemas.openxmlformats.org/presentationml/2006/main" type="titleOnly" preserve="1">
   <p:cSld name="Title Only">
     <p:spTree>
@@ -1304,7 +1723,7 @@
           <a:p>
             <a:fld id="{5BCAD085-E8A6-8845-BD4E-CB4CCA059FC4}" type="datetimeFigureOut">
               <a:rPr lang="en-US" smtClean="0"/>
-              <a:t>2/14/2026</a:t>
+              <a:t>2/17/2026</a:t>
             </a:fld>
             <a:endParaRPr lang="en-US"/>
           </a:p>
@@ -1365,7 +1784,7 @@
 </p:sldLayout>
 </file>
 
-<file path=ppt/slideLayouts/slideLayout11.xml><?xml version="1.0" encoding="utf-8"?>
+<file path=ppt/slideLayouts/slideLayout12.xml><?xml version="1.0" encoding="utf-8"?>
 <p:sldLayout xmlns:a="http://schemas.openxmlformats.org/drawingml/2006/main" xmlns:r="http://schemas.openxmlformats.org/officeDocument/2006/relationships" xmlns:p="http://schemas.openxmlformats.org/presentationml/2006/main" type="blank" preserve="1">
   <p:cSld name="Blank">
     <p:spTree>
@@ -1399,7 +1818,7 @@
           <a:p>
             <a:fld id="{5BCAD085-E8A6-8845-BD4E-CB4CCA059FC4}" type="datetimeFigureOut">
               <a:rPr lang="en-US" smtClean="0"/>
-              <a:t>2/14/2026</a:t>
+              <a:t>2/17/2026</a:t>
             </a:fld>
             <a:endParaRPr lang="en-US"/>
           </a:p>
@@ -1460,7 +1879,7 @@
 </p:sldLayout>
 </file>
 
-<file path=ppt/slideLayouts/slideLayout12.xml><?xml version="1.0" encoding="utf-8"?>
+<file path=ppt/slideLayouts/slideLayout13.xml><?xml version="1.0" encoding="utf-8"?>
 <p:sldLayout xmlns:a="http://schemas.openxmlformats.org/drawingml/2006/main" xmlns:r="http://schemas.openxmlformats.org/officeDocument/2006/relationships" xmlns:p="http://schemas.openxmlformats.org/presentationml/2006/main" type="objTx" preserve="1">
   <p:cSld name="Content with Caption">
     <p:spTree>
@@ -1674,7 +2093,7 @@
           <a:p>
             <a:fld id="{5BCAD085-E8A6-8845-BD4E-CB4CCA059FC4}" type="datetimeFigureOut">
               <a:rPr lang="en-US" smtClean="0"/>
-              <a:t>2/14/2026</a:t>
+              <a:t>2/17/2026</a:t>
             </a:fld>
             <a:endParaRPr lang="en-US"/>
           </a:p>
@@ -1735,7 +2154,7 @@
 </p:sldLayout>
 </file>
 
-<file path=ppt/slideLayouts/slideLayout13.xml><?xml version="1.0" encoding="utf-8"?>
+<file path=ppt/slideLayouts/slideLayout14.xml><?xml version="1.0" encoding="utf-8"?>
 <p:sldLayout xmlns:a="http://schemas.openxmlformats.org/drawingml/2006/main" xmlns:r="http://schemas.openxmlformats.org/officeDocument/2006/relationships" xmlns:p="http://schemas.openxmlformats.org/presentationml/2006/main" type="picTx" preserve="1">
   <p:cSld name="Picture with Caption">
     <p:spTree>
@@ -1926,7 +2345,7 @@
           <a:p>
             <a:fld id="{5BCAD085-E8A6-8845-BD4E-CB4CCA059FC4}" type="datetimeFigureOut">
               <a:rPr lang="en-US" smtClean="0"/>
-              <a:t>2/14/2026</a:t>
+              <a:t>2/17/2026</a:t>
             </a:fld>
             <a:endParaRPr lang="en-US"/>
           </a:p>
@@ -1987,7 +2406,7 @@
 </p:sldLayout>
 </file>
 
-<file path=ppt/slideLayouts/slideLayout14.xml><?xml version="1.0" encoding="utf-8"?>
+<file path=ppt/slideLayouts/slideLayout15.xml><?xml version="1.0" encoding="utf-8"?>
 <p:sldLayout xmlns:a="http://schemas.openxmlformats.org/drawingml/2006/main" xmlns:r="http://schemas.openxmlformats.org/officeDocument/2006/relationships" xmlns:p="http://schemas.openxmlformats.org/presentationml/2006/main" type="vertTx" preserve="1">
   <p:cSld name="Title and Vertical Text">
     <p:spTree>
@@ -2094,7 +2513,7 @@
           <a:p>
             <a:fld id="{5BCAD085-E8A6-8845-BD4E-CB4CCA059FC4}" type="datetimeFigureOut">
               <a:rPr lang="en-US" smtClean="0"/>
-              <a:t>2/14/2026</a:t>
+              <a:t>2/17/2026</a:t>
             </a:fld>
             <a:endParaRPr lang="en-US"/>
           </a:p>
@@ -2155,7 +2574,7 @@
 </p:sldLayout>
 </file>
 
-<file path=ppt/slideLayouts/slideLayout15.xml><?xml version="1.0" encoding="utf-8"?>
+<file path=ppt/slideLayouts/slideLayout16.xml><?xml version="1.0" encoding="utf-8"?>
 <p:sldLayout xmlns:a="http://schemas.openxmlformats.org/drawingml/2006/main" xmlns:r="http://schemas.openxmlformats.org/officeDocument/2006/relationships" xmlns:p="http://schemas.openxmlformats.org/presentationml/2006/main" type="vertTitleAndTx" preserve="1">
   <p:cSld name="Vertical Title and Text">
     <p:spTree>
@@ -2272,7 +2691,7 @@
           <a:p>
             <a:fld id="{5BCAD085-E8A6-8845-BD4E-CB4CCA059FC4}" type="datetimeFigureOut">
               <a:rPr lang="en-US" smtClean="0"/>
-              <a:t>2/14/2026</a:t>
+              <a:t>2/17/2026</a:t>
             </a:fld>
             <a:endParaRPr lang="en-US"/>
           </a:p>
@@ -2335,7 +2754,182 @@
 
 <file path=ppt/slideLayouts/slideLayout2.xml><?xml version="1.0" encoding="utf-8"?>
 <p:sldLayout xmlns:a="http://schemas.openxmlformats.org/drawingml/2006/main" xmlns:r="http://schemas.openxmlformats.org/officeDocument/2006/relationships" xmlns:p="http://schemas.openxmlformats.org/presentationml/2006/main" type="obj" preserve="1">
-  <p:cSld name="2_Title and Content">
+  <p:cSld name="1_Title and Content">
+    <p:bg>
+      <p:bgPr>
+        <a:solidFill>
+          <a:schemeClr val="bg1"/>
+        </a:solidFill>
+        <a:effectLst/>
+      </p:bgPr>
+    </p:bg>
+    <p:spTree>
+      <p:nvGrpSpPr>
+        <p:cNvPr id="1" name=""/>
+        <p:cNvGrpSpPr/>
+        <p:nvPr/>
+      </p:nvGrpSpPr>
+      <p:grpSpPr>
+        <a:xfrm>
+          <a:off x="0" y="0"/>
+          <a:ext cx="0" cy="0"/>
+          <a:chOff x="0" y="0"/>
+          <a:chExt cx="0" cy="0"/>
+        </a:xfrm>
+      </p:grpSpPr>
+      <p:sp>
+        <p:nvSpPr>
+          <p:cNvPr id="2" name="Title 1"/>
+          <p:cNvSpPr>
+            <a:spLocks noGrp="1"/>
+          </p:cNvSpPr>
+          <p:nvPr>
+            <p:ph type="title"/>
+          </p:nvPr>
+        </p:nvSpPr>
+        <p:spPr/>
+        <p:txBody>
+          <a:bodyPr>
+            <a:normAutofit/>
+          </a:bodyPr>
+          <a:lstStyle>
+            <a:lvl1pPr algn="l">
+              <a:defRPr sz="3600"/>
+            </a:lvl1pPr>
+          </a:lstStyle>
+          <a:p>
+            <a:r>
+              <a:rPr lang="en-US" dirty="0"/>
+              <a:t>Click to edit Master title style</a:t>
+            </a:r>
+          </a:p>
+        </p:txBody>
+      </p:sp>
+      <p:sp>
+        <p:nvSpPr>
+          <p:cNvPr id="3" name="Content Placeholder 2"/>
+          <p:cNvSpPr>
+            <a:spLocks noGrp="1"/>
+          </p:cNvSpPr>
+          <p:nvPr>
+            <p:ph idx="1"/>
+          </p:nvPr>
+        </p:nvSpPr>
+        <p:spPr>
+          <a:xfrm>
+            <a:off x="457200" y="1706033"/>
+            <a:ext cx="8229600" cy="4971032"/>
+          </a:xfrm>
+        </p:spPr>
+        <p:txBody>
+          <a:bodyPr>
+            <a:normAutofit/>
+          </a:bodyPr>
+          <a:lstStyle>
+            <a:lvl1pPr>
+              <a:buNone/>
+              <a:defRPr sz="2000"/>
+            </a:lvl1pPr>
+            <a:lvl2pPr>
+              <a:buNone/>
+              <a:defRPr sz="1800"/>
+            </a:lvl2pPr>
+            <a:lvl3pPr>
+              <a:buNone/>
+              <a:defRPr sz="1600"/>
+            </a:lvl3pPr>
+            <a:lvl4pPr>
+              <a:buNone/>
+              <a:defRPr sz="1400"/>
+            </a:lvl4pPr>
+            <a:lvl5pPr>
+              <a:buNone/>
+              <a:defRPr sz="1400"/>
+            </a:lvl5pPr>
+          </a:lstStyle>
+          <a:p>
+            <a:pPr lvl="0"/>
+            <a:r>
+              <a:rPr lang="en-US" dirty="0"/>
+              <a:t>Click to edit Master text styles</a:t>
+            </a:r>
+          </a:p>
+          <a:p>
+            <a:pPr lvl="1"/>
+            <a:r>
+              <a:rPr lang="en-US" dirty="0"/>
+              <a:t>Second level</a:t>
+            </a:r>
+          </a:p>
+          <a:p>
+            <a:pPr lvl="2"/>
+            <a:r>
+              <a:rPr lang="en-US" dirty="0"/>
+              <a:t>Third level</a:t>
+            </a:r>
+          </a:p>
+          <a:p>
+            <a:pPr lvl="3"/>
+            <a:r>
+              <a:rPr lang="en-US" dirty="0"/>
+              <a:t>Fourth level</a:t>
+            </a:r>
+          </a:p>
+          <a:p>
+            <a:pPr lvl="4"/>
+            <a:r>
+              <a:rPr lang="en-US" dirty="0"/>
+              <a:t>Fifth level</a:t>
+            </a:r>
+          </a:p>
+        </p:txBody>
+      </p:sp>
+      <p:pic>
+        <p:nvPicPr>
+          <p:cNvPr id="5" name="Picture 4">
+            <a:extLst>
+              <a:ext uri="{FF2B5EF4-FFF2-40B4-BE49-F238E27FC236}">
+                <a16:creationId xmlns:a16="http://schemas.microsoft.com/office/drawing/2014/main" id="{D83E45CF-487E-D805-AC82-E9F89743BFD2}"/>
+              </a:ext>
+            </a:extLst>
+          </p:cNvPr>
+          <p:cNvPicPr>
+            <a:picLocks noChangeAspect="1"/>
+          </p:cNvPicPr>
+          <p:nvPr userDrawn="1"/>
+        </p:nvPicPr>
+        <p:blipFill>
+          <a:blip r:embed="rId3"/>
+          <a:stretch>
+            <a:fillRect/>
+          </a:stretch>
+        </p:blipFill>
+        <p:spPr>
+          <a:xfrm>
+            <a:off x="389466" y="1430337"/>
+            <a:ext cx="8373533" cy="199496"/>
+          </a:xfrm>
+          <a:prstGeom prst="rect">
+            <a:avLst/>
+          </a:prstGeom>
+        </p:spPr>
+      </p:pic>
+    </p:spTree>
+    <p:extLst>
+      <p:ext uri="{BB962C8B-B14F-4D97-AF65-F5344CB8AC3E}">
+        <p14:creationId xmlns:p14="http://schemas.microsoft.com/office/powerpoint/2010/main" val="3747716504"/>
+      </p:ext>
+    </p:extLst>
+  </p:cSld>
+  <p:clrMapOvr>
+    <a:overrideClrMapping bg1="lt1" tx1="dk1" bg2="lt2" tx2="dk2" accent1="accent1" accent2="accent2" accent3="accent3" accent4="accent4" accent5="accent5" accent6="accent6" hlink="hlink" folHlink="folHlink"/>
+  </p:clrMapOvr>
+</p:sldLayout>
+</file>
+
+<file path=ppt/slideLayouts/slideLayout3.xml><?xml version="1.0" encoding="utf-8"?>
+<p:sldLayout xmlns:a="http://schemas.openxmlformats.org/drawingml/2006/main" xmlns:r="http://schemas.openxmlformats.org/officeDocument/2006/relationships" xmlns:p="http://schemas.openxmlformats.org/presentationml/2006/main" type="obj" preserve="1">
+  <p:cSld name="6_Title and Content">
     <p:bg>
       <p:bgPr>
         <a:solidFill>
@@ -3012,7 +3606,7 @@
     </p:spTree>
     <p:extLst>
       <p:ext uri="{BB962C8B-B14F-4D97-AF65-F5344CB8AC3E}">
-        <p14:creationId xmlns:p14="http://schemas.microsoft.com/office/powerpoint/2010/main" val="1915757158"/>
+        <p14:creationId xmlns:p14="http://schemas.microsoft.com/office/powerpoint/2010/main" val="3404519732"/>
       </p:ext>
     </p:extLst>
   </p:cSld>
@@ -3022,7 +3616,7 @@
 </p:sldLayout>
 </file>
 
-<file path=ppt/slideLayouts/slideLayout3.xml><?xml version="1.0" encoding="utf-8"?>
+<file path=ppt/slideLayouts/slideLayout4.xml><?xml version="1.0" encoding="utf-8"?>
 <p:sldLayout xmlns:a="http://schemas.openxmlformats.org/drawingml/2006/main" xmlns:r="http://schemas.openxmlformats.org/officeDocument/2006/relationships" xmlns:p="http://schemas.openxmlformats.org/presentationml/2006/main" type="obj" preserve="1">
   <p:cSld name="5_Title and Content">
     <p:bg>
@@ -3706,7 +4300,7 @@
 </p:sldLayout>
 </file>
 
-<file path=ppt/slideLayouts/slideLayout4.xml><?xml version="1.0" encoding="utf-8"?>
+<file path=ppt/slideLayouts/slideLayout5.xml><?xml version="1.0" encoding="utf-8"?>
 <p:sldLayout xmlns:a="http://schemas.openxmlformats.org/drawingml/2006/main" xmlns:r="http://schemas.openxmlformats.org/officeDocument/2006/relationships" xmlns:p="http://schemas.openxmlformats.org/presentationml/2006/main" preserve="1" userDrawn="1">
   <p:cSld name="3_Title and Content">
     <p:bg>
@@ -4470,9 +5064,9 @@
 </p:sldLayout>
 </file>
 
-<file path=ppt/slideLayouts/slideLayout5.xml><?xml version="1.0" encoding="utf-8"?>
+<file path=ppt/slideLayouts/slideLayout6.xml><?xml version="1.0" encoding="utf-8"?>
 <p:sldLayout xmlns:a="http://schemas.openxmlformats.org/drawingml/2006/main" xmlns:r="http://schemas.openxmlformats.org/officeDocument/2006/relationships" xmlns:p="http://schemas.openxmlformats.org/presentationml/2006/main" type="obj" preserve="1">
-  <p:cSld name="1_Title and Content">
+  <p:cSld name="7_Title and Content">
     <p:bg>
       <p:bgPr>
         <a:solidFill>
@@ -4600,7 +5194,7 @@
     </p:spTree>
     <p:extLst>
       <p:ext uri="{BB962C8B-B14F-4D97-AF65-F5344CB8AC3E}">
-        <p14:creationId xmlns:p14="http://schemas.microsoft.com/office/powerpoint/2010/main" val="3747716504"/>
+        <p14:creationId xmlns:p14="http://schemas.microsoft.com/office/powerpoint/2010/main" val="1732010653"/>
       </p:ext>
     </p:extLst>
   </p:cSld>
@@ -4610,7 +5204,7 @@
 </p:sldLayout>
 </file>
 
-<file path=ppt/slideLayouts/slideLayout6.xml><?xml version="1.0" encoding="utf-8"?>
+<file path=ppt/slideLayouts/slideLayout7.xml><?xml version="1.0" encoding="utf-8"?>
 <p:sldLayout xmlns:a="http://schemas.openxmlformats.org/drawingml/2006/main" xmlns:r="http://schemas.openxmlformats.org/officeDocument/2006/relationships" xmlns:p="http://schemas.openxmlformats.org/presentationml/2006/main" type="obj" preserve="1">
   <p:cSld name="4_Title and Content">
     <p:bg>
@@ -4749,7 +5343,7 @@
           <a:p>
             <a:fld id="{5BCAD085-E8A6-8845-BD4E-CB4CCA059FC4}" type="datetimeFigureOut">
               <a:rPr lang="en-US" smtClean="0"/>
-              <a:t>2/14/2026</a:t>
+              <a:t>2/17/2026</a:t>
             </a:fld>
             <a:endParaRPr lang="en-US"/>
           </a:p>
@@ -4810,7 +5404,7 @@
 </p:sldLayout>
 </file>
 
-<file path=ppt/slideLayouts/slideLayout7.xml><?xml version="1.0" encoding="utf-8"?>
+<file path=ppt/slideLayouts/slideLayout8.xml><?xml version="1.0" encoding="utf-8"?>
 <p:sldLayout xmlns:a="http://schemas.openxmlformats.org/drawingml/2006/main" xmlns:r="http://schemas.openxmlformats.org/officeDocument/2006/relationships" xmlns:p="http://schemas.openxmlformats.org/presentationml/2006/main" type="secHead" preserve="1">
   <p:cSld name="Section Header">
     <p:spTree>
@@ -4994,7 +5588,7 @@
           <a:p>
             <a:fld id="{5BCAD085-E8A6-8845-BD4E-CB4CCA059FC4}" type="datetimeFigureOut">
               <a:rPr lang="en-US" smtClean="0"/>
-              <a:t>2/14/2026</a:t>
+              <a:t>2/17/2026</a:t>
             </a:fld>
             <a:endParaRPr lang="en-US"/>
           </a:p>
@@ -5055,7 +5649,7 @@
 </p:sldLayout>
 </file>
 
-<file path=ppt/slideLayouts/slideLayout8.xml><?xml version="1.0" encoding="utf-8"?>
+<file path=ppt/slideLayouts/slideLayout9.xml><?xml version="1.0" encoding="utf-8"?>
 <p:sldLayout xmlns:a="http://schemas.openxmlformats.org/drawingml/2006/main" xmlns:r="http://schemas.openxmlformats.org/officeDocument/2006/relationships" xmlns:p="http://schemas.openxmlformats.org/presentationml/2006/main" type="twoObj" preserve="1">
   <p:cSld name="Two Content">
     <p:spTree>
@@ -5279,7 +5873,7 @@
           <a:p>
             <a:fld id="{5BCAD085-E8A6-8845-BD4E-CB4CCA059FC4}" type="datetimeFigureOut">
               <a:rPr lang="en-US" smtClean="0"/>
-              <a:t>2/14/2026</a:t>
+              <a:t>2/17/2026</a:t>
             </a:fld>
             <a:endParaRPr lang="en-US"/>
           </a:p>
@@ -5331,425 +5925,6 @@
     <p:extLst>
       <p:ext uri="{BB962C8B-B14F-4D97-AF65-F5344CB8AC3E}">
         <p14:creationId xmlns:p14="http://schemas.microsoft.com/office/powerpoint/2010/main" val="2782244947"/>
-      </p:ext>
-    </p:extLst>
-  </p:cSld>
-  <p:clrMapOvr>
-    <a:masterClrMapping/>
-  </p:clrMapOvr>
-</p:sldLayout>
-</file>
-
-<file path=ppt/slideLayouts/slideLayout9.xml><?xml version="1.0" encoding="utf-8"?>
-<p:sldLayout xmlns:a="http://schemas.openxmlformats.org/drawingml/2006/main" xmlns:r="http://schemas.openxmlformats.org/officeDocument/2006/relationships" xmlns:p="http://schemas.openxmlformats.org/presentationml/2006/main" type="twoTxTwoObj" preserve="1">
-  <p:cSld name="Comparison">
-    <p:spTree>
-      <p:nvGrpSpPr>
-        <p:cNvPr id="1" name=""/>
-        <p:cNvGrpSpPr/>
-        <p:nvPr/>
-      </p:nvGrpSpPr>
-      <p:grpSpPr>
-        <a:xfrm>
-          <a:off x="0" y="0"/>
-          <a:ext cx="0" cy="0"/>
-          <a:chOff x="0" y="0"/>
-          <a:chExt cx="0" cy="0"/>
-        </a:xfrm>
-      </p:grpSpPr>
-      <p:sp>
-        <p:nvSpPr>
-          <p:cNvPr id="2" name="Title 1"/>
-          <p:cNvSpPr>
-            <a:spLocks noGrp="1"/>
-          </p:cNvSpPr>
-          <p:nvPr>
-            <p:ph type="title"/>
-          </p:nvPr>
-        </p:nvSpPr>
-        <p:spPr/>
-        <p:txBody>
-          <a:bodyPr/>
-          <a:lstStyle>
-            <a:lvl1pPr>
-              <a:defRPr/>
-            </a:lvl1pPr>
-          </a:lstStyle>
-          <a:p>
-            <a:r>
-              <a:rPr lang="en-US"/>
-              <a:t>Click to edit Master title style</a:t>
-            </a:r>
-          </a:p>
-        </p:txBody>
-      </p:sp>
-      <p:sp>
-        <p:nvSpPr>
-          <p:cNvPr id="3" name="Text Placeholder 2"/>
-          <p:cNvSpPr>
-            <a:spLocks noGrp="1"/>
-          </p:cNvSpPr>
-          <p:nvPr>
-            <p:ph type="body" idx="1"/>
-          </p:nvPr>
-        </p:nvSpPr>
-        <p:spPr>
-          <a:xfrm>
-            <a:off x="457200" y="1535113"/>
-            <a:ext cx="4040188" cy="639762"/>
-          </a:xfrm>
-        </p:spPr>
-        <p:txBody>
-          <a:bodyPr anchor="b"/>
-          <a:lstStyle>
-            <a:lvl1pPr marL="0" indent="0">
-              <a:buNone/>
-              <a:defRPr sz="2400" b="1"/>
-            </a:lvl1pPr>
-            <a:lvl2pPr marL="457200" indent="0">
-              <a:buNone/>
-              <a:defRPr sz="2000" b="1"/>
-            </a:lvl2pPr>
-            <a:lvl3pPr marL="914400" indent="0">
-              <a:buNone/>
-              <a:defRPr sz="1800" b="1"/>
-            </a:lvl3pPr>
-            <a:lvl4pPr marL="1371600" indent="0">
-              <a:buNone/>
-              <a:defRPr sz="1600" b="1"/>
-            </a:lvl4pPr>
-            <a:lvl5pPr marL="1828800" indent="0">
-              <a:buNone/>
-              <a:defRPr sz="1600" b="1"/>
-            </a:lvl5pPr>
-            <a:lvl6pPr marL="2286000" indent="0">
-              <a:buNone/>
-              <a:defRPr sz="1600" b="1"/>
-            </a:lvl6pPr>
-            <a:lvl7pPr marL="2743200" indent="0">
-              <a:buNone/>
-              <a:defRPr sz="1600" b="1"/>
-            </a:lvl7pPr>
-            <a:lvl8pPr marL="3200400" indent="0">
-              <a:buNone/>
-              <a:defRPr sz="1600" b="1"/>
-            </a:lvl8pPr>
-            <a:lvl9pPr marL="3657600" indent="0">
-              <a:buNone/>
-              <a:defRPr sz="1600" b="1"/>
-            </a:lvl9pPr>
-          </a:lstStyle>
-          <a:p>
-            <a:pPr lvl="0"/>
-            <a:r>
-              <a:rPr lang="en-US"/>
-              <a:t>Click to edit Master text styles</a:t>
-            </a:r>
-          </a:p>
-        </p:txBody>
-      </p:sp>
-      <p:sp>
-        <p:nvSpPr>
-          <p:cNvPr id="4" name="Content Placeholder 3"/>
-          <p:cNvSpPr>
-            <a:spLocks noGrp="1"/>
-          </p:cNvSpPr>
-          <p:nvPr>
-            <p:ph sz="half" idx="2"/>
-          </p:nvPr>
-        </p:nvSpPr>
-        <p:spPr>
-          <a:xfrm>
-            <a:off x="457200" y="2174875"/>
-            <a:ext cx="4040188" cy="3951288"/>
-          </a:xfrm>
-        </p:spPr>
-        <p:txBody>
-          <a:bodyPr/>
-          <a:lstStyle>
-            <a:lvl1pPr>
-              <a:defRPr sz="2400"/>
-            </a:lvl1pPr>
-            <a:lvl2pPr>
-              <a:defRPr sz="2000"/>
-            </a:lvl2pPr>
-            <a:lvl3pPr>
-              <a:defRPr sz="1800"/>
-            </a:lvl3pPr>
-            <a:lvl4pPr>
-              <a:defRPr sz="1600"/>
-            </a:lvl4pPr>
-            <a:lvl5pPr>
-              <a:defRPr sz="1600"/>
-            </a:lvl5pPr>
-            <a:lvl6pPr>
-              <a:defRPr sz="1600"/>
-            </a:lvl6pPr>
-            <a:lvl7pPr>
-              <a:defRPr sz="1600"/>
-            </a:lvl7pPr>
-            <a:lvl8pPr>
-              <a:defRPr sz="1600"/>
-            </a:lvl8pPr>
-            <a:lvl9pPr>
-              <a:defRPr sz="1600"/>
-            </a:lvl9pPr>
-          </a:lstStyle>
-          <a:p>
-            <a:pPr lvl="0"/>
-            <a:r>
-              <a:rPr lang="en-US"/>
-              <a:t>Click to edit Master text styles</a:t>
-            </a:r>
-          </a:p>
-          <a:p>
-            <a:pPr lvl="1"/>
-            <a:r>
-              <a:rPr lang="en-US"/>
-              <a:t>Second level</a:t>
-            </a:r>
-          </a:p>
-          <a:p>
-            <a:pPr lvl="2"/>
-            <a:r>
-              <a:rPr lang="en-US"/>
-              <a:t>Third level</a:t>
-            </a:r>
-          </a:p>
-          <a:p>
-            <a:pPr lvl="3"/>
-            <a:r>
-              <a:rPr lang="en-US"/>
-              <a:t>Fourth level</a:t>
-            </a:r>
-          </a:p>
-          <a:p>
-            <a:pPr lvl="4"/>
-            <a:r>
-              <a:rPr lang="en-US"/>
-              <a:t>Fifth level</a:t>
-            </a:r>
-          </a:p>
-        </p:txBody>
-      </p:sp>
-      <p:sp>
-        <p:nvSpPr>
-          <p:cNvPr id="5" name="Text Placeholder 4"/>
-          <p:cNvSpPr>
-            <a:spLocks noGrp="1"/>
-          </p:cNvSpPr>
-          <p:nvPr>
-            <p:ph type="body" sz="quarter" idx="3"/>
-          </p:nvPr>
-        </p:nvSpPr>
-        <p:spPr>
-          <a:xfrm>
-            <a:off x="4645025" y="1535113"/>
-            <a:ext cx="4041775" cy="639762"/>
-          </a:xfrm>
-        </p:spPr>
-        <p:txBody>
-          <a:bodyPr anchor="b"/>
-          <a:lstStyle>
-            <a:lvl1pPr marL="0" indent="0">
-              <a:buNone/>
-              <a:defRPr sz="2400" b="1"/>
-            </a:lvl1pPr>
-            <a:lvl2pPr marL="457200" indent="0">
-              <a:buNone/>
-              <a:defRPr sz="2000" b="1"/>
-            </a:lvl2pPr>
-            <a:lvl3pPr marL="914400" indent="0">
-              <a:buNone/>
-              <a:defRPr sz="1800" b="1"/>
-            </a:lvl3pPr>
-            <a:lvl4pPr marL="1371600" indent="0">
-              <a:buNone/>
-              <a:defRPr sz="1600" b="1"/>
-            </a:lvl4pPr>
-            <a:lvl5pPr marL="1828800" indent="0">
-              <a:buNone/>
-              <a:defRPr sz="1600" b="1"/>
-            </a:lvl5pPr>
-            <a:lvl6pPr marL="2286000" indent="0">
-              <a:buNone/>
-              <a:defRPr sz="1600" b="1"/>
-            </a:lvl6pPr>
-            <a:lvl7pPr marL="2743200" indent="0">
-              <a:buNone/>
-              <a:defRPr sz="1600" b="1"/>
-            </a:lvl7pPr>
-            <a:lvl8pPr marL="3200400" indent="0">
-              <a:buNone/>
-              <a:defRPr sz="1600" b="1"/>
-            </a:lvl8pPr>
-            <a:lvl9pPr marL="3657600" indent="0">
-              <a:buNone/>
-              <a:defRPr sz="1600" b="1"/>
-            </a:lvl9pPr>
-          </a:lstStyle>
-          <a:p>
-            <a:pPr lvl="0"/>
-            <a:r>
-              <a:rPr lang="en-US"/>
-              <a:t>Click to edit Master text styles</a:t>
-            </a:r>
-          </a:p>
-        </p:txBody>
-      </p:sp>
-      <p:sp>
-        <p:nvSpPr>
-          <p:cNvPr id="6" name="Content Placeholder 5"/>
-          <p:cNvSpPr>
-            <a:spLocks noGrp="1"/>
-          </p:cNvSpPr>
-          <p:nvPr>
-            <p:ph sz="quarter" idx="4"/>
-          </p:nvPr>
-        </p:nvSpPr>
-        <p:spPr>
-          <a:xfrm>
-            <a:off x="4645025" y="2174875"/>
-            <a:ext cx="4041775" cy="3951288"/>
-          </a:xfrm>
-        </p:spPr>
-        <p:txBody>
-          <a:bodyPr/>
-          <a:lstStyle>
-            <a:lvl1pPr>
-              <a:defRPr sz="2400"/>
-            </a:lvl1pPr>
-            <a:lvl2pPr>
-              <a:defRPr sz="2000"/>
-            </a:lvl2pPr>
-            <a:lvl3pPr>
-              <a:defRPr sz="1800"/>
-            </a:lvl3pPr>
-            <a:lvl4pPr>
-              <a:defRPr sz="1600"/>
-            </a:lvl4pPr>
-            <a:lvl5pPr>
-              <a:defRPr sz="1600"/>
-            </a:lvl5pPr>
-            <a:lvl6pPr>
-              <a:defRPr sz="1600"/>
-            </a:lvl6pPr>
-            <a:lvl7pPr>
-              <a:defRPr sz="1600"/>
-            </a:lvl7pPr>
-            <a:lvl8pPr>
-              <a:defRPr sz="1600"/>
-            </a:lvl8pPr>
-            <a:lvl9pPr>
-              <a:defRPr sz="1600"/>
-            </a:lvl9pPr>
-          </a:lstStyle>
-          <a:p>
-            <a:pPr lvl="0"/>
-            <a:r>
-              <a:rPr lang="en-US"/>
-              <a:t>Click to edit Master text styles</a:t>
-            </a:r>
-          </a:p>
-          <a:p>
-            <a:pPr lvl="1"/>
-            <a:r>
-              <a:rPr lang="en-US"/>
-              <a:t>Second level</a:t>
-            </a:r>
-          </a:p>
-          <a:p>
-            <a:pPr lvl="2"/>
-            <a:r>
-              <a:rPr lang="en-US"/>
-              <a:t>Third level</a:t>
-            </a:r>
-          </a:p>
-          <a:p>
-            <a:pPr lvl="3"/>
-            <a:r>
-              <a:rPr lang="en-US"/>
-              <a:t>Fourth level</a:t>
-            </a:r>
-          </a:p>
-          <a:p>
-            <a:pPr lvl="4"/>
-            <a:r>
-              <a:rPr lang="en-US"/>
-              <a:t>Fifth level</a:t>
-            </a:r>
-          </a:p>
-        </p:txBody>
-      </p:sp>
-      <p:sp>
-        <p:nvSpPr>
-          <p:cNvPr id="7" name="Date Placeholder 6"/>
-          <p:cNvSpPr>
-            <a:spLocks noGrp="1"/>
-          </p:cNvSpPr>
-          <p:nvPr>
-            <p:ph type="dt" sz="half" idx="10"/>
-          </p:nvPr>
-        </p:nvSpPr>
-        <p:spPr/>
-        <p:txBody>
-          <a:bodyPr/>
-          <a:lstStyle/>
-          <a:p>
-            <a:fld id="{5BCAD085-E8A6-8845-BD4E-CB4CCA059FC4}" type="datetimeFigureOut">
-              <a:rPr lang="en-US" smtClean="0"/>
-              <a:t>2/14/2026</a:t>
-            </a:fld>
-            <a:endParaRPr lang="en-US"/>
-          </a:p>
-        </p:txBody>
-      </p:sp>
-      <p:sp>
-        <p:nvSpPr>
-          <p:cNvPr id="8" name="Footer Placeholder 7"/>
-          <p:cNvSpPr>
-            <a:spLocks noGrp="1"/>
-          </p:cNvSpPr>
-          <p:nvPr>
-            <p:ph type="ftr" sz="quarter" idx="11"/>
-          </p:nvPr>
-        </p:nvSpPr>
-        <p:spPr/>
-        <p:txBody>
-          <a:bodyPr/>
-          <a:lstStyle/>
-          <a:p>
-            <a:endParaRPr lang="en-US"/>
-          </a:p>
-        </p:txBody>
-      </p:sp>
-      <p:sp>
-        <p:nvSpPr>
-          <p:cNvPr id="9" name="Slide Number Placeholder 8"/>
-          <p:cNvSpPr>
-            <a:spLocks noGrp="1"/>
-          </p:cNvSpPr>
-          <p:nvPr>
-            <p:ph type="sldNum" sz="quarter" idx="12"/>
-          </p:nvPr>
-        </p:nvSpPr>
-        <p:spPr/>
-        <p:txBody>
-          <a:bodyPr/>
-          <a:lstStyle/>
-          <a:p>
-            <a:fld id="{C1FF6DA9-008F-8B48-92A6-B652298478BF}" type="slidenum">
-              <a:rPr lang="en-US" smtClean="0"/>
-              <a:t>‹#›</a:t>
-            </a:fld>
-            <a:endParaRPr lang="en-US"/>
-          </a:p>
-        </p:txBody>
-      </p:sp>
-    </p:spTree>
-    <p:extLst>
-      <p:ext uri="{BB962C8B-B14F-4D97-AF65-F5344CB8AC3E}">
-        <p14:creationId xmlns:p14="http://schemas.microsoft.com/office/powerpoint/2010/main" val="990158736"/>
       </p:ext>
     </p:extLst>
   </p:cSld>
@@ -5909,7 +6084,7 @@
           <a:p>
             <a:fld id="{5BCAD085-E8A6-8845-BD4E-CB4CCA059FC4}" type="datetimeFigureOut">
               <a:rPr lang="en-US" smtClean="0"/>
-              <a:t>2/14/2026</a:t>
+              <a:t>2/17/2026</a:t>
             </a:fld>
             <a:endParaRPr lang="en-US"/>
           </a:p>
@@ -6003,20 +6178,21 @@
   <p:clrMap bg1="lt1" tx1="dk1" bg2="lt2" tx2="dk2" accent1="accent1" accent2="accent2" accent3="accent3" accent4="accent4" accent5="accent5" accent6="accent6" hlink="hlink" folHlink="folHlink"/>
   <p:sldLayoutIdLst>
     <p:sldLayoutId id="2147483665" r:id="rId1"/>
-    <p:sldLayoutId id="2147483661" r:id="rId2"/>
-    <p:sldLayoutId id="2147483664" r:id="rId3"/>
-    <p:sldLayoutId id="2147483662" r:id="rId4"/>
-    <p:sldLayoutId id="2147483660" r:id="rId5"/>
-    <p:sldLayoutId id="2147483663" r:id="rId6"/>
-    <p:sldLayoutId id="2147483651" r:id="rId7"/>
-    <p:sldLayoutId id="2147483652" r:id="rId8"/>
-    <p:sldLayoutId id="2147483653" r:id="rId9"/>
-    <p:sldLayoutId id="2147483654" r:id="rId10"/>
-    <p:sldLayoutId id="2147483655" r:id="rId11"/>
-    <p:sldLayoutId id="2147483656" r:id="rId12"/>
-    <p:sldLayoutId id="2147483657" r:id="rId13"/>
-    <p:sldLayoutId id="2147483658" r:id="rId14"/>
-    <p:sldLayoutId id="2147483659" r:id="rId15"/>
+    <p:sldLayoutId id="2147483660" r:id="rId2"/>
+    <p:sldLayoutId id="2147483667" r:id="rId3"/>
+    <p:sldLayoutId id="2147483664" r:id="rId4"/>
+    <p:sldLayoutId id="2147483662" r:id="rId5"/>
+    <p:sldLayoutId id="2147483668" r:id="rId6"/>
+    <p:sldLayoutId id="2147483663" r:id="rId7"/>
+    <p:sldLayoutId id="2147483651" r:id="rId8"/>
+    <p:sldLayoutId id="2147483652" r:id="rId9"/>
+    <p:sldLayoutId id="2147483653" r:id="rId10"/>
+    <p:sldLayoutId id="2147483654" r:id="rId11"/>
+    <p:sldLayoutId id="2147483655" r:id="rId12"/>
+    <p:sldLayoutId id="2147483656" r:id="rId13"/>
+    <p:sldLayoutId id="2147483657" r:id="rId14"/>
+    <p:sldLayoutId id="2147483658" r:id="rId15"/>
+    <p:sldLayoutId id="2147483659" r:id="rId16"/>
   </p:sldLayoutIdLst>
   <p:txStyles>
     <p:titleStyle>
@@ -7121,10 +7297,56 @@
 </a:themeOverride>
 </file>
 
+<file path=ppt/theme/themeOverride6.xml><?xml version="1.0" encoding="utf-8"?>
+<a:themeOverride xmlns:a="http://schemas.openxmlformats.org/drawingml/2006/main">
+  <a:clrScheme name="Office">
+    <a:dk1>
+      <a:sysClr val="windowText" lastClr="000000"/>
+    </a:dk1>
+    <a:lt1>
+      <a:sysClr val="window" lastClr="FFFFFF"/>
+    </a:lt1>
+    <a:dk2>
+      <a:srgbClr val="1F497D"/>
+    </a:dk2>
+    <a:lt2>
+      <a:srgbClr val="EEECE1"/>
+    </a:lt2>
+    <a:accent1>
+      <a:srgbClr val="4F81BD"/>
+    </a:accent1>
+    <a:accent2>
+      <a:srgbClr val="C0504D"/>
+    </a:accent2>
+    <a:accent3>
+      <a:srgbClr val="9BBB59"/>
+    </a:accent3>
+    <a:accent4>
+      <a:srgbClr val="8064A2"/>
+    </a:accent4>
+    <a:accent5>
+      <a:srgbClr val="4BACC6"/>
+    </a:accent5>
+    <a:accent6>
+      <a:srgbClr val="F79646"/>
+    </a:accent6>
+    <a:hlink>
+      <a:srgbClr val="0000FF"/>
+    </a:hlink>
+    <a:folHlink>
+      <a:srgbClr val="800080"/>
+    </a:folHlink>
+  </a:clrScheme>
+</a:themeOverride>
+</file>
+
 <file path=customXml/item1.xml><?xml version="1.0" encoding="utf-8"?>
-<p:properties xmlns:p="http://schemas.microsoft.com/office/2006/metadata/properties" xmlns:xsi="http://www.w3.org/2001/XMLSchema-instance" xmlns:pc="http://schemas.microsoft.com/office/infopath/2007/PartnerControls">
-  <documentManagement/>
-</p:properties>
+<?mso-contentType ?>
+<FormTemplates xmlns="http://schemas.microsoft.com/sharepoint/v3/contenttype/forms">
+  <Display>DocumentLibraryForm</Display>
+  <Edit>DocumentLibraryForm</Edit>
+  <New>DocumentLibraryForm</New>
+</FormTemplates>
 </file>
 
 <file path=customXml/item2.xml><?xml version="1.0" encoding="utf-8"?>
@@ -7404,24 +7626,38 @@
 </file>
 
 <file path=customXml/item4.xml><?xml version="1.0" encoding="utf-8"?>
-<?mso-contentType ?>
-<FormTemplates xmlns="http://schemas.microsoft.com/sharepoint/v3/contenttype/forms">
-  <Display>DocumentLibraryForm</Display>
-  <Edit>DocumentLibraryForm</Edit>
-  <New>DocumentLibraryForm</New>
-</FormTemplates>
+<p:properties xmlns:p="http://schemas.microsoft.com/office/2006/metadata/properties" xmlns:xsi="http://www.w3.org/2001/XMLSchema-instance" xmlns:pc="http://schemas.microsoft.com/office/infopath/2007/PartnerControls">
+  <documentManagement/>
+</p:properties>
 </file>
 
 <file path=customXml/itemProps1.xml><?xml version="1.0" encoding="utf-8"?>
-<ds:datastoreItem xmlns:ds="http://schemas.openxmlformats.org/officeDocument/2006/customXml" ds:itemID="{9D39D6F7-DEC6-43E0-B150-2B295957F91D}">
+<ds:datastoreItem xmlns:ds="http://schemas.openxmlformats.org/officeDocument/2006/customXml" ds:itemID="{4635B0D5-FB81-4068-AEC4-E15905E3EFEE}">
   <ds:schemaRefs>
-    <ds:schemaRef ds:uri="http://schemas.microsoft.com/office/2006/metadata/properties"/>
-    <ds:schemaRef ds:uri="http://schemas.microsoft.com/office/infopath/2007/PartnerControls"/>
+    <ds:schemaRef ds:uri="http://schemas.microsoft.com/sharepoint/v3/contenttype/forms"/>
   </ds:schemaRefs>
 </ds:datastoreItem>
 </file>
 
 <file path=customXml/itemProps2.xml><?xml version="1.0" encoding="utf-8"?>
+<ds:datastoreItem xmlns:ds="http://schemas.openxmlformats.org/officeDocument/2006/customXml" ds:itemID="{10BB2122-50FB-4777-8728-D52F7CF1AED8}">
+  <ds:schemaRefs>
+    <ds:schemaRef ds:uri="4d118d9b-448c-4a54-90d4-6d126d04e28f"/>
+    <ds:schemaRef ds:uri="http://purl.org/dc/elements/1.1/"/>
+    <ds:schemaRef ds:uri="http://purl.org/dc/terms/"/>
+    <ds:schemaRef ds:uri="http://schemas.microsoft.com/internal/obd"/>
+    <ds:schemaRef ds:uri="http://schemas.microsoft.com/office/2006/documentManagement/types"/>
+    <ds:schemaRef ds:uri="http://schemas.microsoft.com/office/2006/metadata/contentType"/>
+    <ds:schemaRef ds:uri="http://schemas.microsoft.com/office/2006/metadata/properties"/>
+    <ds:schemaRef ds:uri="http://schemas.microsoft.com/office/2006/metadata/properties/metaAttributes"/>
+    <ds:schemaRef ds:uri="http://schemas.microsoft.com/office/infopath/2007/PartnerControls"/>
+    <ds:schemaRef ds:uri="http://schemas.openxmlformats.org/package/2006/metadata/core-properties"/>
+    <ds:schemaRef ds:uri="http://www.w3.org/2001/XMLSchema"/>
+  </ds:schemaRefs>
+</ds:datastoreItem>
+</file>
+
+<file path=customXml/itemProps3.xml><?xml version="1.0" encoding="utf-8"?>
 <ds:datastoreItem xmlns:ds="http://schemas.openxmlformats.org/officeDocument/2006/customXml" ds:itemID="{EC3F7911-CA70-450D-9C74-276FAE63B2A1}">
   <ds:schemaRefs>
     <ds:schemaRef ds:uri="4d118d9b-448c-4a54-90d4-6d126d04e28f"/>
@@ -7439,28 +7675,11 @@
 </ds:datastoreItem>
 </file>
 
-<file path=customXml/itemProps3.xml><?xml version="1.0" encoding="utf-8"?>
-<ds:datastoreItem xmlns:ds="http://schemas.openxmlformats.org/officeDocument/2006/customXml" ds:itemID="{10BB2122-50FB-4777-8728-D52F7CF1AED8}">
+<file path=customXml/itemProps4.xml><?xml version="1.0" encoding="utf-8"?>
+<ds:datastoreItem xmlns:ds="http://schemas.openxmlformats.org/officeDocument/2006/customXml" ds:itemID="{9D39D6F7-DEC6-43E0-B150-2B295957F91D}">
   <ds:schemaRefs>
-    <ds:schemaRef ds:uri="4d118d9b-448c-4a54-90d4-6d126d04e28f"/>
-    <ds:schemaRef ds:uri="http://purl.org/dc/elements/1.1/"/>
-    <ds:schemaRef ds:uri="http://purl.org/dc/terms/"/>
-    <ds:schemaRef ds:uri="http://schemas.microsoft.com/internal/obd"/>
-    <ds:schemaRef ds:uri="http://schemas.microsoft.com/office/2006/documentManagement/types"/>
-    <ds:schemaRef ds:uri="http://schemas.microsoft.com/office/2006/metadata/contentType"/>
     <ds:schemaRef ds:uri="http://schemas.microsoft.com/office/2006/metadata/properties"/>
-    <ds:schemaRef ds:uri="http://schemas.microsoft.com/office/2006/metadata/properties/metaAttributes"/>
     <ds:schemaRef ds:uri="http://schemas.microsoft.com/office/infopath/2007/PartnerControls"/>
-    <ds:schemaRef ds:uri="http://schemas.openxmlformats.org/package/2006/metadata/core-properties"/>
-    <ds:schemaRef ds:uri="http://www.w3.org/2001/XMLSchema"/>
-  </ds:schemaRefs>
-</ds:datastoreItem>
-</file>
-
-<file path=customXml/itemProps4.xml><?xml version="1.0" encoding="utf-8"?>
-<ds:datastoreItem xmlns:ds="http://schemas.openxmlformats.org/officeDocument/2006/customXml" ds:itemID="{4635B0D5-FB81-4068-AEC4-E15905E3EFEE}">
-  <ds:schemaRefs>
-    <ds:schemaRef ds:uri="http://schemas.microsoft.com/sharepoint/v3/contenttype/forms"/>
   </ds:schemaRefs>
 </ds:datastoreItem>
 </file>
</xml_diff>

<commit_message>
- Updated Technical User Guide - Refactored tools module names
</commit_message>
<xml_diff>
--- a/assets/templates_pptx/UserGuideTemplate.pptx
+++ b/assets/templates_pptx/UserGuideTemplate.pptx
@@ -901,7 +901,7 @@
           <a:p>
             <a:fld id="{044512AF-DD4E-4B73-98EF-EA3A4CA19885}" type="datetimeFigureOut">
               <a:rPr lang="en-US" smtClean="0"/>
-              <a:t>2/17/2026</a:t>
+              <a:t>2/18/2026</a:t>
             </a:fld>
             <a:endParaRPr lang="en-US"/>
           </a:p>
@@ -1187,7 +1187,7 @@
           <a:p>
             <a:fld id="{5BCAD085-E8A6-8845-BD4E-CB4CCA059FC4}" type="datetimeFigureOut">
               <a:rPr lang="en-US" smtClean="0"/>
-              <a:t>2/17/2026</a:t>
+              <a:t>2/18/2026</a:t>
             </a:fld>
             <a:endParaRPr lang="en-US" dirty="0"/>
           </a:p>
@@ -1606,7 +1606,7 @@
           <a:p>
             <a:fld id="{5BCAD085-E8A6-8845-BD4E-CB4CCA059FC4}" type="datetimeFigureOut">
               <a:rPr lang="en-US" smtClean="0"/>
-              <a:t>2/17/2026</a:t>
+              <a:t>2/18/2026</a:t>
             </a:fld>
             <a:endParaRPr lang="en-US"/>
           </a:p>
@@ -1723,7 +1723,7 @@
           <a:p>
             <a:fld id="{5BCAD085-E8A6-8845-BD4E-CB4CCA059FC4}" type="datetimeFigureOut">
               <a:rPr lang="en-US" smtClean="0"/>
-              <a:t>2/17/2026</a:t>
+              <a:t>2/18/2026</a:t>
             </a:fld>
             <a:endParaRPr lang="en-US"/>
           </a:p>
@@ -1818,7 +1818,7 @@
           <a:p>
             <a:fld id="{5BCAD085-E8A6-8845-BD4E-CB4CCA059FC4}" type="datetimeFigureOut">
               <a:rPr lang="en-US" smtClean="0"/>
-              <a:t>2/17/2026</a:t>
+              <a:t>2/18/2026</a:t>
             </a:fld>
             <a:endParaRPr lang="en-US"/>
           </a:p>
@@ -2093,7 +2093,7 @@
           <a:p>
             <a:fld id="{5BCAD085-E8A6-8845-BD4E-CB4CCA059FC4}" type="datetimeFigureOut">
               <a:rPr lang="en-US" smtClean="0"/>
-              <a:t>2/17/2026</a:t>
+              <a:t>2/18/2026</a:t>
             </a:fld>
             <a:endParaRPr lang="en-US"/>
           </a:p>
@@ -2345,7 +2345,7 @@
           <a:p>
             <a:fld id="{5BCAD085-E8A6-8845-BD4E-CB4CCA059FC4}" type="datetimeFigureOut">
               <a:rPr lang="en-US" smtClean="0"/>
-              <a:t>2/17/2026</a:t>
+              <a:t>2/18/2026</a:t>
             </a:fld>
             <a:endParaRPr lang="en-US"/>
           </a:p>
@@ -2513,7 +2513,7 @@
           <a:p>
             <a:fld id="{5BCAD085-E8A6-8845-BD4E-CB4CCA059FC4}" type="datetimeFigureOut">
               <a:rPr lang="en-US" smtClean="0"/>
-              <a:t>2/17/2026</a:t>
+              <a:t>2/18/2026</a:t>
             </a:fld>
             <a:endParaRPr lang="en-US"/>
           </a:p>
@@ -2691,7 +2691,7 @@
           <a:p>
             <a:fld id="{5BCAD085-E8A6-8845-BD4E-CB4CCA059FC4}" type="datetimeFigureOut">
               <a:rPr lang="en-US" smtClean="0"/>
-              <a:t>2/17/2026</a:t>
+              <a:t>2/18/2026</a:t>
             </a:fld>
             <a:endParaRPr lang="en-US"/>
           </a:p>
@@ -2826,7 +2826,7 @@
             <a:normAutofit/>
           </a:bodyPr>
           <a:lstStyle>
-            <a:lvl1pPr>
+            <a:lvl1pPr marL="0">
               <a:buNone/>
               <a:defRPr sz="2000"/>
             </a:lvl1pPr>
@@ -5343,7 +5343,7 @@
           <a:p>
             <a:fld id="{5BCAD085-E8A6-8845-BD4E-CB4CCA059FC4}" type="datetimeFigureOut">
               <a:rPr lang="en-US" smtClean="0"/>
-              <a:t>2/17/2026</a:t>
+              <a:t>2/18/2026</a:t>
             </a:fld>
             <a:endParaRPr lang="en-US"/>
           </a:p>
@@ -5588,7 +5588,7 @@
           <a:p>
             <a:fld id="{5BCAD085-E8A6-8845-BD4E-CB4CCA059FC4}" type="datetimeFigureOut">
               <a:rPr lang="en-US" smtClean="0"/>
-              <a:t>2/17/2026</a:t>
+              <a:t>2/18/2026</a:t>
             </a:fld>
             <a:endParaRPr lang="en-US"/>
           </a:p>
@@ -5873,7 +5873,7 @@
           <a:p>
             <a:fld id="{5BCAD085-E8A6-8845-BD4E-CB4CCA059FC4}" type="datetimeFigureOut">
               <a:rPr lang="en-US" smtClean="0"/>
-              <a:t>2/17/2026</a:t>
+              <a:t>2/18/2026</a:t>
             </a:fld>
             <a:endParaRPr lang="en-US"/>
           </a:p>
@@ -6084,7 +6084,7 @@
           <a:p>
             <a:fld id="{5BCAD085-E8A6-8845-BD4E-CB4CCA059FC4}" type="datetimeFigureOut">
               <a:rPr lang="en-US" smtClean="0"/>
-              <a:t>2/17/2026</a:t>
+              <a:t>2/18/2026</a:t>
             </a:fld>
             <a:endParaRPr lang="en-US"/>
           </a:p>
@@ -7350,141 +7350,9 @@
 </file>
 
 <file path=customXml/item2.xml><?xml version="1.0" encoding="utf-8"?>
-<ct:contentTypeSchema xmlns:ct="http://schemas.microsoft.com/office/2006/metadata/contentType" xmlns:ma="http://schemas.microsoft.com/office/2006/metadata/properties/metaAttributes" ct:_="" ma:_="" ma:contentTypeName="Document" ma:contentTypeID="0x010100E69987ED4D0F3F47BA33116175D6C093" ma:contentTypeVersion="3" ma:contentTypeDescription="Create a new document." ma:contentTypeScope="" ma:versionID="b377e87a9fdb0adfbe59c8cbc16d9e06">
-  <xsd:schema xmlns:xsd="http://www.w3.org/2001/XMLSchema" xmlns:xs="http://www.w3.org/2001/XMLSchema" xmlns:p="http://schemas.microsoft.com/office/2006/metadata/properties" xmlns:ns2="4d118d9b-448c-4a54-90d4-6d126d04e28f" targetNamespace="http://schemas.microsoft.com/office/2006/metadata/properties" ma:root="true" ma:fieldsID="142a0c039391e3f54e2425d6548dcea2" ns2:_="">
-    <xsd:import namespace="4d118d9b-448c-4a54-90d4-6d126d04e28f"/>
-    <xsd:element name="properties">
-      <xsd:complexType>
-        <xsd:sequence>
-          <xsd:element name="documentManagement">
-            <xsd:complexType>
-              <xsd:all>
-                <xsd:element ref="ns2:MediaServiceMetadata" minOccurs="0"/>
-                <xsd:element ref="ns2:MediaServiceFastMetadata" minOccurs="0"/>
-                <xsd:element ref="ns2:MediaServiceSearchProperties" minOccurs="0"/>
-              </xsd:all>
-            </xsd:complexType>
-          </xsd:element>
-        </xsd:sequence>
-      </xsd:complexType>
-    </xsd:element>
-  </xsd:schema>
-  <xsd:schema xmlns:xsd="http://www.w3.org/2001/XMLSchema" xmlns:xs="http://www.w3.org/2001/XMLSchema" xmlns:dms="http://schemas.microsoft.com/office/2006/documentManagement/types" xmlns:pc="http://schemas.microsoft.com/office/infopath/2007/PartnerControls" targetNamespace="4d118d9b-448c-4a54-90d4-6d126d04e28f" elementFormDefault="qualified">
-    <xsd:import namespace="http://schemas.microsoft.com/office/2006/documentManagement/types"/>
-    <xsd:import namespace="http://schemas.microsoft.com/office/infopath/2007/PartnerControls"/>
-    <xsd:element name="MediaServiceMetadata" ma:index="8" nillable="true" ma:displayName="MediaServiceMetadata" ma:hidden="true" ma:internalName="MediaServiceMetadata" ma:readOnly="true">
-      <xsd:simpleType>
-        <xsd:restriction base="dms:Note"/>
-      </xsd:simpleType>
-    </xsd:element>
-    <xsd:element name="MediaServiceFastMetadata" ma:index="9" nillable="true" ma:displayName="MediaServiceFastMetadata" ma:hidden="true" ma:internalName="MediaServiceFastMetadata" ma:readOnly="true">
-      <xsd:simpleType>
-        <xsd:restriction base="dms:Note"/>
-      </xsd:simpleType>
-    </xsd:element>
-    <xsd:element name="MediaServiceSearchProperties" ma:index="10" nillable="true" ma:displayName="MediaServiceSearchProperties" ma:hidden="true" ma:internalName="MediaServiceSearchProperties" ma:readOnly="true">
-      <xsd:simpleType>
-        <xsd:restriction base="dms:Note"/>
-      </xsd:simpleType>
-    </xsd:element>
-  </xsd:schema>
-  <xsd:schema xmlns="http://schemas.openxmlformats.org/package/2006/metadata/core-properties" xmlns:xsd="http://www.w3.org/2001/XMLSchema" xmlns:xsi="http://www.w3.org/2001/XMLSchema-instance" xmlns:dc="http://purl.org/dc/elements/1.1/" xmlns:dcterms="http://purl.org/dc/terms/" xmlns:odoc="http://schemas.microsoft.com/internal/obd" targetNamespace="http://schemas.openxmlformats.org/package/2006/metadata/core-properties" elementFormDefault="qualified" attributeFormDefault="unqualified" blockDefault="#all">
-    <xsd:import namespace="http://purl.org/dc/elements/1.1/" schemaLocation="http://dublincore.org/schemas/xmls/qdc/2003/04/02/dc.xsd"/>
-    <xsd:import namespace="http://purl.org/dc/terms/" schemaLocation="http://dublincore.org/schemas/xmls/qdc/2003/04/02/dcterms.xsd"/>
-    <xsd:element name="coreProperties" type="CT_coreProperties"/>
-    <xsd:complexType name="CT_coreProperties">
-      <xsd:all>
-        <xsd:element ref="dc:creator" minOccurs="0" maxOccurs="1"/>
-        <xsd:element ref="dcterms:created" minOccurs="0" maxOccurs="1"/>
-        <xsd:element ref="dc:identifier" minOccurs="0" maxOccurs="1"/>
-        <xsd:element name="contentType" minOccurs="0" maxOccurs="1" type="xsd:string" ma:index="0" ma:displayName="Content Type"/>
-        <xsd:element ref="dc:title" minOccurs="0" maxOccurs="1" ma:index="4" ma:displayName="Title"/>
-        <xsd:element ref="dc:subject" minOccurs="0" maxOccurs="1"/>
-        <xsd:element ref="dc:description" minOccurs="0" maxOccurs="1"/>
-        <xsd:element name="keywords" minOccurs="0" maxOccurs="1" type="xsd:string"/>
-        <xsd:element ref="dc:language" minOccurs="0" maxOccurs="1"/>
-        <xsd:element name="category" minOccurs="0" maxOccurs="1" type="xsd:string"/>
-        <xsd:element name="version" minOccurs="0" maxOccurs="1" type="xsd:string"/>
-        <xsd:element name="revision" minOccurs="0" maxOccurs="1" type="xsd:string">
-          <xsd:annotation>
-            <xsd:documentation>
-                        This value indicates the number of saves or revisions. The application is responsible for updating this value after each revision.
-                    </xsd:documentation>
-          </xsd:annotation>
-        </xsd:element>
-        <xsd:element name="lastModifiedBy" minOccurs="0" maxOccurs="1" type="xsd:string"/>
-        <xsd:element ref="dcterms:modified" minOccurs="0" maxOccurs="1"/>
-        <xsd:element name="contentStatus" minOccurs="0" maxOccurs="1" type="xsd:string"/>
-      </xsd:all>
-    </xsd:complexType>
-  </xsd:schema>
-  <xs:schema xmlns:pc="http://schemas.microsoft.com/office/infopath/2007/PartnerControls" xmlns:xs="http://www.w3.org/2001/XMLSchema" targetNamespace="http://schemas.microsoft.com/office/infopath/2007/PartnerControls" elementFormDefault="qualified" attributeFormDefault="unqualified">
-    <xs:element name="Person">
-      <xs:complexType>
-        <xs:sequence>
-          <xs:element ref="pc:DisplayName" minOccurs="0"/>
-          <xs:element ref="pc:AccountId" minOccurs="0"/>
-          <xs:element ref="pc:AccountType" minOccurs="0"/>
-        </xs:sequence>
-      </xs:complexType>
-    </xs:element>
-    <xs:element name="DisplayName" type="xs:string"/>
-    <xs:element name="AccountId" type="xs:string"/>
-    <xs:element name="AccountType" type="xs:string"/>
-    <xs:element name="BDCAssociatedEntity">
-      <xs:complexType>
-        <xs:sequence>
-          <xs:element ref="pc:BDCEntity" minOccurs="0" maxOccurs="unbounded"/>
-        </xs:sequence>
-        <xs:attribute ref="pc:EntityNamespace"/>
-        <xs:attribute ref="pc:EntityName"/>
-        <xs:attribute ref="pc:SystemInstanceName"/>
-        <xs:attribute ref="pc:AssociationName"/>
-      </xs:complexType>
-    </xs:element>
-    <xs:attribute name="EntityNamespace" type="xs:string"/>
-    <xs:attribute name="EntityName" type="xs:string"/>
-    <xs:attribute name="SystemInstanceName" type="xs:string"/>
-    <xs:attribute name="AssociationName" type="xs:string"/>
-    <xs:element name="BDCEntity">
-      <xs:complexType>
-        <xs:sequence>
-          <xs:element ref="pc:EntityDisplayName" minOccurs="0"/>
-          <xs:element ref="pc:EntityInstanceReference" minOccurs="0"/>
-          <xs:element ref="pc:EntityId1" minOccurs="0"/>
-          <xs:element ref="pc:EntityId2" minOccurs="0"/>
-          <xs:element ref="pc:EntityId3" minOccurs="0"/>
-          <xs:element ref="pc:EntityId4" minOccurs="0"/>
-          <xs:element ref="pc:EntityId5" minOccurs="0"/>
-        </xs:sequence>
-      </xs:complexType>
-    </xs:element>
-    <xs:element name="EntityDisplayName" type="xs:string"/>
-    <xs:element name="EntityInstanceReference" type="xs:string"/>
-    <xs:element name="EntityId1" type="xs:string"/>
-    <xs:element name="EntityId2" type="xs:string"/>
-    <xs:element name="EntityId3" type="xs:string"/>
-    <xs:element name="EntityId4" type="xs:string"/>
-    <xs:element name="EntityId5" type="xs:string"/>
-    <xs:element name="Terms">
-      <xs:complexType>
-        <xs:sequence>
-          <xs:element ref="pc:TermInfo" minOccurs="0" maxOccurs="unbounded"/>
-        </xs:sequence>
-      </xs:complexType>
-    </xs:element>
-    <xs:element name="TermInfo">
-      <xs:complexType>
-        <xs:sequence>
-          <xs:element ref="pc:TermName" minOccurs="0"/>
-          <xs:element ref="pc:TermId" minOccurs="0"/>
-        </xs:sequence>
-      </xs:complexType>
-    </xs:element>
-    <xs:element name="TermName" type="xs:string"/>
-    <xs:element name="TermId" type="xs:string"/>
-  </xs:schema>
-</ct:contentTypeSchema>
+<p:properties xmlns:p="http://schemas.microsoft.com/office/2006/metadata/properties" xmlns:xsi="http://www.w3.org/2001/XMLSchema-instance" xmlns:pc="http://schemas.microsoft.com/office/infopath/2007/PartnerControls">
+  <documentManagement/>
+</p:properties>
 </file>
 
 <file path=customXml/item3.xml><?xml version="1.0" encoding="utf-8"?>
@@ -7626,9 +7494,141 @@
 </file>
 
 <file path=customXml/item4.xml><?xml version="1.0" encoding="utf-8"?>
-<p:properties xmlns:p="http://schemas.microsoft.com/office/2006/metadata/properties" xmlns:xsi="http://www.w3.org/2001/XMLSchema-instance" xmlns:pc="http://schemas.microsoft.com/office/infopath/2007/PartnerControls">
-  <documentManagement/>
-</p:properties>
+<ct:contentTypeSchema xmlns:ct="http://schemas.microsoft.com/office/2006/metadata/contentType" xmlns:ma="http://schemas.microsoft.com/office/2006/metadata/properties/metaAttributes" ct:_="" ma:_="" ma:contentTypeName="Document" ma:contentTypeID="0x010100E69987ED4D0F3F47BA33116175D6C093" ma:contentTypeVersion="3" ma:contentTypeDescription="Create a new document." ma:contentTypeScope="" ma:versionID="b377e87a9fdb0adfbe59c8cbc16d9e06">
+  <xsd:schema xmlns:xsd="http://www.w3.org/2001/XMLSchema" xmlns:xs="http://www.w3.org/2001/XMLSchema" xmlns:p="http://schemas.microsoft.com/office/2006/metadata/properties" xmlns:ns2="4d118d9b-448c-4a54-90d4-6d126d04e28f" targetNamespace="http://schemas.microsoft.com/office/2006/metadata/properties" ma:root="true" ma:fieldsID="142a0c039391e3f54e2425d6548dcea2" ns2:_="">
+    <xsd:import namespace="4d118d9b-448c-4a54-90d4-6d126d04e28f"/>
+    <xsd:element name="properties">
+      <xsd:complexType>
+        <xsd:sequence>
+          <xsd:element name="documentManagement">
+            <xsd:complexType>
+              <xsd:all>
+                <xsd:element ref="ns2:MediaServiceMetadata" minOccurs="0"/>
+                <xsd:element ref="ns2:MediaServiceFastMetadata" minOccurs="0"/>
+                <xsd:element ref="ns2:MediaServiceSearchProperties" minOccurs="0"/>
+              </xsd:all>
+            </xsd:complexType>
+          </xsd:element>
+        </xsd:sequence>
+      </xsd:complexType>
+    </xsd:element>
+  </xsd:schema>
+  <xsd:schema xmlns:xsd="http://www.w3.org/2001/XMLSchema" xmlns:xs="http://www.w3.org/2001/XMLSchema" xmlns:dms="http://schemas.microsoft.com/office/2006/documentManagement/types" xmlns:pc="http://schemas.microsoft.com/office/infopath/2007/PartnerControls" targetNamespace="4d118d9b-448c-4a54-90d4-6d126d04e28f" elementFormDefault="qualified">
+    <xsd:import namespace="http://schemas.microsoft.com/office/2006/documentManagement/types"/>
+    <xsd:import namespace="http://schemas.microsoft.com/office/infopath/2007/PartnerControls"/>
+    <xsd:element name="MediaServiceMetadata" ma:index="8" nillable="true" ma:displayName="MediaServiceMetadata" ma:hidden="true" ma:internalName="MediaServiceMetadata" ma:readOnly="true">
+      <xsd:simpleType>
+        <xsd:restriction base="dms:Note"/>
+      </xsd:simpleType>
+    </xsd:element>
+    <xsd:element name="MediaServiceFastMetadata" ma:index="9" nillable="true" ma:displayName="MediaServiceFastMetadata" ma:hidden="true" ma:internalName="MediaServiceFastMetadata" ma:readOnly="true">
+      <xsd:simpleType>
+        <xsd:restriction base="dms:Note"/>
+      </xsd:simpleType>
+    </xsd:element>
+    <xsd:element name="MediaServiceSearchProperties" ma:index="10" nillable="true" ma:displayName="MediaServiceSearchProperties" ma:hidden="true" ma:internalName="MediaServiceSearchProperties" ma:readOnly="true">
+      <xsd:simpleType>
+        <xsd:restriction base="dms:Note"/>
+      </xsd:simpleType>
+    </xsd:element>
+  </xsd:schema>
+  <xsd:schema xmlns="http://schemas.openxmlformats.org/package/2006/metadata/core-properties" xmlns:xsd="http://www.w3.org/2001/XMLSchema" xmlns:xsi="http://www.w3.org/2001/XMLSchema-instance" xmlns:dc="http://purl.org/dc/elements/1.1/" xmlns:dcterms="http://purl.org/dc/terms/" xmlns:odoc="http://schemas.microsoft.com/internal/obd" targetNamespace="http://schemas.openxmlformats.org/package/2006/metadata/core-properties" elementFormDefault="qualified" attributeFormDefault="unqualified" blockDefault="#all">
+    <xsd:import namespace="http://purl.org/dc/elements/1.1/" schemaLocation="http://dublincore.org/schemas/xmls/qdc/2003/04/02/dc.xsd"/>
+    <xsd:import namespace="http://purl.org/dc/terms/" schemaLocation="http://dublincore.org/schemas/xmls/qdc/2003/04/02/dcterms.xsd"/>
+    <xsd:element name="coreProperties" type="CT_coreProperties"/>
+    <xsd:complexType name="CT_coreProperties">
+      <xsd:all>
+        <xsd:element ref="dc:creator" minOccurs="0" maxOccurs="1"/>
+        <xsd:element ref="dcterms:created" minOccurs="0" maxOccurs="1"/>
+        <xsd:element ref="dc:identifier" minOccurs="0" maxOccurs="1"/>
+        <xsd:element name="contentType" minOccurs="0" maxOccurs="1" type="xsd:string" ma:index="0" ma:displayName="Content Type"/>
+        <xsd:element ref="dc:title" minOccurs="0" maxOccurs="1" ma:index="4" ma:displayName="Title"/>
+        <xsd:element ref="dc:subject" minOccurs="0" maxOccurs="1"/>
+        <xsd:element ref="dc:description" minOccurs="0" maxOccurs="1"/>
+        <xsd:element name="keywords" minOccurs="0" maxOccurs="1" type="xsd:string"/>
+        <xsd:element ref="dc:language" minOccurs="0" maxOccurs="1"/>
+        <xsd:element name="category" minOccurs="0" maxOccurs="1" type="xsd:string"/>
+        <xsd:element name="version" minOccurs="0" maxOccurs="1" type="xsd:string"/>
+        <xsd:element name="revision" minOccurs="0" maxOccurs="1" type="xsd:string">
+          <xsd:annotation>
+            <xsd:documentation>
+                        This value indicates the number of saves or revisions. The application is responsible for updating this value after each revision.
+                    </xsd:documentation>
+          </xsd:annotation>
+        </xsd:element>
+        <xsd:element name="lastModifiedBy" minOccurs="0" maxOccurs="1" type="xsd:string"/>
+        <xsd:element ref="dcterms:modified" minOccurs="0" maxOccurs="1"/>
+        <xsd:element name="contentStatus" minOccurs="0" maxOccurs="1" type="xsd:string"/>
+      </xsd:all>
+    </xsd:complexType>
+  </xsd:schema>
+  <xs:schema xmlns:pc="http://schemas.microsoft.com/office/infopath/2007/PartnerControls" xmlns:xs="http://www.w3.org/2001/XMLSchema" targetNamespace="http://schemas.microsoft.com/office/infopath/2007/PartnerControls" elementFormDefault="qualified" attributeFormDefault="unqualified">
+    <xs:element name="Person">
+      <xs:complexType>
+        <xs:sequence>
+          <xs:element ref="pc:DisplayName" minOccurs="0"/>
+          <xs:element ref="pc:AccountId" minOccurs="0"/>
+          <xs:element ref="pc:AccountType" minOccurs="0"/>
+        </xs:sequence>
+      </xs:complexType>
+    </xs:element>
+    <xs:element name="DisplayName" type="xs:string"/>
+    <xs:element name="AccountId" type="xs:string"/>
+    <xs:element name="AccountType" type="xs:string"/>
+    <xs:element name="BDCAssociatedEntity">
+      <xs:complexType>
+        <xs:sequence>
+          <xs:element ref="pc:BDCEntity" minOccurs="0" maxOccurs="unbounded"/>
+        </xs:sequence>
+        <xs:attribute ref="pc:EntityNamespace"/>
+        <xs:attribute ref="pc:EntityName"/>
+        <xs:attribute ref="pc:SystemInstanceName"/>
+        <xs:attribute ref="pc:AssociationName"/>
+      </xs:complexType>
+    </xs:element>
+    <xs:attribute name="EntityNamespace" type="xs:string"/>
+    <xs:attribute name="EntityName" type="xs:string"/>
+    <xs:attribute name="SystemInstanceName" type="xs:string"/>
+    <xs:attribute name="AssociationName" type="xs:string"/>
+    <xs:element name="BDCEntity">
+      <xs:complexType>
+        <xs:sequence>
+          <xs:element ref="pc:EntityDisplayName" minOccurs="0"/>
+          <xs:element ref="pc:EntityInstanceReference" minOccurs="0"/>
+          <xs:element ref="pc:EntityId1" minOccurs="0"/>
+          <xs:element ref="pc:EntityId2" minOccurs="0"/>
+          <xs:element ref="pc:EntityId3" minOccurs="0"/>
+          <xs:element ref="pc:EntityId4" minOccurs="0"/>
+          <xs:element ref="pc:EntityId5" minOccurs="0"/>
+        </xs:sequence>
+      </xs:complexType>
+    </xs:element>
+    <xs:element name="EntityDisplayName" type="xs:string"/>
+    <xs:element name="EntityInstanceReference" type="xs:string"/>
+    <xs:element name="EntityId1" type="xs:string"/>
+    <xs:element name="EntityId2" type="xs:string"/>
+    <xs:element name="EntityId3" type="xs:string"/>
+    <xs:element name="EntityId4" type="xs:string"/>
+    <xs:element name="EntityId5" type="xs:string"/>
+    <xs:element name="Terms">
+      <xs:complexType>
+        <xs:sequence>
+          <xs:element ref="pc:TermInfo" minOccurs="0" maxOccurs="unbounded"/>
+        </xs:sequence>
+      </xs:complexType>
+    </xs:element>
+    <xs:element name="TermInfo">
+      <xs:complexType>
+        <xs:sequence>
+          <xs:element ref="pc:TermName" minOccurs="0"/>
+          <xs:element ref="pc:TermId" minOccurs="0"/>
+        </xs:sequence>
+      </xs:complexType>
+    </xs:element>
+    <xs:element name="TermName" type="xs:string"/>
+    <xs:element name="TermId" type="xs:string"/>
+  </xs:schema>
+</ct:contentTypeSchema>
 </file>
 
 <file path=customXml/itemProps1.xml><?xml version="1.0" encoding="utf-8"?>
@@ -7640,19 +7640,10 @@
 </file>
 
 <file path=customXml/itemProps2.xml><?xml version="1.0" encoding="utf-8"?>
-<ds:datastoreItem xmlns:ds="http://schemas.openxmlformats.org/officeDocument/2006/customXml" ds:itemID="{10BB2122-50FB-4777-8728-D52F7CF1AED8}">
+<ds:datastoreItem xmlns:ds="http://schemas.openxmlformats.org/officeDocument/2006/customXml" ds:itemID="{9D39D6F7-DEC6-43E0-B150-2B295957F91D}">
   <ds:schemaRefs>
-    <ds:schemaRef ds:uri="4d118d9b-448c-4a54-90d4-6d126d04e28f"/>
-    <ds:schemaRef ds:uri="http://purl.org/dc/elements/1.1/"/>
-    <ds:schemaRef ds:uri="http://purl.org/dc/terms/"/>
-    <ds:schemaRef ds:uri="http://schemas.microsoft.com/internal/obd"/>
-    <ds:schemaRef ds:uri="http://schemas.microsoft.com/office/2006/documentManagement/types"/>
-    <ds:schemaRef ds:uri="http://schemas.microsoft.com/office/2006/metadata/contentType"/>
     <ds:schemaRef ds:uri="http://schemas.microsoft.com/office/2006/metadata/properties"/>
-    <ds:schemaRef ds:uri="http://schemas.microsoft.com/office/2006/metadata/properties/metaAttributes"/>
     <ds:schemaRef ds:uri="http://schemas.microsoft.com/office/infopath/2007/PartnerControls"/>
-    <ds:schemaRef ds:uri="http://schemas.openxmlformats.org/package/2006/metadata/core-properties"/>
-    <ds:schemaRef ds:uri="http://www.w3.org/2001/XMLSchema"/>
   </ds:schemaRefs>
 </ds:datastoreItem>
 </file>
@@ -7676,10 +7667,19 @@
 </file>
 
 <file path=customXml/itemProps4.xml><?xml version="1.0" encoding="utf-8"?>
-<ds:datastoreItem xmlns:ds="http://schemas.openxmlformats.org/officeDocument/2006/customXml" ds:itemID="{9D39D6F7-DEC6-43E0-B150-2B295957F91D}">
+<ds:datastoreItem xmlns:ds="http://schemas.openxmlformats.org/officeDocument/2006/customXml" ds:itemID="{10BB2122-50FB-4777-8728-D52F7CF1AED8}">
   <ds:schemaRefs>
+    <ds:schemaRef ds:uri="4d118d9b-448c-4a54-90d4-6d126d04e28f"/>
+    <ds:schemaRef ds:uri="http://purl.org/dc/elements/1.1/"/>
+    <ds:schemaRef ds:uri="http://purl.org/dc/terms/"/>
+    <ds:schemaRef ds:uri="http://schemas.microsoft.com/internal/obd"/>
+    <ds:schemaRef ds:uri="http://schemas.microsoft.com/office/2006/documentManagement/types"/>
+    <ds:schemaRef ds:uri="http://schemas.microsoft.com/office/2006/metadata/contentType"/>
     <ds:schemaRef ds:uri="http://schemas.microsoft.com/office/2006/metadata/properties"/>
+    <ds:schemaRef ds:uri="http://schemas.microsoft.com/office/2006/metadata/properties/metaAttributes"/>
     <ds:schemaRef ds:uri="http://schemas.microsoft.com/office/infopath/2007/PartnerControls"/>
+    <ds:schemaRef ds:uri="http://schemas.openxmlformats.org/package/2006/metadata/core-properties"/>
+    <ds:schemaRef ds:uri="http://www.w3.org/2001/XMLSchema"/>
   </ds:schemaRefs>
 </ds:datastoreItem>
 </file>
</xml_diff>

<commit_message>
Enhanced the script to generate user guide from Markdown files to support images and links
</commit_message>
<xml_diff>
--- a/assets/templates_pptx/UserGuideTemplate.pptx
+++ b/assets/templates_pptx/UserGuideTemplate.pptx
@@ -901,7 +901,7 @@
           <a:p>
             <a:fld id="{044512AF-DD4E-4B73-98EF-EA3A4CA19885}" type="datetimeFigureOut">
               <a:rPr lang="en-US" smtClean="0"/>
-              <a:t>2/18/2026</a:t>
+              <a:t>2/19/2026</a:t>
             </a:fld>
             <a:endParaRPr lang="en-US"/>
           </a:p>
@@ -1187,7 +1187,7 @@
           <a:p>
             <a:fld id="{5BCAD085-E8A6-8845-BD4E-CB4CCA059FC4}" type="datetimeFigureOut">
               <a:rPr lang="en-US" smtClean="0"/>
-              <a:t>2/18/2026</a:t>
+              <a:t>2/19/2026</a:t>
             </a:fld>
             <a:endParaRPr lang="en-US" dirty="0"/>
           </a:p>
@@ -1249,425 +1249,6 @@
 </file>
 
 <file path=ppt/slideLayouts/slideLayout10.xml><?xml version="1.0" encoding="utf-8"?>
-<p:sldLayout xmlns:a="http://schemas.openxmlformats.org/drawingml/2006/main" xmlns:r="http://schemas.openxmlformats.org/officeDocument/2006/relationships" xmlns:p="http://schemas.openxmlformats.org/presentationml/2006/main" type="twoTxTwoObj" preserve="1">
-  <p:cSld name="Comparison">
-    <p:spTree>
-      <p:nvGrpSpPr>
-        <p:cNvPr id="1" name=""/>
-        <p:cNvGrpSpPr/>
-        <p:nvPr/>
-      </p:nvGrpSpPr>
-      <p:grpSpPr>
-        <a:xfrm>
-          <a:off x="0" y="0"/>
-          <a:ext cx="0" cy="0"/>
-          <a:chOff x="0" y="0"/>
-          <a:chExt cx="0" cy="0"/>
-        </a:xfrm>
-      </p:grpSpPr>
-      <p:sp>
-        <p:nvSpPr>
-          <p:cNvPr id="2" name="Title 1"/>
-          <p:cNvSpPr>
-            <a:spLocks noGrp="1"/>
-          </p:cNvSpPr>
-          <p:nvPr>
-            <p:ph type="title"/>
-          </p:nvPr>
-        </p:nvSpPr>
-        <p:spPr/>
-        <p:txBody>
-          <a:bodyPr/>
-          <a:lstStyle>
-            <a:lvl1pPr>
-              <a:defRPr/>
-            </a:lvl1pPr>
-          </a:lstStyle>
-          <a:p>
-            <a:r>
-              <a:rPr lang="en-US"/>
-              <a:t>Click to edit Master title style</a:t>
-            </a:r>
-          </a:p>
-        </p:txBody>
-      </p:sp>
-      <p:sp>
-        <p:nvSpPr>
-          <p:cNvPr id="3" name="Text Placeholder 2"/>
-          <p:cNvSpPr>
-            <a:spLocks noGrp="1"/>
-          </p:cNvSpPr>
-          <p:nvPr>
-            <p:ph type="body" idx="1"/>
-          </p:nvPr>
-        </p:nvSpPr>
-        <p:spPr>
-          <a:xfrm>
-            <a:off x="457200" y="1535113"/>
-            <a:ext cx="4040188" cy="639762"/>
-          </a:xfrm>
-        </p:spPr>
-        <p:txBody>
-          <a:bodyPr anchor="b"/>
-          <a:lstStyle>
-            <a:lvl1pPr marL="0" indent="0">
-              <a:buNone/>
-              <a:defRPr sz="2400" b="1"/>
-            </a:lvl1pPr>
-            <a:lvl2pPr marL="457200" indent="0">
-              <a:buNone/>
-              <a:defRPr sz="2000" b="1"/>
-            </a:lvl2pPr>
-            <a:lvl3pPr marL="914400" indent="0">
-              <a:buNone/>
-              <a:defRPr sz="1800" b="1"/>
-            </a:lvl3pPr>
-            <a:lvl4pPr marL="1371600" indent="0">
-              <a:buNone/>
-              <a:defRPr sz="1600" b="1"/>
-            </a:lvl4pPr>
-            <a:lvl5pPr marL="1828800" indent="0">
-              <a:buNone/>
-              <a:defRPr sz="1600" b="1"/>
-            </a:lvl5pPr>
-            <a:lvl6pPr marL="2286000" indent="0">
-              <a:buNone/>
-              <a:defRPr sz="1600" b="1"/>
-            </a:lvl6pPr>
-            <a:lvl7pPr marL="2743200" indent="0">
-              <a:buNone/>
-              <a:defRPr sz="1600" b="1"/>
-            </a:lvl7pPr>
-            <a:lvl8pPr marL="3200400" indent="0">
-              <a:buNone/>
-              <a:defRPr sz="1600" b="1"/>
-            </a:lvl8pPr>
-            <a:lvl9pPr marL="3657600" indent="0">
-              <a:buNone/>
-              <a:defRPr sz="1600" b="1"/>
-            </a:lvl9pPr>
-          </a:lstStyle>
-          <a:p>
-            <a:pPr lvl="0"/>
-            <a:r>
-              <a:rPr lang="en-US"/>
-              <a:t>Click to edit Master text styles</a:t>
-            </a:r>
-          </a:p>
-        </p:txBody>
-      </p:sp>
-      <p:sp>
-        <p:nvSpPr>
-          <p:cNvPr id="4" name="Content Placeholder 3"/>
-          <p:cNvSpPr>
-            <a:spLocks noGrp="1"/>
-          </p:cNvSpPr>
-          <p:nvPr>
-            <p:ph sz="half" idx="2"/>
-          </p:nvPr>
-        </p:nvSpPr>
-        <p:spPr>
-          <a:xfrm>
-            <a:off x="457200" y="2174875"/>
-            <a:ext cx="4040188" cy="3951288"/>
-          </a:xfrm>
-        </p:spPr>
-        <p:txBody>
-          <a:bodyPr/>
-          <a:lstStyle>
-            <a:lvl1pPr>
-              <a:defRPr sz="2400"/>
-            </a:lvl1pPr>
-            <a:lvl2pPr>
-              <a:defRPr sz="2000"/>
-            </a:lvl2pPr>
-            <a:lvl3pPr>
-              <a:defRPr sz="1800"/>
-            </a:lvl3pPr>
-            <a:lvl4pPr>
-              <a:defRPr sz="1600"/>
-            </a:lvl4pPr>
-            <a:lvl5pPr>
-              <a:defRPr sz="1600"/>
-            </a:lvl5pPr>
-            <a:lvl6pPr>
-              <a:defRPr sz="1600"/>
-            </a:lvl6pPr>
-            <a:lvl7pPr>
-              <a:defRPr sz="1600"/>
-            </a:lvl7pPr>
-            <a:lvl8pPr>
-              <a:defRPr sz="1600"/>
-            </a:lvl8pPr>
-            <a:lvl9pPr>
-              <a:defRPr sz="1600"/>
-            </a:lvl9pPr>
-          </a:lstStyle>
-          <a:p>
-            <a:pPr lvl="0"/>
-            <a:r>
-              <a:rPr lang="en-US"/>
-              <a:t>Click to edit Master text styles</a:t>
-            </a:r>
-          </a:p>
-          <a:p>
-            <a:pPr lvl="1"/>
-            <a:r>
-              <a:rPr lang="en-US"/>
-              <a:t>Second level</a:t>
-            </a:r>
-          </a:p>
-          <a:p>
-            <a:pPr lvl="2"/>
-            <a:r>
-              <a:rPr lang="en-US"/>
-              <a:t>Third level</a:t>
-            </a:r>
-          </a:p>
-          <a:p>
-            <a:pPr lvl="3"/>
-            <a:r>
-              <a:rPr lang="en-US"/>
-              <a:t>Fourth level</a:t>
-            </a:r>
-          </a:p>
-          <a:p>
-            <a:pPr lvl="4"/>
-            <a:r>
-              <a:rPr lang="en-US"/>
-              <a:t>Fifth level</a:t>
-            </a:r>
-          </a:p>
-        </p:txBody>
-      </p:sp>
-      <p:sp>
-        <p:nvSpPr>
-          <p:cNvPr id="5" name="Text Placeholder 4"/>
-          <p:cNvSpPr>
-            <a:spLocks noGrp="1"/>
-          </p:cNvSpPr>
-          <p:nvPr>
-            <p:ph type="body" sz="quarter" idx="3"/>
-          </p:nvPr>
-        </p:nvSpPr>
-        <p:spPr>
-          <a:xfrm>
-            <a:off x="4645025" y="1535113"/>
-            <a:ext cx="4041775" cy="639762"/>
-          </a:xfrm>
-        </p:spPr>
-        <p:txBody>
-          <a:bodyPr anchor="b"/>
-          <a:lstStyle>
-            <a:lvl1pPr marL="0" indent="0">
-              <a:buNone/>
-              <a:defRPr sz="2400" b="1"/>
-            </a:lvl1pPr>
-            <a:lvl2pPr marL="457200" indent="0">
-              <a:buNone/>
-              <a:defRPr sz="2000" b="1"/>
-            </a:lvl2pPr>
-            <a:lvl3pPr marL="914400" indent="0">
-              <a:buNone/>
-              <a:defRPr sz="1800" b="1"/>
-            </a:lvl3pPr>
-            <a:lvl4pPr marL="1371600" indent="0">
-              <a:buNone/>
-              <a:defRPr sz="1600" b="1"/>
-            </a:lvl4pPr>
-            <a:lvl5pPr marL="1828800" indent="0">
-              <a:buNone/>
-              <a:defRPr sz="1600" b="1"/>
-            </a:lvl5pPr>
-            <a:lvl6pPr marL="2286000" indent="0">
-              <a:buNone/>
-              <a:defRPr sz="1600" b="1"/>
-            </a:lvl6pPr>
-            <a:lvl7pPr marL="2743200" indent="0">
-              <a:buNone/>
-              <a:defRPr sz="1600" b="1"/>
-            </a:lvl7pPr>
-            <a:lvl8pPr marL="3200400" indent="0">
-              <a:buNone/>
-              <a:defRPr sz="1600" b="1"/>
-            </a:lvl8pPr>
-            <a:lvl9pPr marL="3657600" indent="0">
-              <a:buNone/>
-              <a:defRPr sz="1600" b="1"/>
-            </a:lvl9pPr>
-          </a:lstStyle>
-          <a:p>
-            <a:pPr lvl="0"/>
-            <a:r>
-              <a:rPr lang="en-US"/>
-              <a:t>Click to edit Master text styles</a:t>
-            </a:r>
-          </a:p>
-        </p:txBody>
-      </p:sp>
-      <p:sp>
-        <p:nvSpPr>
-          <p:cNvPr id="6" name="Content Placeholder 5"/>
-          <p:cNvSpPr>
-            <a:spLocks noGrp="1"/>
-          </p:cNvSpPr>
-          <p:nvPr>
-            <p:ph sz="quarter" idx="4"/>
-          </p:nvPr>
-        </p:nvSpPr>
-        <p:spPr>
-          <a:xfrm>
-            <a:off x="4645025" y="2174875"/>
-            <a:ext cx="4041775" cy="3951288"/>
-          </a:xfrm>
-        </p:spPr>
-        <p:txBody>
-          <a:bodyPr/>
-          <a:lstStyle>
-            <a:lvl1pPr>
-              <a:defRPr sz="2400"/>
-            </a:lvl1pPr>
-            <a:lvl2pPr>
-              <a:defRPr sz="2000"/>
-            </a:lvl2pPr>
-            <a:lvl3pPr>
-              <a:defRPr sz="1800"/>
-            </a:lvl3pPr>
-            <a:lvl4pPr>
-              <a:defRPr sz="1600"/>
-            </a:lvl4pPr>
-            <a:lvl5pPr>
-              <a:defRPr sz="1600"/>
-            </a:lvl5pPr>
-            <a:lvl6pPr>
-              <a:defRPr sz="1600"/>
-            </a:lvl6pPr>
-            <a:lvl7pPr>
-              <a:defRPr sz="1600"/>
-            </a:lvl7pPr>
-            <a:lvl8pPr>
-              <a:defRPr sz="1600"/>
-            </a:lvl8pPr>
-            <a:lvl9pPr>
-              <a:defRPr sz="1600"/>
-            </a:lvl9pPr>
-          </a:lstStyle>
-          <a:p>
-            <a:pPr lvl="0"/>
-            <a:r>
-              <a:rPr lang="en-US"/>
-              <a:t>Click to edit Master text styles</a:t>
-            </a:r>
-          </a:p>
-          <a:p>
-            <a:pPr lvl="1"/>
-            <a:r>
-              <a:rPr lang="en-US"/>
-              <a:t>Second level</a:t>
-            </a:r>
-          </a:p>
-          <a:p>
-            <a:pPr lvl="2"/>
-            <a:r>
-              <a:rPr lang="en-US"/>
-              <a:t>Third level</a:t>
-            </a:r>
-          </a:p>
-          <a:p>
-            <a:pPr lvl="3"/>
-            <a:r>
-              <a:rPr lang="en-US"/>
-              <a:t>Fourth level</a:t>
-            </a:r>
-          </a:p>
-          <a:p>
-            <a:pPr lvl="4"/>
-            <a:r>
-              <a:rPr lang="en-US"/>
-              <a:t>Fifth level</a:t>
-            </a:r>
-          </a:p>
-        </p:txBody>
-      </p:sp>
-      <p:sp>
-        <p:nvSpPr>
-          <p:cNvPr id="7" name="Date Placeholder 6"/>
-          <p:cNvSpPr>
-            <a:spLocks noGrp="1"/>
-          </p:cNvSpPr>
-          <p:nvPr>
-            <p:ph type="dt" sz="half" idx="10"/>
-          </p:nvPr>
-        </p:nvSpPr>
-        <p:spPr/>
-        <p:txBody>
-          <a:bodyPr/>
-          <a:lstStyle/>
-          <a:p>
-            <a:fld id="{5BCAD085-E8A6-8845-BD4E-CB4CCA059FC4}" type="datetimeFigureOut">
-              <a:rPr lang="en-US" smtClean="0"/>
-              <a:t>2/18/2026</a:t>
-            </a:fld>
-            <a:endParaRPr lang="en-US"/>
-          </a:p>
-        </p:txBody>
-      </p:sp>
-      <p:sp>
-        <p:nvSpPr>
-          <p:cNvPr id="8" name="Footer Placeholder 7"/>
-          <p:cNvSpPr>
-            <a:spLocks noGrp="1"/>
-          </p:cNvSpPr>
-          <p:nvPr>
-            <p:ph type="ftr" sz="quarter" idx="11"/>
-          </p:nvPr>
-        </p:nvSpPr>
-        <p:spPr/>
-        <p:txBody>
-          <a:bodyPr/>
-          <a:lstStyle/>
-          <a:p>
-            <a:endParaRPr lang="en-US"/>
-          </a:p>
-        </p:txBody>
-      </p:sp>
-      <p:sp>
-        <p:nvSpPr>
-          <p:cNvPr id="9" name="Slide Number Placeholder 8"/>
-          <p:cNvSpPr>
-            <a:spLocks noGrp="1"/>
-          </p:cNvSpPr>
-          <p:nvPr>
-            <p:ph type="sldNum" sz="quarter" idx="12"/>
-          </p:nvPr>
-        </p:nvSpPr>
-        <p:spPr/>
-        <p:txBody>
-          <a:bodyPr/>
-          <a:lstStyle/>
-          <a:p>
-            <a:fld id="{C1FF6DA9-008F-8B48-92A6-B652298478BF}" type="slidenum">
-              <a:rPr lang="en-US" smtClean="0"/>
-              <a:t>‹#›</a:t>
-            </a:fld>
-            <a:endParaRPr lang="en-US"/>
-          </a:p>
-        </p:txBody>
-      </p:sp>
-    </p:spTree>
-    <p:extLst>
-      <p:ext uri="{BB962C8B-B14F-4D97-AF65-F5344CB8AC3E}">
-        <p14:creationId xmlns:p14="http://schemas.microsoft.com/office/powerpoint/2010/main" val="990158736"/>
-      </p:ext>
-    </p:extLst>
-  </p:cSld>
-  <p:clrMapOvr>
-    <a:masterClrMapping/>
-  </p:clrMapOvr>
-</p:sldLayout>
-</file>
-
-<file path=ppt/slideLayouts/slideLayout11.xml><?xml version="1.0" encoding="utf-8"?>
 <p:sldLayout xmlns:a="http://schemas.openxmlformats.org/drawingml/2006/main" xmlns:r="http://schemas.openxmlformats.org/officeDocument/2006/relationships" xmlns:p="http://schemas.openxmlformats.org/presentationml/2006/main" type="titleOnly" preserve="1">
   <p:cSld name="Title Only">
     <p:spTree>
@@ -1723,7 +1304,7 @@
           <a:p>
             <a:fld id="{5BCAD085-E8A6-8845-BD4E-CB4CCA059FC4}" type="datetimeFigureOut">
               <a:rPr lang="en-US" smtClean="0"/>
-              <a:t>2/18/2026</a:t>
+              <a:t>2/19/2026</a:t>
             </a:fld>
             <a:endParaRPr lang="en-US"/>
           </a:p>
@@ -1784,7 +1365,7 @@
 </p:sldLayout>
 </file>
 
-<file path=ppt/slideLayouts/slideLayout12.xml><?xml version="1.0" encoding="utf-8"?>
+<file path=ppt/slideLayouts/slideLayout11.xml><?xml version="1.0" encoding="utf-8"?>
 <p:sldLayout xmlns:a="http://schemas.openxmlformats.org/drawingml/2006/main" xmlns:r="http://schemas.openxmlformats.org/officeDocument/2006/relationships" xmlns:p="http://schemas.openxmlformats.org/presentationml/2006/main" type="blank" preserve="1">
   <p:cSld name="Blank">
     <p:spTree>
@@ -1818,7 +1399,7 @@
           <a:p>
             <a:fld id="{5BCAD085-E8A6-8845-BD4E-CB4CCA059FC4}" type="datetimeFigureOut">
               <a:rPr lang="en-US" smtClean="0"/>
-              <a:t>2/18/2026</a:t>
+              <a:t>2/19/2026</a:t>
             </a:fld>
             <a:endParaRPr lang="en-US"/>
           </a:p>
@@ -1879,7 +1460,7 @@
 </p:sldLayout>
 </file>
 
-<file path=ppt/slideLayouts/slideLayout13.xml><?xml version="1.0" encoding="utf-8"?>
+<file path=ppt/slideLayouts/slideLayout12.xml><?xml version="1.0" encoding="utf-8"?>
 <p:sldLayout xmlns:a="http://schemas.openxmlformats.org/drawingml/2006/main" xmlns:r="http://schemas.openxmlformats.org/officeDocument/2006/relationships" xmlns:p="http://schemas.openxmlformats.org/presentationml/2006/main" type="objTx" preserve="1">
   <p:cSld name="Content with Caption">
     <p:spTree>
@@ -2093,7 +1674,7 @@
           <a:p>
             <a:fld id="{5BCAD085-E8A6-8845-BD4E-CB4CCA059FC4}" type="datetimeFigureOut">
               <a:rPr lang="en-US" smtClean="0"/>
-              <a:t>2/18/2026</a:t>
+              <a:t>2/19/2026</a:t>
             </a:fld>
             <a:endParaRPr lang="en-US"/>
           </a:p>
@@ -2154,7 +1735,7 @@
 </p:sldLayout>
 </file>
 
-<file path=ppt/slideLayouts/slideLayout14.xml><?xml version="1.0" encoding="utf-8"?>
+<file path=ppt/slideLayouts/slideLayout13.xml><?xml version="1.0" encoding="utf-8"?>
 <p:sldLayout xmlns:a="http://schemas.openxmlformats.org/drawingml/2006/main" xmlns:r="http://schemas.openxmlformats.org/officeDocument/2006/relationships" xmlns:p="http://schemas.openxmlformats.org/presentationml/2006/main" type="picTx" preserve="1">
   <p:cSld name="Picture with Caption">
     <p:spTree>
@@ -2345,7 +1926,7 @@
           <a:p>
             <a:fld id="{5BCAD085-E8A6-8845-BD4E-CB4CCA059FC4}" type="datetimeFigureOut">
               <a:rPr lang="en-US" smtClean="0"/>
-              <a:t>2/18/2026</a:t>
+              <a:t>2/19/2026</a:t>
             </a:fld>
             <a:endParaRPr lang="en-US"/>
           </a:p>
@@ -2406,7 +1987,7 @@
 </p:sldLayout>
 </file>
 
-<file path=ppt/slideLayouts/slideLayout15.xml><?xml version="1.0" encoding="utf-8"?>
+<file path=ppt/slideLayouts/slideLayout14.xml><?xml version="1.0" encoding="utf-8"?>
 <p:sldLayout xmlns:a="http://schemas.openxmlformats.org/drawingml/2006/main" xmlns:r="http://schemas.openxmlformats.org/officeDocument/2006/relationships" xmlns:p="http://schemas.openxmlformats.org/presentationml/2006/main" type="vertTx" preserve="1">
   <p:cSld name="Title and Vertical Text">
     <p:spTree>
@@ -2513,7 +2094,7 @@
           <a:p>
             <a:fld id="{5BCAD085-E8A6-8845-BD4E-CB4CCA059FC4}" type="datetimeFigureOut">
               <a:rPr lang="en-US" smtClean="0"/>
-              <a:t>2/18/2026</a:t>
+              <a:t>2/19/2026</a:t>
             </a:fld>
             <a:endParaRPr lang="en-US"/>
           </a:p>
@@ -2574,7 +2155,7 @@
 </p:sldLayout>
 </file>
 
-<file path=ppt/slideLayouts/slideLayout16.xml><?xml version="1.0" encoding="utf-8"?>
+<file path=ppt/slideLayouts/slideLayout15.xml><?xml version="1.0" encoding="utf-8"?>
 <p:sldLayout xmlns:a="http://schemas.openxmlformats.org/drawingml/2006/main" xmlns:r="http://schemas.openxmlformats.org/officeDocument/2006/relationships" xmlns:p="http://schemas.openxmlformats.org/presentationml/2006/main" type="vertTitleAndTx" preserve="1">
   <p:cSld name="Vertical Title and Text">
     <p:spTree>
@@ -2691,7 +2272,7 @@
           <a:p>
             <a:fld id="{5BCAD085-E8A6-8845-BD4E-CB4CCA059FC4}" type="datetimeFigureOut">
               <a:rPr lang="en-US" smtClean="0"/>
-              <a:t>2/18/2026</a:t>
+              <a:t>2/19/2026</a:t>
             </a:fld>
             <a:endParaRPr lang="en-US"/>
           </a:p>
@@ -2928,8 +2509,8 @@
 </file>
 
 <file path=ppt/slideLayouts/slideLayout3.xml><?xml version="1.0" encoding="utf-8"?>
-<p:sldLayout xmlns:a="http://schemas.openxmlformats.org/drawingml/2006/main" xmlns:r="http://schemas.openxmlformats.org/officeDocument/2006/relationships" xmlns:p="http://schemas.openxmlformats.org/presentationml/2006/main" type="obj" preserve="1">
-  <p:cSld name="6_Title and Content">
+<p:sldLayout xmlns:a="http://schemas.openxmlformats.org/drawingml/2006/main" xmlns:r="http://schemas.openxmlformats.org/officeDocument/2006/relationships" xmlns:p="http://schemas.openxmlformats.org/presentationml/2006/main" preserve="1" userDrawn="1">
+  <p:cSld name="2_Title and Content">
     <p:bg>
       <p:bgPr>
         <a:solidFill>
@@ -2952,550 +2533,6 @@
           <a:chExt cx="0" cy="0"/>
         </a:xfrm>
       </p:grpSpPr>
-      <p:sp useBgFill="1">
-        <p:nvSpPr>
-          <p:cNvPr id="9" name="Rectangle 8">
-            <a:extLst>
-              <a:ext uri="{FF2B5EF4-FFF2-40B4-BE49-F238E27FC236}">
-                <a16:creationId xmlns:a16="http://schemas.microsoft.com/office/drawing/2014/main" id="{E72DE59C-594C-4F72-46B6-37F8C2F620BF}"/>
-              </a:ext>
-              <a:ext uri="{C183D7F6-B498-43B3-948B-1728B52AA6E4}">
-                <adec:decorative xmlns:adec="http://schemas.microsoft.com/office/drawing/2017/decorative" val="1"/>
-              </a:ext>
-            </a:extLst>
-          </p:cNvPr>
-          <p:cNvSpPr/>
-          <p:nvPr userDrawn="1">
-            <p:extLst>
-              <p:ext uri="{386F3935-93C4-4BCD-93E2-E3B085C9AB24}">
-                <p16:designElem xmlns:p16="http://schemas.microsoft.com/office/powerpoint/2015/main" val="1"/>
-              </p:ext>
-            </p:extLst>
-          </p:nvPr>
-        </p:nvSpPr>
-        <p:spPr>
-          <a:xfrm>
-            <a:off x="44577" y="-190005"/>
-            <a:ext cx="9141714" cy="6858000"/>
-          </a:xfrm>
-          <a:prstGeom prst="rect">
-            <a:avLst/>
-          </a:prstGeom>
-          <a:ln>
-            <a:noFill/>
-          </a:ln>
-        </p:spPr>
-        <p:style>
-          <a:lnRef idx="2">
-            <a:schemeClr val="accent1">
-              <a:shade val="50000"/>
-            </a:schemeClr>
-          </a:lnRef>
-          <a:fillRef idx="1">
-            <a:schemeClr val="accent1"/>
-          </a:fillRef>
-          <a:effectRef idx="0">
-            <a:schemeClr val="accent1"/>
-          </a:effectRef>
-          <a:fontRef idx="minor">
-            <a:schemeClr val="lt1"/>
-          </a:fontRef>
-        </p:style>
-        <p:txBody>
-          <a:bodyPr rtlCol="0" anchor="ctr"/>
-          <a:lstStyle/>
-          <a:p>
-            <a:pPr algn="ctr"/>
-            <a:endParaRPr lang="en-US"/>
-          </a:p>
-        </p:txBody>
-      </p:sp>
-      <p:sp>
-        <p:nvSpPr>
-          <p:cNvPr id="10" name="sketch line">
-            <a:extLst>
-              <a:ext uri="{FF2B5EF4-FFF2-40B4-BE49-F238E27FC236}">
-                <a16:creationId xmlns:a16="http://schemas.microsoft.com/office/drawing/2014/main" id="{A6B0B038-C0F6-CB78-FEF0-A37A717B516C}"/>
-              </a:ext>
-              <a:ext uri="{C183D7F6-B498-43B3-948B-1728B52AA6E4}">
-                <adec:decorative xmlns:adec="http://schemas.microsoft.com/office/drawing/2017/decorative" val="1"/>
-              </a:ext>
-            </a:extLst>
-          </p:cNvPr>
-          <p:cNvSpPr/>
-          <p:nvPr userDrawn="1">
-            <p:extLst>
-              <p:ext uri="{386F3935-93C4-4BCD-93E2-E3B085C9AB24}">
-                <p16:designElem xmlns:p16="http://schemas.microsoft.com/office/powerpoint/2015/main" val="1"/>
-              </p:ext>
-            </p:extLst>
-          </p:nvPr>
-        </p:nvSpPr>
-        <p:spPr>
-          <a:xfrm>
-            <a:off x="546354" y="1487368"/>
-            <a:ext cx="8140446" cy="18288"/>
-          </a:xfrm>
-          <a:custGeom>
-            <a:avLst/>
-            <a:gdLst>
-              <a:gd name="csX0" fmla="*/ 0 w 8140446"/>
-              <a:gd name="csY0" fmla="*/ 0 h 18288"/>
-              <a:gd name="csX1" fmla="*/ 434157 w 8140446"/>
-              <a:gd name="csY1" fmla="*/ 0 h 18288"/>
-              <a:gd name="csX2" fmla="*/ 1193932 w 8140446"/>
-              <a:gd name="csY2" fmla="*/ 0 h 18288"/>
-              <a:gd name="csX3" fmla="*/ 1628089 w 8140446"/>
-              <a:gd name="csY3" fmla="*/ 0 h 18288"/>
-              <a:gd name="csX4" fmla="*/ 2225055 w 8140446"/>
-              <a:gd name="csY4" fmla="*/ 0 h 18288"/>
-              <a:gd name="csX5" fmla="*/ 3066235 w 8140446"/>
-              <a:gd name="csY5" fmla="*/ 0 h 18288"/>
-              <a:gd name="csX6" fmla="*/ 3744605 w 8140446"/>
-              <a:gd name="csY6" fmla="*/ 0 h 18288"/>
-              <a:gd name="csX7" fmla="*/ 4504380 w 8140446"/>
-              <a:gd name="csY7" fmla="*/ 0 h 18288"/>
-              <a:gd name="csX8" fmla="*/ 5101346 w 8140446"/>
-              <a:gd name="csY8" fmla="*/ 0 h 18288"/>
-              <a:gd name="csX9" fmla="*/ 5779717 w 8140446"/>
-              <a:gd name="csY9" fmla="*/ 0 h 18288"/>
-              <a:gd name="csX10" fmla="*/ 6620896 w 8140446"/>
-              <a:gd name="csY10" fmla="*/ 0 h 18288"/>
-              <a:gd name="csX11" fmla="*/ 7136458 w 8140446"/>
-              <a:gd name="csY11" fmla="*/ 0 h 18288"/>
-              <a:gd name="csX12" fmla="*/ 8140446 w 8140446"/>
-              <a:gd name="csY12" fmla="*/ 0 h 18288"/>
-              <a:gd name="csX13" fmla="*/ 8140446 w 8140446"/>
-              <a:gd name="csY13" fmla="*/ 18288 h 18288"/>
-              <a:gd name="csX14" fmla="*/ 7543480 w 8140446"/>
-              <a:gd name="csY14" fmla="*/ 18288 h 18288"/>
-              <a:gd name="csX15" fmla="*/ 7109323 w 8140446"/>
-              <a:gd name="csY15" fmla="*/ 18288 h 18288"/>
-              <a:gd name="csX16" fmla="*/ 6430952 w 8140446"/>
-              <a:gd name="csY16" fmla="*/ 18288 h 18288"/>
-              <a:gd name="csX17" fmla="*/ 5915391 w 8140446"/>
-              <a:gd name="csY17" fmla="*/ 18288 h 18288"/>
-              <a:gd name="csX18" fmla="*/ 5237020 w 8140446"/>
-              <a:gd name="csY18" fmla="*/ 18288 h 18288"/>
-              <a:gd name="csX19" fmla="*/ 4558650 w 8140446"/>
-              <a:gd name="csY19" fmla="*/ 18288 h 18288"/>
-              <a:gd name="csX20" fmla="*/ 3880279 w 8140446"/>
-              <a:gd name="csY20" fmla="*/ 18288 h 18288"/>
-              <a:gd name="csX21" fmla="*/ 3201909 w 8140446"/>
-              <a:gd name="csY21" fmla="*/ 18288 h 18288"/>
-              <a:gd name="csX22" fmla="*/ 2604943 w 8140446"/>
-              <a:gd name="csY22" fmla="*/ 18288 h 18288"/>
-              <a:gd name="csX23" fmla="*/ 1845168 w 8140446"/>
-              <a:gd name="csY23" fmla="*/ 18288 h 18288"/>
-              <a:gd name="csX24" fmla="*/ 1166797 w 8140446"/>
-              <a:gd name="csY24" fmla="*/ 18288 h 18288"/>
-              <a:gd name="csX25" fmla="*/ 0 w 8140446"/>
-              <a:gd name="csY25" fmla="*/ 18288 h 18288"/>
-              <a:gd name="csX26" fmla="*/ 0 w 8140446"/>
-              <a:gd name="csY26" fmla="*/ 0 h 18288"/>
-            </a:gdLst>
-            <a:ahLst/>
-            <a:cxnLst>
-              <a:cxn ang="0">
-                <a:pos x="csX0" y="csY0"/>
-              </a:cxn>
-              <a:cxn ang="0">
-                <a:pos x="csX1" y="csY1"/>
-              </a:cxn>
-              <a:cxn ang="0">
-                <a:pos x="csX2" y="csY2"/>
-              </a:cxn>
-              <a:cxn ang="0">
-                <a:pos x="csX3" y="csY3"/>
-              </a:cxn>
-              <a:cxn ang="0">
-                <a:pos x="csX4" y="csY4"/>
-              </a:cxn>
-              <a:cxn ang="0">
-                <a:pos x="csX5" y="csY5"/>
-              </a:cxn>
-              <a:cxn ang="0">
-                <a:pos x="csX6" y="csY6"/>
-              </a:cxn>
-              <a:cxn ang="0">
-                <a:pos x="csX7" y="csY7"/>
-              </a:cxn>
-              <a:cxn ang="0">
-                <a:pos x="csX8" y="csY8"/>
-              </a:cxn>
-              <a:cxn ang="0">
-                <a:pos x="csX9" y="csY9"/>
-              </a:cxn>
-              <a:cxn ang="0">
-                <a:pos x="csX10" y="csY10"/>
-              </a:cxn>
-              <a:cxn ang="0">
-                <a:pos x="csX11" y="csY11"/>
-              </a:cxn>
-              <a:cxn ang="0">
-                <a:pos x="csX12" y="csY12"/>
-              </a:cxn>
-              <a:cxn ang="0">
-                <a:pos x="csX13" y="csY13"/>
-              </a:cxn>
-              <a:cxn ang="0">
-                <a:pos x="csX14" y="csY14"/>
-              </a:cxn>
-              <a:cxn ang="0">
-                <a:pos x="csX15" y="csY15"/>
-              </a:cxn>
-              <a:cxn ang="0">
-                <a:pos x="csX16" y="csY16"/>
-              </a:cxn>
-              <a:cxn ang="0">
-                <a:pos x="csX17" y="csY17"/>
-              </a:cxn>
-              <a:cxn ang="0">
-                <a:pos x="csX18" y="csY18"/>
-              </a:cxn>
-              <a:cxn ang="0">
-                <a:pos x="csX19" y="csY19"/>
-              </a:cxn>
-              <a:cxn ang="0">
-                <a:pos x="csX20" y="csY20"/>
-              </a:cxn>
-              <a:cxn ang="0">
-                <a:pos x="csX21" y="csY21"/>
-              </a:cxn>
-              <a:cxn ang="0">
-                <a:pos x="csX22" y="csY22"/>
-              </a:cxn>
-              <a:cxn ang="0">
-                <a:pos x="csX23" y="csY23"/>
-              </a:cxn>
-              <a:cxn ang="0">
-                <a:pos x="csX24" y="csY24"/>
-              </a:cxn>
-              <a:cxn ang="0">
-                <a:pos x="csX25" y="csY25"/>
-              </a:cxn>
-              <a:cxn ang="0">
-                <a:pos x="csX26" y="csY26"/>
-              </a:cxn>
-            </a:cxnLst>
-            <a:rect l="l" t="t" r="r" b="b"/>
-            <a:pathLst>
-              <a:path w="8140446" h="18288" fill="none" extrusionOk="0">
-                <a:moveTo>
-                  <a:pt x="0" y="0"/>
-                </a:moveTo>
-                <a:cubicBezTo>
-                  <a:pt x="94920" y="9103"/>
-                  <a:pt x="287892" y="-4966"/>
-                  <a:pt x="434157" y="0"/>
-                </a:cubicBezTo>
-                <a:cubicBezTo>
-                  <a:pt x="580422" y="4966"/>
-                  <a:pt x="943595" y="-14182"/>
-                  <a:pt x="1193932" y="0"/>
-                </a:cubicBezTo>
-                <a:cubicBezTo>
-                  <a:pt x="1444270" y="14182"/>
-                  <a:pt x="1472129" y="5523"/>
-                  <a:pt x="1628089" y="0"/>
-                </a:cubicBezTo>
-                <a:cubicBezTo>
-                  <a:pt x="1784049" y="-5523"/>
-                  <a:pt x="1962419" y="-17322"/>
-                  <a:pt x="2225055" y="0"/>
-                </a:cubicBezTo>
-                <a:cubicBezTo>
-                  <a:pt x="2487691" y="17322"/>
-                  <a:pt x="2700681" y="1311"/>
-                  <a:pt x="3066235" y="0"/>
-                </a:cubicBezTo>
-                <a:cubicBezTo>
-                  <a:pt x="3431789" y="-1311"/>
-                  <a:pt x="3405662" y="25081"/>
-                  <a:pt x="3744605" y="0"/>
-                </a:cubicBezTo>
-                <a:cubicBezTo>
-                  <a:pt x="4083548" y="-25081"/>
-                  <a:pt x="4265111" y="-11945"/>
-                  <a:pt x="4504380" y="0"/>
-                </a:cubicBezTo>
-                <a:cubicBezTo>
-                  <a:pt x="4743649" y="11945"/>
-                  <a:pt x="4860394" y="-2832"/>
-                  <a:pt x="5101346" y="0"/>
-                </a:cubicBezTo>
-                <a:cubicBezTo>
-                  <a:pt x="5342298" y="2832"/>
-                  <a:pt x="5456387" y="23676"/>
-                  <a:pt x="5779717" y="0"/>
-                </a:cubicBezTo>
-                <a:cubicBezTo>
-                  <a:pt x="6103047" y="-23676"/>
-                  <a:pt x="6270379" y="-37291"/>
-                  <a:pt x="6620896" y="0"/>
-                </a:cubicBezTo>
-                <a:cubicBezTo>
-                  <a:pt x="6971413" y="37291"/>
-                  <a:pt x="6989068" y="24674"/>
-                  <a:pt x="7136458" y="0"/>
-                </a:cubicBezTo>
-                <a:cubicBezTo>
-                  <a:pt x="7283848" y="-24674"/>
-                  <a:pt x="7752532" y="-22436"/>
-                  <a:pt x="8140446" y="0"/>
-                </a:cubicBezTo>
-                <a:cubicBezTo>
-                  <a:pt x="8140314" y="7702"/>
-                  <a:pt x="8140234" y="13511"/>
-                  <a:pt x="8140446" y="18288"/>
-                </a:cubicBezTo>
-                <a:cubicBezTo>
-                  <a:pt x="7906329" y="-3043"/>
-                  <a:pt x="7681180" y="27465"/>
-                  <a:pt x="7543480" y="18288"/>
-                </a:cubicBezTo>
-                <a:cubicBezTo>
-                  <a:pt x="7405780" y="9111"/>
-                  <a:pt x="7216607" y="3660"/>
-                  <a:pt x="7109323" y="18288"/>
-                </a:cubicBezTo>
-                <a:cubicBezTo>
-                  <a:pt x="7002039" y="32916"/>
-                  <a:pt x="6576231" y="42692"/>
-                  <a:pt x="6430952" y="18288"/>
-                </a:cubicBezTo>
-                <a:cubicBezTo>
-                  <a:pt x="6285673" y="-6116"/>
-                  <a:pt x="6138840" y="34521"/>
-                  <a:pt x="5915391" y="18288"/>
-                </a:cubicBezTo>
-                <a:cubicBezTo>
-                  <a:pt x="5691942" y="2055"/>
-                  <a:pt x="5459460" y="51666"/>
-                  <a:pt x="5237020" y="18288"/>
-                </a:cubicBezTo>
-                <a:cubicBezTo>
-                  <a:pt x="5014580" y="-15090"/>
-                  <a:pt x="4747677" y="40449"/>
-                  <a:pt x="4558650" y="18288"/>
-                </a:cubicBezTo>
-                <a:cubicBezTo>
-                  <a:pt x="4369623" y="-3873"/>
-                  <a:pt x="4146061" y="12568"/>
-                  <a:pt x="3880279" y="18288"/>
-                </a:cubicBezTo>
-                <a:cubicBezTo>
-                  <a:pt x="3614497" y="24008"/>
-                  <a:pt x="3473808" y="-12908"/>
-                  <a:pt x="3201909" y="18288"/>
-                </a:cubicBezTo>
-                <a:cubicBezTo>
-                  <a:pt x="2930010" y="49484"/>
-                  <a:pt x="2728175" y="-3430"/>
-                  <a:pt x="2604943" y="18288"/>
-                </a:cubicBezTo>
-                <a:cubicBezTo>
-                  <a:pt x="2481711" y="40006"/>
-                  <a:pt x="2004334" y="26952"/>
-                  <a:pt x="1845168" y="18288"/>
-                </a:cubicBezTo>
-                <a:cubicBezTo>
-                  <a:pt x="1686003" y="9624"/>
-                  <a:pt x="1375070" y="37580"/>
-                  <a:pt x="1166797" y="18288"/>
-                </a:cubicBezTo>
-                <a:cubicBezTo>
-                  <a:pt x="958524" y="-1004"/>
-                  <a:pt x="342846" y="8880"/>
-                  <a:pt x="0" y="18288"/>
-                </a:cubicBezTo>
-                <a:cubicBezTo>
-                  <a:pt x="129" y="13298"/>
-                  <a:pt x="-675" y="6857"/>
-                  <a:pt x="0" y="0"/>
-                </a:cubicBezTo>
-                <a:close/>
-              </a:path>
-              <a:path w="8140446" h="18288" stroke="0" extrusionOk="0">
-                <a:moveTo>
-                  <a:pt x="0" y="0"/>
-                </a:moveTo>
-                <a:cubicBezTo>
-                  <a:pt x="142435" y="-24533"/>
-                  <a:pt x="380026" y="17447"/>
-                  <a:pt x="596966" y="0"/>
-                </a:cubicBezTo>
-                <a:cubicBezTo>
-                  <a:pt x="813906" y="-17447"/>
-                  <a:pt x="830530" y="13462"/>
-                  <a:pt x="1031123" y="0"/>
-                </a:cubicBezTo>
-                <a:cubicBezTo>
-                  <a:pt x="1231716" y="-13462"/>
-                  <a:pt x="1634038" y="0"/>
-                  <a:pt x="1872303" y="0"/>
-                </a:cubicBezTo>
-                <a:cubicBezTo>
-                  <a:pt x="2110568" y="0"/>
-                  <a:pt x="2261934" y="-25727"/>
-                  <a:pt x="2469269" y="0"/>
-                </a:cubicBezTo>
-                <a:cubicBezTo>
-                  <a:pt x="2676604" y="25727"/>
-                  <a:pt x="2790440" y="16284"/>
-                  <a:pt x="3066235" y="0"/>
-                </a:cubicBezTo>
-                <a:cubicBezTo>
-                  <a:pt x="3342030" y="-16284"/>
-                  <a:pt x="3685603" y="41976"/>
-                  <a:pt x="3907414" y="0"/>
-                </a:cubicBezTo>
-                <a:cubicBezTo>
-                  <a:pt x="4129225" y="-41976"/>
-                  <a:pt x="4177416" y="-7598"/>
-                  <a:pt x="4422976" y="0"/>
-                </a:cubicBezTo>
-                <a:cubicBezTo>
-                  <a:pt x="4668536" y="7598"/>
-                  <a:pt x="5023499" y="-28058"/>
-                  <a:pt x="5264155" y="0"/>
-                </a:cubicBezTo>
-                <a:cubicBezTo>
-                  <a:pt x="5504811" y="28058"/>
-                  <a:pt x="5703675" y="13288"/>
-                  <a:pt x="6105335" y="0"/>
-                </a:cubicBezTo>
-                <a:cubicBezTo>
-                  <a:pt x="6506995" y="-13288"/>
-                  <a:pt x="6455516" y="-5124"/>
-                  <a:pt x="6783705" y="0"/>
-                </a:cubicBezTo>
-                <a:cubicBezTo>
-                  <a:pt x="7111894" y="5124"/>
-                  <a:pt x="7512856" y="10604"/>
-                  <a:pt x="8140446" y="0"/>
-                </a:cubicBezTo>
-                <a:cubicBezTo>
-                  <a:pt x="8140458" y="8833"/>
-                  <a:pt x="8140986" y="9830"/>
-                  <a:pt x="8140446" y="18288"/>
-                </a:cubicBezTo>
-                <a:cubicBezTo>
-                  <a:pt x="7959314" y="3345"/>
-                  <a:pt x="7870113" y="10437"/>
-                  <a:pt x="7706289" y="18288"/>
-                </a:cubicBezTo>
-                <a:cubicBezTo>
-                  <a:pt x="7542465" y="26139"/>
-                  <a:pt x="7157940" y="17482"/>
-                  <a:pt x="6865109" y="18288"/>
-                </a:cubicBezTo>
-                <a:cubicBezTo>
-                  <a:pt x="6572278" y="19094"/>
-                  <a:pt x="6524256" y="38051"/>
-                  <a:pt x="6349548" y="18288"/>
-                </a:cubicBezTo>
-                <a:cubicBezTo>
-                  <a:pt x="6174840" y="-1475"/>
-                  <a:pt x="5951624" y="174"/>
-                  <a:pt x="5671177" y="18288"/>
-                </a:cubicBezTo>
-                <a:cubicBezTo>
-                  <a:pt x="5390730" y="36402"/>
-                  <a:pt x="5222992" y="60058"/>
-                  <a:pt x="4829998" y="18288"/>
-                </a:cubicBezTo>
-                <a:cubicBezTo>
-                  <a:pt x="4437004" y="-23482"/>
-                  <a:pt x="4344181" y="39087"/>
-                  <a:pt x="4151627" y="18288"/>
-                </a:cubicBezTo>
-                <a:cubicBezTo>
-                  <a:pt x="3959073" y="-2511"/>
-                  <a:pt x="3886970" y="32875"/>
-                  <a:pt x="3717470" y="18288"/>
-                </a:cubicBezTo>
-                <a:cubicBezTo>
-                  <a:pt x="3547970" y="3701"/>
-                  <a:pt x="3451521" y="31872"/>
-                  <a:pt x="3201909" y="18288"/>
-                </a:cubicBezTo>
-                <a:cubicBezTo>
-                  <a:pt x="2952297" y="4704"/>
-                  <a:pt x="2543413" y="6029"/>
-                  <a:pt x="2360729" y="18288"/>
-                </a:cubicBezTo>
-                <a:cubicBezTo>
-                  <a:pt x="2178045" y="30547"/>
-                  <a:pt x="1906056" y="25847"/>
-                  <a:pt x="1682359" y="18288"/>
-                </a:cubicBezTo>
-                <a:cubicBezTo>
-                  <a:pt x="1458662" y="10730"/>
-                  <a:pt x="1330405" y="8046"/>
-                  <a:pt x="1166797" y="18288"/>
-                </a:cubicBezTo>
-                <a:cubicBezTo>
-                  <a:pt x="1003189" y="28530"/>
-                  <a:pt x="278098" y="19533"/>
-                  <a:pt x="0" y="18288"/>
-                </a:cubicBezTo>
-                <a:cubicBezTo>
-                  <a:pt x="74" y="14054"/>
-                  <a:pt x="-46" y="6997"/>
-                  <a:pt x="0" y="0"/>
-                </a:cubicBezTo>
-                <a:close/>
-              </a:path>
-            </a:pathLst>
-          </a:custGeom>
-          <a:solidFill>
-            <a:schemeClr val="accent2"/>
-          </a:solidFill>
-          <a:ln w="41275" cap="rnd">
-            <a:solidFill>
-              <a:schemeClr val="accent2"/>
-            </a:solidFill>
-            <a:round/>
-            <a:extLst>
-              <a:ext uri="{C807C97D-BFC1-408E-A445-0C87EB9F89A2}">
-                <ask:lineSketchStyleProps xmlns:ask="http://schemas.microsoft.com/office/drawing/2018/sketchyshapes" sd="1219033472">
-                  <a:prstGeom prst="rect">
-                    <a:avLst/>
-                  </a:prstGeom>
-                  <ask:type>
-                    <ask:lineSketchFreehand/>
-                  </ask:type>
-                </ask:lineSketchStyleProps>
-              </a:ext>
-            </a:extLst>
-          </a:ln>
-        </p:spPr>
-        <p:style>
-          <a:lnRef idx="2">
-            <a:schemeClr val="accent1">
-              <a:shade val="50000"/>
-            </a:schemeClr>
-          </a:lnRef>
-          <a:fillRef idx="1">
-            <a:schemeClr val="accent1"/>
-          </a:fillRef>
-          <a:effectRef idx="0">
-            <a:schemeClr val="accent1"/>
-          </a:effectRef>
-          <a:fontRef idx="minor">
-            <a:schemeClr val="lt1"/>
-          </a:fontRef>
-        </p:style>
-        <p:txBody>
-          <a:bodyPr rtlCol="0" anchor="ctr"/>
-          <a:lstStyle/>
-          <a:p>
-            <a:pPr algn="ctr"/>
-            <a:endParaRPr lang="en-US"/>
-          </a:p>
-        </p:txBody>
-      </p:sp>
       <p:sp>
         <p:nvSpPr>
           <p:cNvPr id="2" name="Title 1"/>
@@ -3536,8 +2573,8 @@
         </p:nvSpPr>
         <p:spPr>
           <a:xfrm>
-            <a:off x="457200" y="1600200"/>
-            <a:ext cx="8229600" cy="5105400"/>
+            <a:off x="457200" y="1706033"/>
+            <a:ext cx="4076700" cy="4971032"/>
           </a:xfrm>
         </p:spPr>
         <p:txBody>
@@ -3545,7 +2582,7 @@
             <a:normAutofit/>
           </a:bodyPr>
           <a:lstStyle>
-            <a:lvl1pPr>
+            <a:lvl1pPr marL="0">
               <a:buNone/>
               <a:defRPr sz="2000"/>
             </a:lvl1pPr>
@@ -3603,10 +2640,125 @@
           </a:p>
         </p:txBody>
       </p:sp>
+      <p:pic>
+        <p:nvPicPr>
+          <p:cNvPr id="5" name="Picture 4">
+            <a:extLst>
+              <a:ext uri="{FF2B5EF4-FFF2-40B4-BE49-F238E27FC236}">
+                <a16:creationId xmlns:a16="http://schemas.microsoft.com/office/drawing/2014/main" id="{D83E45CF-487E-D805-AC82-E9F89743BFD2}"/>
+              </a:ext>
+            </a:extLst>
+          </p:cNvPr>
+          <p:cNvPicPr>
+            <a:picLocks noChangeAspect="1"/>
+          </p:cNvPicPr>
+          <p:nvPr userDrawn="1"/>
+        </p:nvPicPr>
+        <p:blipFill>
+          <a:blip r:embed="rId3"/>
+          <a:stretch>
+            <a:fillRect/>
+          </a:stretch>
+        </p:blipFill>
+        <p:spPr>
+          <a:xfrm>
+            <a:off x="389466" y="1430337"/>
+            <a:ext cx="8373533" cy="199496"/>
+          </a:xfrm>
+          <a:prstGeom prst="rect">
+            <a:avLst/>
+          </a:prstGeom>
+        </p:spPr>
+      </p:pic>
+      <p:sp>
+        <p:nvSpPr>
+          <p:cNvPr id="4" name="Content Placeholder 2">
+            <a:extLst>
+              <a:ext uri="{FF2B5EF4-FFF2-40B4-BE49-F238E27FC236}">
+                <a16:creationId xmlns:a16="http://schemas.microsoft.com/office/drawing/2014/main" id="{69B6F073-8B61-3C41-D9B9-6B5B7D42B3C4}"/>
+              </a:ext>
+            </a:extLst>
+          </p:cNvPr>
+          <p:cNvSpPr>
+            <a:spLocks noGrp="1"/>
+          </p:cNvSpPr>
+          <p:nvPr>
+            <p:ph idx="10"/>
+          </p:nvPr>
+        </p:nvSpPr>
+        <p:spPr>
+          <a:xfrm>
+            <a:off x="4610102" y="1706033"/>
+            <a:ext cx="4114800" cy="4971032"/>
+          </a:xfrm>
+        </p:spPr>
+        <p:txBody>
+          <a:bodyPr>
+            <a:normAutofit/>
+          </a:bodyPr>
+          <a:lstStyle>
+            <a:lvl1pPr marL="0">
+              <a:buNone/>
+              <a:defRPr sz="2000"/>
+            </a:lvl1pPr>
+            <a:lvl2pPr>
+              <a:buNone/>
+              <a:defRPr sz="1800"/>
+            </a:lvl2pPr>
+            <a:lvl3pPr>
+              <a:buNone/>
+              <a:defRPr sz="1600"/>
+            </a:lvl3pPr>
+            <a:lvl4pPr>
+              <a:buNone/>
+              <a:defRPr sz="1400"/>
+            </a:lvl4pPr>
+            <a:lvl5pPr>
+              <a:buNone/>
+              <a:defRPr sz="1400"/>
+            </a:lvl5pPr>
+          </a:lstStyle>
+          <a:p>
+            <a:pPr lvl="0"/>
+            <a:r>
+              <a:rPr lang="en-US" dirty="0"/>
+              <a:t>Click to edit Master text styles</a:t>
+            </a:r>
+          </a:p>
+          <a:p>
+            <a:pPr lvl="1"/>
+            <a:r>
+              <a:rPr lang="en-US" dirty="0"/>
+              <a:t>Second level</a:t>
+            </a:r>
+          </a:p>
+          <a:p>
+            <a:pPr lvl="2"/>
+            <a:r>
+              <a:rPr lang="en-US" dirty="0"/>
+              <a:t>Third level</a:t>
+            </a:r>
+          </a:p>
+          <a:p>
+            <a:pPr lvl="3"/>
+            <a:r>
+              <a:rPr lang="en-US" dirty="0"/>
+              <a:t>Fourth level</a:t>
+            </a:r>
+          </a:p>
+          <a:p>
+            <a:pPr lvl="4"/>
+            <a:r>
+              <a:rPr lang="en-US" dirty="0"/>
+              <a:t>Fifth level</a:t>
+            </a:r>
+          </a:p>
+        </p:txBody>
+      </p:sp>
     </p:spTree>
     <p:extLst>
       <p:ext uri="{BB962C8B-B14F-4D97-AF65-F5344CB8AC3E}">
-        <p14:creationId xmlns:p14="http://schemas.microsoft.com/office/powerpoint/2010/main" val="3404519732"/>
+        <p14:creationId xmlns:p14="http://schemas.microsoft.com/office/powerpoint/2010/main" val="2084378950"/>
       </p:ext>
     </p:extLst>
   </p:cSld>
@@ -3617,690 +2769,6 @@
 </file>
 
 <file path=ppt/slideLayouts/slideLayout4.xml><?xml version="1.0" encoding="utf-8"?>
-<p:sldLayout xmlns:a="http://schemas.openxmlformats.org/drawingml/2006/main" xmlns:r="http://schemas.openxmlformats.org/officeDocument/2006/relationships" xmlns:p="http://schemas.openxmlformats.org/presentationml/2006/main" type="obj" preserve="1">
-  <p:cSld name="5_Title and Content">
-    <p:bg>
-      <p:bgPr>
-        <a:solidFill>
-          <a:schemeClr val="bg1"/>
-        </a:solidFill>
-        <a:effectLst/>
-      </p:bgPr>
-    </p:bg>
-    <p:spTree>
-      <p:nvGrpSpPr>
-        <p:cNvPr id="1" name=""/>
-        <p:cNvGrpSpPr/>
-        <p:nvPr/>
-      </p:nvGrpSpPr>
-      <p:grpSpPr>
-        <a:xfrm>
-          <a:off x="0" y="0"/>
-          <a:ext cx="0" cy="0"/>
-          <a:chOff x="0" y="0"/>
-          <a:chExt cx="0" cy="0"/>
-        </a:xfrm>
-      </p:grpSpPr>
-      <p:sp useBgFill="1">
-        <p:nvSpPr>
-          <p:cNvPr id="9" name="Rectangle 8">
-            <a:extLst>
-              <a:ext uri="{FF2B5EF4-FFF2-40B4-BE49-F238E27FC236}">
-                <a16:creationId xmlns:a16="http://schemas.microsoft.com/office/drawing/2014/main" id="{E72DE59C-594C-4F72-46B6-37F8C2F620BF}"/>
-              </a:ext>
-              <a:ext uri="{C183D7F6-B498-43B3-948B-1728B52AA6E4}">
-                <adec:decorative xmlns:adec="http://schemas.microsoft.com/office/drawing/2017/decorative" val="1"/>
-              </a:ext>
-            </a:extLst>
-          </p:cNvPr>
-          <p:cNvSpPr/>
-          <p:nvPr userDrawn="1">
-            <p:extLst>
-              <p:ext uri="{386F3935-93C4-4BCD-93E2-E3B085C9AB24}">
-                <p16:designElem xmlns:p16="http://schemas.microsoft.com/office/powerpoint/2015/main" val="1"/>
-              </p:ext>
-            </p:extLst>
-          </p:nvPr>
-        </p:nvSpPr>
-        <p:spPr>
-          <a:xfrm>
-            <a:off x="44577" y="-190005"/>
-            <a:ext cx="9141714" cy="6858000"/>
-          </a:xfrm>
-          <a:prstGeom prst="rect">
-            <a:avLst/>
-          </a:prstGeom>
-          <a:ln>
-            <a:noFill/>
-          </a:ln>
-        </p:spPr>
-        <p:style>
-          <a:lnRef idx="2">
-            <a:schemeClr val="accent1">
-              <a:shade val="50000"/>
-            </a:schemeClr>
-          </a:lnRef>
-          <a:fillRef idx="1">
-            <a:schemeClr val="accent1"/>
-          </a:fillRef>
-          <a:effectRef idx="0">
-            <a:schemeClr val="accent1"/>
-          </a:effectRef>
-          <a:fontRef idx="minor">
-            <a:schemeClr val="lt1"/>
-          </a:fontRef>
-        </p:style>
-        <p:txBody>
-          <a:bodyPr rtlCol="0" anchor="ctr"/>
-          <a:lstStyle/>
-          <a:p>
-            <a:pPr algn="ctr"/>
-            <a:endParaRPr lang="en-US"/>
-          </a:p>
-        </p:txBody>
-      </p:sp>
-      <p:sp>
-        <p:nvSpPr>
-          <p:cNvPr id="10" name="sketch line">
-            <a:extLst>
-              <a:ext uri="{FF2B5EF4-FFF2-40B4-BE49-F238E27FC236}">
-                <a16:creationId xmlns:a16="http://schemas.microsoft.com/office/drawing/2014/main" id="{A6B0B038-C0F6-CB78-FEF0-A37A717B516C}"/>
-              </a:ext>
-              <a:ext uri="{C183D7F6-B498-43B3-948B-1728B52AA6E4}">
-                <adec:decorative xmlns:adec="http://schemas.microsoft.com/office/drawing/2017/decorative" val="1"/>
-              </a:ext>
-            </a:extLst>
-          </p:cNvPr>
-          <p:cNvSpPr/>
-          <p:nvPr userDrawn="1">
-            <p:extLst>
-              <p:ext uri="{386F3935-93C4-4BCD-93E2-E3B085C9AB24}">
-                <p16:designElem xmlns:p16="http://schemas.microsoft.com/office/powerpoint/2015/main" val="1"/>
-              </p:ext>
-            </p:extLst>
-          </p:nvPr>
-        </p:nvSpPr>
-        <p:spPr>
-          <a:xfrm>
-            <a:off x="546354" y="1487368"/>
-            <a:ext cx="8140446" cy="18288"/>
-          </a:xfrm>
-          <a:custGeom>
-            <a:avLst/>
-            <a:gdLst>
-              <a:gd name="csX0" fmla="*/ 0 w 8140446"/>
-              <a:gd name="csY0" fmla="*/ 0 h 18288"/>
-              <a:gd name="csX1" fmla="*/ 434157 w 8140446"/>
-              <a:gd name="csY1" fmla="*/ 0 h 18288"/>
-              <a:gd name="csX2" fmla="*/ 1193932 w 8140446"/>
-              <a:gd name="csY2" fmla="*/ 0 h 18288"/>
-              <a:gd name="csX3" fmla="*/ 1628089 w 8140446"/>
-              <a:gd name="csY3" fmla="*/ 0 h 18288"/>
-              <a:gd name="csX4" fmla="*/ 2225055 w 8140446"/>
-              <a:gd name="csY4" fmla="*/ 0 h 18288"/>
-              <a:gd name="csX5" fmla="*/ 3066235 w 8140446"/>
-              <a:gd name="csY5" fmla="*/ 0 h 18288"/>
-              <a:gd name="csX6" fmla="*/ 3744605 w 8140446"/>
-              <a:gd name="csY6" fmla="*/ 0 h 18288"/>
-              <a:gd name="csX7" fmla="*/ 4504380 w 8140446"/>
-              <a:gd name="csY7" fmla="*/ 0 h 18288"/>
-              <a:gd name="csX8" fmla="*/ 5101346 w 8140446"/>
-              <a:gd name="csY8" fmla="*/ 0 h 18288"/>
-              <a:gd name="csX9" fmla="*/ 5779717 w 8140446"/>
-              <a:gd name="csY9" fmla="*/ 0 h 18288"/>
-              <a:gd name="csX10" fmla="*/ 6620896 w 8140446"/>
-              <a:gd name="csY10" fmla="*/ 0 h 18288"/>
-              <a:gd name="csX11" fmla="*/ 7136458 w 8140446"/>
-              <a:gd name="csY11" fmla="*/ 0 h 18288"/>
-              <a:gd name="csX12" fmla="*/ 8140446 w 8140446"/>
-              <a:gd name="csY12" fmla="*/ 0 h 18288"/>
-              <a:gd name="csX13" fmla="*/ 8140446 w 8140446"/>
-              <a:gd name="csY13" fmla="*/ 18288 h 18288"/>
-              <a:gd name="csX14" fmla="*/ 7543480 w 8140446"/>
-              <a:gd name="csY14" fmla="*/ 18288 h 18288"/>
-              <a:gd name="csX15" fmla="*/ 7109323 w 8140446"/>
-              <a:gd name="csY15" fmla="*/ 18288 h 18288"/>
-              <a:gd name="csX16" fmla="*/ 6430952 w 8140446"/>
-              <a:gd name="csY16" fmla="*/ 18288 h 18288"/>
-              <a:gd name="csX17" fmla="*/ 5915391 w 8140446"/>
-              <a:gd name="csY17" fmla="*/ 18288 h 18288"/>
-              <a:gd name="csX18" fmla="*/ 5237020 w 8140446"/>
-              <a:gd name="csY18" fmla="*/ 18288 h 18288"/>
-              <a:gd name="csX19" fmla="*/ 4558650 w 8140446"/>
-              <a:gd name="csY19" fmla="*/ 18288 h 18288"/>
-              <a:gd name="csX20" fmla="*/ 3880279 w 8140446"/>
-              <a:gd name="csY20" fmla="*/ 18288 h 18288"/>
-              <a:gd name="csX21" fmla="*/ 3201909 w 8140446"/>
-              <a:gd name="csY21" fmla="*/ 18288 h 18288"/>
-              <a:gd name="csX22" fmla="*/ 2604943 w 8140446"/>
-              <a:gd name="csY22" fmla="*/ 18288 h 18288"/>
-              <a:gd name="csX23" fmla="*/ 1845168 w 8140446"/>
-              <a:gd name="csY23" fmla="*/ 18288 h 18288"/>
-              <a:gd name="csX24" fmla="*/ 1166797 w 8140446"/>
-              <a:gd name="csY24" fmla="*/ 18288 h 18288"/>
-              <a:gd name="csX25" fmla="*/ 0 w 8140446"/>
-              <a:gd name="csY25" fmla="*/ 18288 h 18288"/>
-              <a:gd name="csX26" fmla="*/ 0 w 8140446"/>
-              <a:gd name="csY26" fmla="*/ 0 h 18288"/>
-            </a:gdLst>
-            <a:ahLst/>
-            <a:cxnLst>
-              <a:cxn ang="0">
-                <a:pos x="csX0" y="csY0"/>
-              </a:cxn>
-              <a:cxn ang="0">
-                <a:pos x="csX1" y="csY1"/>
-              </a:cxn>
-              <a:cxn ang="0">
-                <a:pos x="csX2" y="csY2"/>
-              </a:cxn>
-              <a:cxn ang="0">
-                <a:pos x="csX3" y="csY3"/>
-              </a:cxn>
-              <a:cxn ang="0">
-                <a:pos x="csX4" y="csY4"/>
-              </a:cxn>
-              <a:cxn ang="0">
-                <a:pos x="csX5" y="csY5"/>
-              </a:cxn>
-              <a:cxn ang="0">
-                <a:pos x="csX6" y="csY6"/>
-              </a:cxn>
-              <a:cxn ang="0">
-                <a:pos x="csX7" y="csY7"/>
-              </a:cxn>
-              <a:cxn ang="0">
-                <a:pos x="csX8" y="csY8"/>
-              </a:cxn>
-              <a:cxn ang="0">
-                <a:pos x="csX9" y="csY9"/>
-              </a:cxn>
-              <a:cxn ang="0">
-                <a:pos x="csX10" y="csY10"/>
-              </a:cxn>
-              <a:cxn ang="0">
-                <a:pos x="csX11" y="csY11"/>
-              </a:cxn>
-              <a:cxn ang="0">
-                <a:pos x="csX12" y="csY12"/>
-              </a:cxn>
-              <a:cxn ang="0">
-                <a:pos x="csX13" y="csY13"/>
-              </a:cxn>
-              <a:cxn ang="0">
-                <a:pos x="csX14" y="csY14"/>
-              </a:cxn>
-              <a:cxn ang="0">
-                <a:pos x="csX15" y="csY15"/>
-              </a:cxn>
-              <a:cxn ang="0">
-                <a:pos x="csX16" y="csY16"/>
-              </a:cxn>
-              <a:cxn ang="0">
-                <a:pos x="csX17" y="csY17"/>
-              </a:cxn>
-              <a:cxn ang="0">
-                <a:pos x="csX18" y="csY18"/>
-              </a:cxn>
-              <a:cxn ang="0">
-                <a:pos x="csX19" y="csY19"/>
-              </a:cxn>
-              <a:cxn ang="0">
-                <a:pos x="csX20" y="csY20"/>
-              </a:cxn>
-              <a:cxn ang="0">
-                <a:pos x="csX21" y="csY21"/>
-              </a:cxn>
-              <a:cxn ang="0">
-                <a:pos x="csX22" y="csY22"/>
-              </a:cxn>
-              <a:cxn ang="0">
-                <a:pos x="csX23" y="csY23"/>
-              </a:cxn>
-              <a:cxn ang="0">
-                <a:pos x="csX24" y="csY24"/>
-              </a:cxn>
-              <a:cxn ang="0">
-                <a:pos x="csX25" y="csY25"/>
-              </a:cxn>
-              <a:cxn ang="0">
-                <a:pos x="csX26" y="csY26"/>
-              </a:cxn>
-            </a:cxnLst>
-            <a:rect l="l" t="t" r="r" b="b"/>
-            <a:pathLst>
-              <a:path w="8140446" h="18288" fill="none" extrusionOk="0">
-                <a:moveTo>
-                  <a:pt x="0" y="0"/>
-                </a:moveTo>
-                <a:cubicBezTo>
-                  <a:pt x="94920" y="9103"/>
-                  <a:pt x="287892" y="-4966"/>
-                  <a:pt x="434157" y="0"/>
-                </a:cubicBezTo>
-                <a:cubicBezTo>
-                  <a:pt x="580422" y="4966"/>
-                  <a:pt x="943595" y="-14182"/>
-                  <a:pt x="1193932" y="0"/>
-                </a:cubicBezTo>
-                <a:cubicBezTo>
-                  <a:pt x="1444270" y="14182"/>
-                  <a:pt x="1472129" y="5523"/>
-                  <a:pt x="1628089" y="0"/>
-                </a:cubicBezTo>
-                <a:cubicBezTo>
-                  <a:pt x="1784049" y="-5523"/>
-                  <a:pt x="1962419" y="-17322"/>
-                  <a:pt x="2225055" y="0"/>
-                </a:cubicBezTo>
-                <a:cubicBezTo>
-                  <a:pt x="2487691" y="17322"/>
-                  <a:pt x="2700681" y="1311"/>
-                  <a:pt x="3066235" y="0"/>
-                </a:cubicBezTo>
-                <a:cubicBezTo>
-                  <a:pt x="3431789" y="-1311"/>
-                  <a:pt x="3405662" y="25081"/>
-                  <a:pt x="3744605" y="0"/>
-                </a:cubicBezTo>
-                <a:cubicBezTo>
-                  <a:pt x="4083548" y="-25081"/>
-                  <a:pt x="4265111" y="-11945"/>
-                  <a:pt x="4504380" y="0"/>
-                </a:cubicBezTo>
-                <a:cubicBezTo>
-                  <a:pt x="4743649" y="11945"/>
-                  <a:pt x="4860394" y="-2832"/>
-                  <a:pt x="5101346" y="0"/>
-                </a:cubicBezTo>
-                <a:cubicBezTo>
-                  <a:pt x="5342298" y="2832"/>
-                  <a:pt x="5456387" y="23676"/>
-                  <a:pt x="5779717" y="0"/>
-                </a:cubicBezTo>
-                <a:cubicBezTo>
-                  <a:pt x="6103047" y="-23676"/>
-                  <a:pt x="6270379" y="-37291"/>
-                  <a:pt x="6620896" y="0"/>
-                </a:cubicBezTo>
-                <a:cubicBezTo>
-                  <a:pt x="6971413" y="37291"/>
-                  <a:pt x="6989068" y="24674"/>
-                  <a:pt x="7136458" y="0"/>
-                </a:cubicBezTo>
-                <a:cubicBezTo>
-                  <a:pt x="7283848" y="-24674"/>
-                  <a:pt x="7752532" y="-22436"/>
-                  <a:pt x="8140446" y="0"/>
-                </a:cubicBezTo>
-                <a:cubicBezTo>
-                  <a:pt x="8140314" y="7702"/>
-                  <a:pt x="8140234" y="13511"/>
-                  <a:pt x="8140446" y="18288"/>
-                </a:cubicBezTo>
-                <a:cubicBezTo>
-                  <a:pt x="7906329" y="-3043"/>
-                  <a:pt x="7681180" y="27465"/>
-                  <a:pt x="7543480" y="18288"/>
-                </a:cubicBezTo>
-                <a:cubicBezTo>
-                  <a:pt x="7405780" y="9111"/>
-                  <a:pt x="7216607" y="3660"/>
-                  <a:pt x="7109323" y="18288"/>
-                </a:cubicBezTo>
-                <a:cubicBezTo>
-                  <a:pt x="7002039" y="32916"/>
-                  <a:pt x="6576231" y="42692"/>
-                  <a:pt x="6430952" y="18288"/>
-                </a:cubicBezTo>
-                <a:cubicBezTo>
-                  <a:pt x="6285673" y="-6116"/>
-                  <a:pt x="6138840" y="34521"/>
-                  <a:pt x="5915391" y="18288"/>
-                </a:cubicBezTo>
-                <a:cubicBezTo>
-                  <a:pt x="5691942" y="2055"/>
-                  <a:pt x="5459460" y="51666"/>
-                  <a:pt x="5237020" y="18288"/>
-                </a:cubicBezTo>
-                <a:cubicBezTo>
-                  <a:pt x="5014580" y="-15090"/>
-                  <a:pt x="4747677" y="40449"/>
-                  <a:pt x="4558650" y="18288"/>
-                </a:cubicBezTo>
-                <a:cubicBezTo>
-                  <a:pt x="4369623" y="-3873"/>
-                  <a:pt x="4146061" y="12568"/>
-                  <a:pt x="3880279" y="18288"/>
-                </a:cubicBezTo>
-                <a:cubicBezTo>
-                  <a:pt x="3614497" y="24008"/>
-                  <a:pt x="3473808" y="-12908"/>
-                  <a:pt x="3201909" y="18288"/>
-                </a:cubicBezTo>
-                <a:cubicBezTo>
-                  <a:pt x="2930010" y="49484"/>
-                  <a:pt x="2728175" y="-3430"/>
-                  <a:pt x="2604943" y="18288"/>
-                </a:cubicBezTo>
-                <a:cubicBezTo>
-                  <a:pt x="2481711" y="40006"/>
-                  <a:pt x="2004334" y="26952"/>
-                  <a:pt x="1845168" y="18288"/>
-                </a:cubicBezTo>
-                <a:cubicBezTo>
-                  <a:pt x="1686003" y="9624"/>
-                  <a:pt x="1375070" y="37580"/>
-                  <a:pt x="1166797" y="18288"/>
-                </a:cubicBezTo>
-                <a:cubicBezTo>
-                  <a:pt x="958524" y="-1004"/>
-                  <a:pt x="342846" y="8880"/>
-                  <a:pt x="0" y="18288"/>
-                </a:cubicBezTo>
-                <a:cubicBezTo>
-                  <a:pt x="129" y="13298"/>
-                  <a:pt x="-675" y="6857"/>
-                  <a:pt x="0" y="0"/>
-                </a:cubicBezTo>
-                <a:close/>
-              </a:path>
-              <a:path w="8140446" h="18288" stroke="0" extrusionOk="0">
-                <a:moveTo>
-                  <a:pt x="0" y="0"/>
-                </a:moveTo>
-                <a:cubicBezTo>
-                  <a:pt x="142435" y="-24533"/>
-                  <a:pt x="380026" y="17447"/>
-                  <a:pt x="596966" y="0"/>
-                </a:cubicBezTo>
-                <a:cubicBezTo>
-                  <a:pt x="813906" y="-17447"/>
-                  <a:pt x="830530" y="13462"/>
-                  <a:pt x="1031123" y="0"/>
-                </a:cubicBezTo>
-                <a:cubicBezTo>
-                  <a:pt x="1231716" y="-13462"/>
-                  <a:pt x="1634038" y="0"/>
-                  <a:pt x="1872303" y="0"/>
-                </a:cubicBezTo>
-                <a:cubicBezTo>
-                  <a:pt x="2110568" y="0"/>
-                  <a:pt x="2261934" y="-25727"/>
-                  <a:pt x="2469269" y="0"/>
-                </a:cubicBezTo>
-                <a:cubicBezTo>
-                  <a:pt x="2676604" y="25727"/>
-                  <a:pt x="2790440" y="16284"/>
-                  <a:pt x="3066235" y="0"/>
-                </a:cubicBezTo>
-                <a:cubicBezTo>
-                  <a:pt x="3342030" y="-16284"/>
-                  <a:pt x="3685603" y="41976"/>
-                  <a:pt x="3907414" y="0"/>
-                </a:cubicBezTo>
-                <a:cubicBezTo>
-                  <a:pt x="4129225" y="-41976"/>
-                  <a:pt x="4177416" y="-7598"/>
-                  <a:pt x="4422976" y="0"/>
-                </a:cubicBezTo>
-                <a:cubicBezTo>
-                  <a:pt x="4668536" y="7598"/>
-                  <a:pt x="5023499" y="-28058"/>
-                  <a:pt x="5264155" y="0"/>
-                </a:cubicBezTo>
-                <a:cubicBezTo>
-                  <a:pt x="5504811" y="28058"/>
-                  <a:pt x="5703675" y="13288"/>
-                  <a:pt x="6105335" y="0"/>
-                </a:cubicBezTo>
-                <a:cubicBezTo>
-                  <a:pt x="6506995" y="-13288"/>
-                  <a:pt x="6455516" y="-5124"/>
-                  <a:pt x="6783705" y="0"/>
-                </a:cubicBezTo>
-                <a:cubicBezTo>
-                  <a:pt x="7111894" y="5124"/>
-                  <a:pt x="7512856" y="10604"/>
-                  <a:pt x="8140446" y="0"/>
-                </a:cubicBezTo>
-                <a:cubicBezTo>
-                  <a:pt x="8140458" y="8833"/>
-                  <a:pt x="8140986" y="9830"/>
-                  <a:pt x="8140446" y="18288"/>
-                </a:cubicBezTo>
-                <a:cubicBezTo>
-                  <a:pt x="7959314" y="3345"/>
-                  <a:pt x="7870113" y="10437"/>
-                  <a:pt x="7706289" y="18288"/>
-                </a:cubicBezTo>
-                <a:cubicBezTo>
-                  <a:pt x="7542465" y="26139"/>
-                  <a:pt x="7157940" y="17482"/>
-                  <a:pt x="6865109" y="18288"/>
-                </a:cubicBezTo>
-                <a:cubicBezTo>
-                  <a:pt x="6572278" y="19094"/>
-                  <a:pt x="6524256" y="38051"/>
-                  <a:pt x="6349548" y="18288"/>
-                </a:cubicBezTo>
-                <a:cubicBezTo>
-                  <a:pt x="6174840" y="-1475"/>
-                  <a:pt x="5951624" y="174"/>
-                  <a:pt x="5671177" y="18288"/>
-                </a:cubicBezTo>
-                <a:cubicBezTo>
-                  <a:pt x="5390730" y="36402"/>
-                  <a:pt x="5222992" y="60058"/>
-                  <a:pt x="4829998" y="18288"/>
-                </a:cubicBezTo>
-                <a:cubicBezTo>
-                  <a:pt x="4437004" y="-23482"/>
-                  <a:pt x="4344181" y="39087"/>
-                  <a:pt x="4151627" y="18288"/>
-                </a:cubicBezTo>
-                <a:cubicBezTo>
-                  <a:pt x="3959073" y="-2511"/>
-                  <a:pt x="3886970" y="32875"/>
-                  <a:pt x="3717470" y="18288"/>
-                </a:cubicBezTo>
-                <a:cubicBezTo>
-                  <a:pt x="3547970" y="3701"/>
-                  <a:pt x="3451521" y="31872"/>
-                  <a:pt x="3201909" y="18288"/>
-                </a:cubicBezTo>
-                <a:cubicBezTo>
-                  <a:pt x="2952297" y="4704"/>
-                  <a:pt x="2543413" y="6029"/>
-                  <a:pt x="2360729" y="18288"/>
-                </a:cubicBezTo>
-                <a:cubicBezTo>
-                  <a:pt x="2178045" y="30547"/>
-                  <a:pt x="1906056" y="25847"/>
-                  <a:pt x="1682359" y="18288"/>
-                </a:cubicBezTo>
-                <a:cubicBezTo>
-                  <a:pt x="1458662" y="10730"/>
-                  <a:pt x="1330405" y="8046"/>
-                  <a:pt x="1166797" y="18288"/>
-                </a:cubicBezTo>
-                <a:cubicBezTo>
-                  <a:pt x="1003189" y="28530"/>
-                  <a:pt x="278098" y="19533"/>
-                  <a:pt x="0" y="18288"/>
-                </a:cubicBezTo>
-                <a:cubicBezTo>
-                  <a:pt x="74" y="14054"/>
-                  <a:pt x="-46" y="6997"/>
-                  <a:pt x="0" y="0"/>
-                </a:cubicBezTo>
-                <a:close/>
-              </a:path>
-            </a:pathLst>
-          </a:custGeom>
-          <a:solidFill>
-            <a:schemeClr val="accent2"/>
-          </a:solidFill>
-          <a:ln w="41275" cap="rnd">
-            <a:solidFill>
-              <a:schemeClr val="accent2"/>
-            </a:solidFill>
-            <a:round/>
-            <a:extLst>
-              <a:ext uri="{C807C97D-BFC1-408E-A445-0C87EB9F89A2}">
-                <ask:lineSketchStyleProps xmlns:ask="http://schemas.microsoft.com/office/drawing/2018/sketchyshapes" sd="1219033472">
-                  <a:prstGeom prst="rect">
-                    <a:avLst/>
-                  </a:prstGeom>
-                  <ask:type>
-                    <ask:lineSketchFreehand/>
-                  </ask:type>
-                </ask:lineSketchStyleProps>
-              </a:ext>
-            </a:extLst>
-          </a:ln>
-        </p:spPr>
-        <p:style>
-          <a:lnRef idx="2">
-            <a:schemeClr val="accent1">
-              <a:shade val="50000"/>
-            </a:schemeClr>
-          </a:lnRef>
-          <a:fillRef idx="1">
-            <a:schemeClr val="accent1"/>
-          </a:fillRef>
-          <a:effectRef idx="0">
-            <a:schemeClr val="accent1"/>
-          </a:effectRef>
-          <a:fontRef idx="minor">
-            <a:schemeClr val="lt1"/>
-          </a:fontRef>
-        </p:style>
-        <p:txBody>
-          <a:bodyPr rtlCol="0" anchor="ctr"/>
-          <a:lstStyle/>
-          <a:p>
-            <a:pPr algn="ctr"/>
-            <a:endParaRPr lang="en-US"/>
-          </a:p>
-        </p:txBody>
-      </p:sp>
-      <p:sp>
-        <p:nvSpPr>
-          <p:cNvPr id="2" name="Title 1"/>
-          <p:cNvSpPr>
-            <a:spLocks noGrp="1"/>
-          </p:cNvSpPr>
-          <p:nvPr>
-            <p:ph type="title"/>
-          </p:nvPr>
-        </p:nvSpPr>
-        <p:spPr/>
-        <p:txBody>
-          <a:bodyPr>
-            <a:normAutofit/>
-          </a:bodyPr>
-          <a:lstStyle>
-            <a:lvl1pPr algn="l">
-              <a:defRPr sz="3600"/>
-            </a:lvl1pPr>
-          </a:lstStyle>
-          <a:p>
-            <a:r>
-              <a:rPr lang="en-US" dirty="0"/>
-              <a:t>Click to edit Master title style</a:t>
-            </a:r>
-          </a:p>
-        </p:txBody>
-      </p:sp>
-      <p:sp>
-        <p:nvSpPr>
-          <p:cNvPr id="3" name="Content Placeholder 2"/>
-          <p:cNvSpPr>
-            <a:spLocks noGrp="1"/>
-          </p:cNvSpPr>
-          <p:nvPr>
-            <p:ph idx="1"/>
-          </p:nvPr>
-        </p:nvSpPr>
-        <p:spPr>
-          <a:xfrm>
-            <a:off x="457200" y="1600200"/>
-            <a:ext cx="8229600" cy="5105400"/>
-          </a:xfrm>
-        </p:spPr>
-        <p:txBody>
-          <a:bodyPr>
-            <a:normAutofit/>
-          </a:bodyPr>
-          <a:lstStyle>
-            <a:lvl1pPr>
-              <a:defRPr sz="2000"/>
-            </a:lvl1pPr>
-            <a:lvl2pPr>
-              <a:defRPr sz="1800"/>
-            </a:lvl2pPr>
-            <a:lvl3pPr>
-              <a:defRPr sz="1600"/>
-            </a:lvl3pPr>
-            <a:lvl4pPr>
-              <a:defRPr sz="1400"/>
-            </a:lvl4pPr>
-            <a:lvl5pPr>
-              <a:defRPr sz="1400"/>
-            </a:lvl5pPr>
-          </a:lstStyle>
-          <a:p>
-            <a:pPr lvl="0"/>
-            <a:r>
-              <a:rPr lang="en-US" dirty="0"/>
-              <a:t>Click to edit Master text styles</a:t>
-            </a:r>
-          </a:p>
-          <a:p>
-            <a:pPr lvl="1"/>
-            <a:r>
-              <a:rPr lang="en-US" dirty="0"/>
-              <a:t>Second level</a:t>
-            </a:r>
-          </a:p>
-          <a:p>
-            <a:pPr lvl="2"/>
-            <a:r>
-              <a:rPr lang="en-US" dirty="0"/>
-              <a:t>Third level</a:t>
-            </a:r>
-          </a:p>
-          <a:p>
-            <a:pPr lvl="3"/>
-            <a:r>
-              <a:rPr lang="en-US" dirty="0"/>
-              <a:t>Fourth level</a:t>
-            </a:r>
-          </a:p>
-          <a:p>
-            <a:pPr lvl="4"/>
-            <a:r>
-              <a:rPr lang="en-US" dirty="0"/>
-              <a:t>Fifth level</a:t>
-            </a:r>
-          </a:p>
-        </p:txBody>
-      </p:sp>
-    </p:spTree>
-    <p:extLst>
-      <p:ext uri="{BB962C8B-B14F-4D97-AF65-F5344CB8AC3E}">
-        <p14:creationId xmlns:p14="http://schemas.microsoft.com/office/powerpoint/2010/main" val="2670600955"/>
-      </p:ext>
-    </p:extLst>
-  </p:cSld>
-  <p:clrMapOvr>
-    <a:overrideClrMapping bg1="lt1" tx1="dk1" bg2="lt2" tx2="dk2" accent1="accent1" accent2="accent2" accent3="accent3" accent4="accent4" accent5="accent5" accent6="accent6" hlink="hlink" folHlink="folHlink"/>
-  </p:clrMapOvr>
-</p:sldLayout>
-</file>
-
-<file path=ppt/slideLayouts/slideLayout5.xml><?xml version="1.0" encoding="utf-8"?>
 <p:sldLayout xmlns:a="http://schemas.openxmlformats.org/drawingml/2006/main" xmlns:r="http://schemas.openxmlformats.org/officeDocument/2006/relationships" xmlns:p="http://schemas.openxmlformats.org/presentationml/2006/main" preserve="1" userDrawn="1">
   <p:cSld name="3_Title and Content">
     <p:bg>
@@ -4325,550 +2793,6 @@
           <a:chExt cx="0" cy="0"/>
         </a:xfrm>
       </p:grpSpPr>
-      <p:sp useBgFill="1">
-        <p:nvSpPr>
-          <p:cNvPr id="9" name="Rectangle 8">
-            <a:extLst>
-              <a:ext uri="{FF2B5EF4-FFF2-40B4-BE49-F238E27FC236}">
-                <a16:creationId xmlns:a16="http://schemas.microsoft.com/office/drawing/2014/main" id="{E72DE59C-594C-4F72-46B6-37F8C2F620BF}"/>
-              </a:ext>
-              <a:ext uri="{C183D7F6-B498-43B3-948B-1728B52AA6E4}">
-                <adec:decorative xmlns:adec="http://schemas.microsoft.com/office/drawing/2017/decorative" val="1"/>
-              </a:ext>
-            </a:extLst>
-          </p:cNvPr>
-          <p:cNvSpPr/>
-          <p:nvPr userDrawn="1">
-            <p:extLst>
-              <p:ext uri="{386F3935-93C4-4BCD-93E2-E3B085C9AB24}">
-                <p16:designElem xmlns:p16="http://schemas.microsoft.com/office/powerpoint/2015/main" val="1"/>
-              </p:ext>
-            </p:extLst>
-          </p:nvPr>
-        </p:nvSpPr>
-        <p:spPr>
-          <a:xfrm>
-            <a:off x="44577" y="-190005"/>
-            <a:ext cx="9141714" cy="6858000"/>
-          </a:xfrm>
-          <a:prstGeom prst="rect">
-            <a:avLst/>
-          </a:prstGeom>
-          <a:ln>
-            <a:noFill/>
-          </a:ln>
-        </p:spPr>
-        <p:style>
-          <a:lnRef idx="2">
-            <a:schemeClr val="accent1">
-              <a:shade val="50000"/>
-            </a:schemeClr>
-          </a:lnRef>
-          <a:fillRef idx="1">
-            <a:schemeClr val="accent1"/>
-          </a:fillRef>
-          <a:effectRef idx="0">
-            <a:schemeClr val="accent1"/>
-          </a:effectRef>
-          <a:fontRef idx="minor">
-            <a:schemeClr val="lt1"/>
-          </a:fontRef>
-        </p:style>
-        <p:txBody>
-          <a:bodyPr rtlCol="0" anchor="ctr"/>
-          <a:lstStyle/>
-          <a:p>
-            <a:pPr algn="ctr"/>
-            <a:endParaRPr lang="en-US"/>
-          </a:p>
-        </p:txBody>
-      </p:sp>
-      <p:sp>
-        <p:nvSpPr>
-          <p:cNvPr id="10" name="sketch line">
-            <a:extLst>
-              <a:ext uri="{FF2B5EF4-FFF2-40B4-BE49-F238E27FC236}">
-                <a16:creationId xmlns:a16="http://schemas.microsoft.com/office/drawing/2014/main" id="{A6B0B038-C0F6-CB78-FEF0-A37A717B516C}"/>
-              </a:ext>
-              <a:ext uri="{C183D7F6-B498-43B3-948B-1728B52AA6E4}">
-                <adec:decorative xmlns:adec="http://schemas.microsoft.com/office/drawing/2017/decorative" val="1"/>
-              </a:ext>
-            </a:extLst>
-          </p:cNvPr>
-          <p:cNvSpPr/>
-          <p:nvPr userDrawn="1">
-            <p:extLst>
-              <p:ext uri="{386F3935-93C4-4BCD-93E2-E3B085C9AB24}">
-                <p16:designElem xmlns:p16="http://schemas.microsoft.com/office/powerpoint/2015/main" val="1"/>
-              </p:ext>
-            </p:extLst>
-          </p:nvPr>
-        </p:nvSpPr>
-        <p:spPr>
-          <a:xfrm>
-            <a:off x="546354" y="1487368"/>
-            <a:ext cx="8140446" cy="18288"/>
-          </a:xfrm>
-          <a:custGeom>
-            <a:avLst/>
-            <a:gdLst>
-              <a:gd name="csX0" fmla="*/ 0 w 8140446"/>
-              <a:gd name="csY0" fmla="*/ 0 h 18288"/>
-              <a:gd name="csX1" fmla="*/ 434157 w 8140446"/>
-              <a:gd name="csY1" fmla="*/ 0 h 18288"/>
-              <a:gd name="csX2" fmla="*/ 1193932 w 8140446"/>
-              <a:gd name="csY2" fmla="*/ 0 h 18288"/>
-              <a:gd name="csX3" fmla="*/ 1628089 w 8140446"/>
-              <a:gd name="csY3" fmla="*/ 0 h 18288"/>
-              <a:gd name="csX4" fmla="*/ 2225055 w 8140446"/>
-              <a:gd name="csY4" fmla="*/ 0 h 18288"/>
-              <a:gd name="csX5" fmla="*/ 3066235 w 8140446"/>
-              <a:gd name="csY5" fmla="*/ 0 h 18288"/>
-              <a:gd name="csX6" fmla="*/ 3744605 w 8140446"/>
-              <a:gd name="csY6" fmla="*/ 0 h 18288"/>
-              <a:gd name="csX7" fmla="*/ 4504380 w 8140446"/>
-              <a:gd name="csY7" fmla="*/ 0 h 18288"/>
-              <a:gd name="csX8" fmla="*/ 5101346 w 8140446"/>
-              <a:gd name="csY8" fmla="*/ 0 h 18288"/>
-              <a:gd name="csX9" fmla="*/ 5779717 w 8140446"/>
-              <a:gd name="csY9" fmla="*/ 0 h 18288"/>
-              <a:gd name="csX10" fmla="*/ 6620896 w 8140446"/>
-              <a:gd name="csY10" fmla="*/ 0 h 18288"/>
-              <a:gd name="csX11" fmla="*/ 7136458 w 8140446"/>
-              <a:gd name="csY11" fmla="*/ 0 h 18288"/>
-              <a:gd name="csX12" fmla="*/ 8140446 w 8140446"/>
-              <a:gd name="csY12" fmla="*/ 0 h 18288"/>
-              <a:gd name="csX13" fmla="*/ 8140446 w 8140446"/>
-              <a:gd name="csY13" fmla="*/ 18288 h 18288"/>
-              <a:gd name="csX14" fmla="*/ 7543480 w 8140446"/>
-              <a:gd name="csY14" fmla="*/ 18288 h 18288"/>
-              <a:gd name="csX15" fmla="*/ 7109323 w 8140446"/>
-              <a:gd name="csY15" fmla="*/ 18288 h 18288"/>
-              <a:gd name="csX16" fmla="*/ 6430952 w 8140446"/>
-              <a:gd name="csY16" fmla="*/ 18288 h 18288"/>
-              <a:gd name="csX17" fmla="*/ 5915391 w 8140446"/>
-              <a:gd name="csY17" fmla="*/ 18288 h 18288"/>
-              <a:gd name="csX18" fmla="*/ 5237020 w 8140446"/>
-              <a:gd name="csY18" fmla="*/ 18288 h 18288"/>
-              <a:gd name="csX19" fmla="*/ 4558650 w 8140446"/>
-              <a:gd name="csY19" fmla="*/ 18288 h 18288"/>
-              <a:gd name="csX20" fmla="*/ 3880279 w 8140446"/>
-              <a:gd name="csY20" fmla="*/ 18288 h 18288"/>
-              <a:gd name="csX21" fmla="*/ 3201909 w 8140446"/>
-              <a:gd name="csY21" fmla="*/ 18288 h 18288"/>
-              <a:gd name="csX22" fmla="*/ 2604943 w 8140446"/>
-              <a:gd name="csY22" fmla="*/ 18288 h 18288"/>
-              <a:gd name="csX23" fmla="*/ 1845168 w 8140446"/>
-              <a:gd name="csY23" fmla="*/ 18288 h 18288"/>
-              <a:gd name="csX24" fmla="*/ 1166797 w 8140446"/>
-              <a:gd name="csY24" fmla="*/ 18288 h 18288"/>
-              <a:gd name="csX25" fmla="*/ 0 w 8140446"/>
-              <a:gd name="csY25" fmla="*/ 18288 h 18288"/>
-              <a:gd name="csX26" fmla="*/ 0 w 8140446"/>
-              <a:gd name="csY26" fmla="*/ 0 h 18288"/>
-            </a:gdLst>
-            <a:ahLst/>
-            <a:cxnLst>
-              <a:cxn ang="0">
-                <a:pos x="csX0" y="csY0"/>
-              </a:cxn>
-              <a:cxn ang="0">
-                <a:pos x="csX1" y="csY1"/>
-              </a:cxn>
-              <a:cxn ang="0">
-                <a:pos x="csX2" y="csY2"/>
-              </a:cxn>
-              <a:cxn ang="0">
-                <a:pos x="csX3" y="csY3"/>
-              </a:cxn>
-              <a:cxn ang="0">
-                <a:pos x="csX4" y="csY4"/>
-              </a:cxn>
-              <a:cxn ang="0">
-                <a:pos x="csX5" y="csY5"/>
-              </a:cxn>
-              <a:cxn ang="0">
-                <a:pos x="csX6" y="csY6"/>
-              </a:cxn>
-              <a:cxn ang="0">
-                <a:pos x="csX7" y="csY7"/>
-              </a:cxn>
-              <a:cxn ang="0">
-                <a:pos x="csX8" y="csY8"/>
-              </a:cxn>
-              <a:cxn ang="0">
-                <a:pos x="csX9" y="csY9"/>
-              </a:cxn>
-              <a:cxn ang="0">
-                <a:pos x="csX10" y="csY10"/>
-              </a:cxn>
-              <a:cxn ang="0">
-                <a:pos x="csX11" y="csY11"/>
-              </a:cxn>
-              <a:cxn ang="0">
-                <a:pos x="csX12" y="csY12"/>
-              </a:cxn>
-              <a:cxn ang="0">
-                <a:pos x="csX13" y="csY13"/>
-              </a:cxn>
-              <a:cxn ang="0">
-                <a:pos x="csX14" y="csY14"/>
-              </a:cxn>
-              <a:cxn ang="0">
-                <a:pos x="csX15" y="csY15"/>
-              </a:cxn>
-              <a:cxn ang="0">
-                <a:pos x="csX16" y="csY16"/>
-              </a:cxn>
-              <a:cxn ang="0">
-                <a:pos x="csX17" y="csY17"/>
-              </a:cxn>
-              <a:cxn ang="0">
-                <a:pos x="csX18" y="csY18"/>
-              </a:cxn>
-              <a:cxn ang="0">
-                <a:pos x="csX19" y="csY19"/>
-              </a:cxn>
-              <a:cxn ang="0">
-                <a:pos x="csX20" y="csY20"/>
-              </a:cxn>
-              <a:cxn ang="0">
-                <a:pos x="csX21" y="csY21"/>
-              </a:cxn>
-              <a:cxn ang="0">
-                <a:pos x="csX22" y="csY22"/>
-              </a:cxn>
-              <a:cxn ang="0">
-                <a:pos x="csX23" y="csY23"/>
-              </a:cxn>
-              <a:cxn ang="0">
-                <a:pos x="csX24" y="csY24"/>
-              </a:cxn>
-              <a:cxn ang="0">
-                <a:pos x="csX25" y="csY25"/>
-              </a:cxn>
-              <a:cxn ang="0">
-                <a:pos x="csX26" y="csY26"/>
-              </a:cxn>
-            </a:cxnLst>
-            <a:rect l="l" t="t" r="r" b="b"/>
-            <a:pathLst>
-              <a:path w="8140446" h="18288" fill="none" extrusionOk="0">
-                <a:moveTo>
-                  <a:pt x="0" y="0"/>
-                </a:moveTo>
-                <a:cubicBezTo>
-                  <a:pt x="94920" y="9103"/>
-                  <a:pt x="287892" y="-4966"/>
-                  <a:pt x="434157" y="0"/>
-                </a:cubicBezTo>
-                <a:cubicBezTo>
-                  <a:pt x="580422" y="4966"/>
-                  <a:pt x="943595" y="-14182"/>
-                  <a:pt x="1193932" y="0"/>
-                </a:cubicBezTo>
-                <a:cubicBezTo>
-                  <a:pt x="1444270" y="14182"/>
-                  <a:pt x="1472129" y="5523"/>
-                  <a:pt x="1628089" y="0"/>
-                </a:cubicBezTo>
-                <a:cubicBezTo>
-                  <a:pt x="1784049" y="-5523"/>
-                  <a:pt x="1962419" y="-17322"/>
-                  <a:pt x="2225055" y="0"/>
-                </a:cubicBezTo>
-                <a:cubicBezTo>
-                  <a:pt x="2487691" y="17322"/>
-                  <a:pt x="2700681" y="1311"/>
-                  <a:pt x="3066235" y="0"/>
-                </a:cubicBezTo>
-                <a:cubicBezTo>
-                  <a:pt x="3431789" y="-1311"/>
-                  <a:pt x="3405662" y="25081"/>
-                  <a:pt x="3744605" y="0"/>
-                </a:cubicBezTo>
-                <a:cubicBezTo>
-                  <a:pt x="4083548" y="-25081"/>
-                  <a:pt x="4265111" y="-11945"/>
-                  <a:pt x="4504380" y="0"/>
-                </a:cubicBezTo>
-                <a:cubicBezTo>
-                  <a:pt x="4743649" y="11945"/>
-                  <a:pt x="4860394" y="-2832"/>
-                  <a:pt x="5101346" y="0"/>
-                </a:cubicBezTo>
-                <a:cubicBezTo>
-                  <a:pt x="5342298" y="2832"/>
-                  <a:pt x="5456387" y="23676"/>
-                  <a:pt x="5779717" y="0"/>
-                </a:cubicBezTo>
-                <a:cubicBezTo>
-                  <a:pt x="6103047" y="-23676"/>
-                  <a:pt x="6270379" y="-37291"/>
-                  <a:pt x="6620896" y="0"/>
-                </a:cubicBezTo>
-                <a:cubicBezTo>
-                  <a:pt x="6971413" y="37291"/>
-                  <a:pt x="6989068" y="24674"/>
-                  <a:pt x="7136458" y="0"/>
-                </a:cubicBezTo>
-                <a:cubicBezTo>
-                  <a:pt x="7283848" y="-24674"/>
-                  <a:pt x="7752532" y="-22436"/>
-                  <a:pt x="8140446" y="0"/>
-                </a:cubicBezTo>
-                <a:cubicBezTo>
-                  <a:pt x="8140314" y="7702"/>
-                  <a:pt x="8140234" y="13511"/>
-                  <a:pt x="8140446" y="18288"/>
-                </a:cubicBezTo>
-                <a:cubicBezTo>
-                  <a:pt x="7906329" y="-3043"/>
-                  <a:pt x="7681180" y="27465"/>
-                  <a:pt x="7543480" y="18288"/>
-                </a:cubicBezTo>
-                <a:cubicBezTo>
-                  <a:pt x="7405780" y="9111"/>
-                  <a:pt x="7216607" y="3660"/>
-                  <a:pt x="7109323" y="18288"/>
-                </a:cubicBezTo>
-                <a:cubicBezTo>
-                  <a:pt x="7002039" y="32916"/>
-                  <a:pt x="6576231" y="42692"/>
-                  <a:pt x="6430952" y="18288"/>
-                </a:cubicBezTo>
-                <a:cubicBezTo>
-                  <a:pt x="6285673" y="-6116"/>
-                  <a:pt x="6138840" y="34521"/>
-                  <a:pt x="5915391" y="18288"/>
-                </a:cubicBezTo>
-                <a:cubicBezTo>
-                  <a:pt x="5691942" y="2055"/>
-                  <a:pt x="5459460" y="51666"/>
-                  <a:pt x="5237020" y="18288"/>
-                </a:cubicBezTo>
-                <a:cubicBezTo>
-                  <a:pt x="5014580" y="-15090"/>
-                  <a:pt x="4747677" y="40449"/>
-                  <a:pt x="4558650" y="18288"/>
-                </a:cubicBezTo>
-                <a:cubicBezTo>
-                  <a:pt x="4369623" y="-3873"/>
-                  <a:pt x="4146061" y="12568"/>
-                  <a:pt x="3880279" y="18288"/>
-                </a:cubicBezTo>
-                <a:cubicBezTo>
-                  <a:pt x="3614497" y="24008"/>
-                  <a:pt x="3473808" y="-12908"/>
-                  <a:pt x="3201909" y="18288"/>
-                </a:cubicBezTo>
-                <a:cubicBezTo>
-                  <a:pt x="2930010" y="49484"/>
-                  <a:pt x="2728175" y="-3430"/>
-                  <a:pt x="2604943" y="18288"/>
-                </a:cubicBezTo>
-                <a:cubicBezTo>
-                  <a:pt x="2481711" y="40006"/>
-                  <a:pt x="2004334" y="26952"/>
-                  <a:pt x="1845168" y="18288"/>
-                </a:cubicBezTo>
-                <a:cubicBezTo>
-                  <a:pt x="1686003" y="9624"/>
-                  <a:pt x="1375070" y="37580"/>
-                  <a:pt x="1166797" y="18288"/>
-                </a:cubicBezTo>
-                <a:cubicBezTo>
-                  <a:pt x="958524" y="-1004"/>
-                  <a:pt x="342846" y="8880"/>
-                  <a:pt x="0" y="18288"/>
-                </a:cubicBezTo>
-                <a:cubicBezTo>
-                  <a:pt x="129" y="13298"/>
-                  <a:pt x="-675" y="6857"/>
-                  <a:pt x="0" y="0"/>
-                </a:cubicBezTo>
-                <a:close/>
-              </a:path>
-              <a:path w="8140446" h="18288" stroke="0" extrusionOk="0">
-                <a:moveTo>
-                  <a:pt x="0" y="0"/>
-                </a:moveTo>
-                <a:cubicBezTo>
-                  <a:pt x="142435" y="-24533"/>
-                  <a:pt x="380026" y="17447"/>
-                  <a:pt x="596966" y="0"/>
-                </a:cubicBezTo>
-                <a:cubicBezTo>
-                  <a:pt x="813906" y="-17447"/>
-                  <a:pt x="830530" y="13462"/>
-                  <a:pt x="1031123" y="0"/>
-                </a:cubicBezTo>
-                <a:cubicBezTo>
-                  <a:pt x="1231716" y="-13462"/>
-                  <a:pt x="1634038" y="0"/>
-                  <a:pt x="1872303" y="0"/>
-                </a:cubicBezTo>
-                <a:cubicBezTo>
-                  <a:pt x="2110568" y="0"/>
-                  <a:pt x="2261934" y="-25727"/>
-                  <a:pt x="2469269" y="0"/>
-                </a:cubicBezTo>
-                <a:cubicBezTo>
-                  <a:pt x="2676604" y="25727"/>
-                  <a:pt x="2790440" y="16284"/>
-                  <a:pt x="3066235" y="0"/>
-                </a:cubicBezTo>
-                <a:cubicBezTo>
-                  <a:pt x="3342030" y="-16284"/>
-                  <a:pt x="3685603" y="41976"/>
-                  <a:pt x="3907414" y="0"/>
-                </a:cubicBezTo>
-                <a:cubicBezTo>
-                  <a:pt x="4129225" y="-41976"/>
-                  <a:pt x="4177416" y="-7598"/>
-                  <a:pt x="4422976" y="0"/>
-                </a:cubicBezTo>
-                <a:cubicBezTo>
-                  <a:pt x="4668536" y="7598"/>
-                  <a:pt x="5023499" y="-28058"/>
-                  <a:pt x="5264155" y="0"/>
-                </a:cubicBezTo>
-                <a:cubicBezTo>
-                  <a:pt x="5504811" y="28058"/>
-                  <a:pt x="5703675" y="13288"/>
-                  <a:pt x="6105335" y="0"/>
-                </a:cubicBezTo>
-                <a:cubicBezTo>
-                  <a:pt x="6506995" y="-13288"/>
-                  <a:pt x="6455516" y="-5124"/>
-                  <a:pt x="6783705" y="0"/>
-                </a:cubicBezTo>
-                <a:cubicBezTo>
-                  <a:pt x="7111894" y="5124"/>
-                  <a:pt x="7512856" y="10604"/>
-                  <a:pt x="8140446" y="0"/>
-                </a:cubicBezTo>
-                <a:cubicBezTo>
-                  <a:pt x="8140458" y="8833"/>
-                  <a:pt x="8140986" y="9830"/>
-                  <a:pt x="8140446" y="18288"/>
-                </a:cubicBezTo>
-                <a:cubicBezTo>
-                  <a:pt x="7959314" y="3345"/>
-                  <a:pt x="7870113" y="10437"/>
-                  <a:pt x="7706289" y="18288"/>
-                </a:cubicBezTo>
-                <a:cubicBezTo>
-                  <a:pt x="7542465" y="26139"/>
-                  <a:pt x="7157940" y="17482"/>
-                  <a:pt x="6865109" y="18288"/>
-                </a:cubicBezTo>
-                <a:cubicBezTo>
-                  <a:pt x="6572278" y="19094"/>
-                  <a:pt x="6524256" y="38051"/>
-                  <a:pt x="6349548" y="18288"/>
-                </a:cubicBezTo>
-                <a:cubicBezTo>
-                  <a:pt x="6174840" y="-1475"/>
-                  <a:pt x="5951624" y="174"/>
-                  <a:pt x="5671177" y="18288"/>
-                </a:cubicBezTo>
-                <a:cubicBezTo>
-                  <a:pt x="5390730" y="36402"/>
-                  <a:pt x="5222992" y="60058"/>
-                  <a:pt x="4829998" y="18288"/>
-                </a:cubicBezTo>
-                <a:cubicBezTo>
-                  <a:pt x="4437004" y="-23482"/>
-                  <a:pt x="4344181" y="39087"/>
-                  <a:pt x="4151627" y="18288"/>
-                </a:cubicBezTo>
-                <a:cubicBezTo>
-                  <a:pt x="3959073" y="-2511"/>
-                  <a:pt x="3886970" y="32875"/>
-                  <a:pt x="3717470" y="18288"/>
-                </a:cubicBezTo>
-                <a:cubicBezTo>
-                  <a:pt x="3547970" y="3701"/>
-                  <a:pt x="3451521" y="31872"/>
-                  <a:pt x="3201909" y="18288"/>
-                </a:cubicBezTo>
-                <a:cubicBezTo>
-                  <a:pt x="2952297" y="4704"/>
-                  <a:pt x="2543413" y="6029"/>
-                  <a:pt x="2360729" y="18288"/>
-                </a:cubicBezTo>
-                <a:cubicBezTo>
-                  <a:pt x="2178045" y="30547"/>
-                  <a:pt x="1906056" y="25847"/>
-                  <a:pt x="1682359" y="18288"/>
-                </a:cubicBezTo>
-                <a:cubicBezTo>
-                  <a:pt x="1458662" y="10730"/>
-                  <a:pt x="1330405" y="8046"/>
-                  <a:pt x="1166797" y="18288"/>
-                </a:cubicBezTo>
-                <a:cubicBezTo>
-                  <a:pt x="1003189" y="28530"/>
-                  <a:pt x="278098" y="19533"/>
-                  <a:pt x="0" y="18288"/>
-                </a:cubicBezTo>
-                <a:cubicBezTo>
-                  <a:pt x="74" y="14054"/>
-                  <a:pt x="-46" y="6997"/>
-                  <a:pt x="0" y="0"/>
-                </a:cubicBezTo>
-                <a:close/>
-              </a:path>
-            </a:pathLst>
-          </a:custGeom>
-          <a:solidFill>
-            <a:schemeClr val="accent2"/>
-          </a:solidFill>
-          <a:ln w="41275" cap="rnd">
-            <a:solidFill>
-              <a:schemeClr val="accent2"/>
-            </a:solidFill>
-            <a:round/>
-            <a:extLst>
-              <a:ext uri="{C807C97D-BFC1-408E-A445-0C87EB9F89A2}">
-                <ask:lineSketchStyleProps xmlns:ask="http://schemas.microsoft.com/office/drawing/2018/sketchyshapes" sd="1219033472">
-                  <a:prstGeom prst="rect">
-                    <a:avLst/>
-                  </a:prstGeom>
-                  <ask:type>
-                    <ask:lineSketchFreehand/>
-                  </ask:type>
-                </ask:lineSketchStyleProps>
-              </a:ext>
-            </a:extLst>
-          </a:ln>
-        </p:spPr>
-        <p:style>
-          <a:lnRef idx="2">
-            <a:schemeClr val="accent1">
-              <a:shade val="50000"/>
-            </a:schemeClr>
-          </a:lnRef>
-          <a:fillRef idx="1">
-            <a:schemeClr val="accent1"/>
-          </a:fillRef>
-          <a:effectRef idx="0">
-            <a:schemeClr val="accent1"/>
-          </a:effectRef>
-          <a:fontRef idx="minor">
-            <a:schemeClr val="lt1"/>
-          </a:fontRef>
-        </p:style>
-        <p:txBody>
-          <a:bodyPr rtlCol="0" anchor="ctr"/>
-          <a:lstStyle/>
-          <a:p>
-            <a:pPr algn="ctr"/>
-            <a:endParaRPr lang="en-US"/>
-          </a:p>
-        </p:txBody>
-      </p:sp>
       <p:sp>
         <p:nvSpPr>
           <p:cNvPr id="2" name="Title 1"/>
@@ -4909,8 +2833,8 @@
         </p:nvSpPr>
         <p:spPr>
           <a:xfrm>
-            <a:off x="457201" y="1600200"/>
-            <a:ext cx="3988130" cy="5105400"/>
+            <a:off x="457200" y="1706033"/>
+            <a:ext cx="4076700" cy="2439797"/>
           </a:xfrm>
         </p:spPr>
         <p:txBody>
@@ -4918,19 +2842,24 @@
             <a:normAutofit/>
           </a:bodyPr>
           <a:lstStyle>
-            <a:lvl1pPr>
+            <a:lvl1pPr marL="0">
+              <a:buNone/>
               <a:defRPr sz="2000"/>
             </a:lvl1pPr>
             <a:lvl2pPr>
+              <a:buNone/>
               <a:defRPr sz="1800"/>
             </a:lvl2pPr>
             <a:lvl3pPr>
+              <a:buNone/>
               <a:defRPr sz="1600"/>
             </a:lvl3pPr>
             <a:lvl4pPr>
+              <a:buNone/>
               <a:defRPr sz="1400"/>
             </a:lvl4pPr>
             <a:lvl5pPr>
+              <a:buNone/>
               <a:defRPr sz="1400"/>
             </a:lvl5pPr>
           </a:lstStyle>
@@ -4971,12 +2900,42 @@
           </a:p>
         </p:txBody>
       </p:sp>
+      <p:pic>
+        <p:nvPicPr>
+          <p:cNvPr id="5" name="Picture 4">
+            <a:extLst>
+              <a:ext uri="{FF2B5EF4-FFF2-40B4-BE49-F238E27FC236}">
+                <a16:creationId xmlns:a16="http://schemas.microsoft.com/office/drawing/2014/main" id="{D83E45CF-487E-D805-AC82-E9F89743BFD2}"/>
+              </a:ext>
+            </a:extLst>
+          </p:cNvPr>
+          <p:cNvPicPr>
+            <a:picLocks noChangeAspect="1"/>
+          </p:cNvPicPr>
+          <p:nvPr userDrawn="1"/>
+        </p:nvPicPr>
+        <p:blipFill>
+          <a:blip r:embed="rId3"/>
+          <a:stretch>
+            <a:fillRect/>
+          </a:stretch>
+        </p:blipFill>
+        <p:spPr>
+          <a:xfrm>
+            <a:off x="389466" y="1430337"/>
+            <a:ext cx="8373533" cy="199496"/>
+          </a:xfrm>
+          <a:prstGeom prst="rect">
+            <a:avLst/>
+          </a:prstGeom>
+        </p:spPr>
+      </p:pic>
       <p:sp>
         <p:nvSpPr>
           <p:cNvPr id="4" name="Content Placeholder 2">
             <a:extLst>
               <a:ext uri="{FF2B5EF4-FFF2-40B4-BE49-F238E27FC236}">
-                <a16:creationId xmlns:a16="http://schemas.microsoft.com/office/drawing/2014/main" id="{03D8F64F-8F2C-A452-CFD4-8C1950DD732E}"/>
+                <a16:creationId xmlns:a16="http://schemas.microsoft.com/office/drawing/2014/main" id="{69B6F073-8B61-3C41-D9B9-6B5B7D42B3C4}"/>
               </a:ext>
             </a:extLst>
           </p:cNvPr>
@@ -4989,8 +2948,8 @@
         </p:nvSpPr>
         <p:spPr>
           <a:xfrm>
-            <a:off x="4647210" y="1597460"/>
-            <a:ext cx="4039590" cy="5105400"/>
+            <a:off x="4610102" y="1706033"/>
+            <a:ext cx="4114800" cy="4971032"/>
           </a:xfrm>
         </p:spPr>
         <p:txBody>
@@ -4998,19 +2957,24 @@
             <a:normAutofit/>
           </a:bodyPr>
           <a:lstStyle>
-            <a:lvl1pPr>
+            <a:lvl1pPr marL="0">
+              <a:buNone/>
               <a:defRPr sz="2000"/>
             </a:lvl1pPr>
             <a:lvl2pPr>
+              <a:buNone/>
               <a:defRPr sz="1800"/>
             </a:lvl2pPr>
             <a:lvl3pPr>
+              <a:buNone/>
               <a:defRPr sz="1600"/>
             </a:lvl3pPr>
             <a:lvl4pPr>
+              <a:buNone/>
               <a:defRPr sz="1400"/>
             </a:lvl4pPr>
             <a:lvl5pPr>
+              <a:buNone/>
               <a:defRPr sz="1400"/>
             </a:lvl5pPr>
           </a:lstStyle>
@@ -5051,10 +3015,95 @@
           </a:p>
         </p:txBody>
       </p:sp>
+      <p:sp>
+        <p:nvSpPr>
+          <p:cNvPr id="6" name="Content Placeholder 2">
+            <a:extLst>
+              <a:ext uri="{FF2B5EF4-FFF2-40B4-BE49-F238E27FC236}">
+                <a16:creationId xmlns:a16="http://schemas.microsoft.com/office/drawing/2014/main" id="{5C44160D-EF70-386D-E6CD-DB9E002A32BA}"/>
+              </a:ext>
+            </a:extLst>
+          </p:cNvPr>
+          <p:cNvSpPr>
+            <a:spLocks noGrp="1"/>
+          </p:cNvSpPr>
+          <p:nvPr>
+            <p:ph idx="11"/>
+          </p:nvPr>
+        </p:nvSpPr>
+        <p:spPr>
+          <a:xfrm>
+            <a:off x="457199" y="4240530"/>
+            <a:ext cx="4076700" cy="2439796"/>
+          </a:xfrm>
+        </p:spPr>
+        <p:txBody>
+          <a:bodyPr>
+            <a:normAutofit/>
+          </a:bodyPr>
+          <a:lstStyle>
+            <a:lvl1pPr marL="0">
+              <a:buNone/>
+              <a:defRPr sz="2000"/>
+            </a:lvl1pPr>
+            <a:lvl2pPr>
+              <a:buNone/>
+              <a:defRPr sz="1800"/>
+            </a:lvl2pPr>
+            <a:lvl3pPr>
+              <a:buNone/>
+              <a:defRPr sz="1600"/>
+            </a:lvl3pPr>
+            <a:lvl4pPr>
+              <a:buNone/>
+              <a:defRPr sz="1400"/>
+            </a:lvl4pPr>
+            <a:lvl5pPr>
+              <a:buNone/>
+              <a:defRPr sz="1400"/>
+            </a:lvl5pPr>
+          </a:lstStyle>
+          <a:p>
+            <a:pPr lvl="0"/>
+            <a:r>
+              <a:rPr lang="en-US" dirty="0"/>
+              <a:t>Click to edit Master text styles</a:t>
+            </a:r>
+          </a:p>
+          <a:p>
+            <a:pPr lvl="1"/>
+            <a:r>
+              <a:rPr lang="en-US" dirty="0"/>
+              <a:t>Second level</a:t>
+            </a:r>
+          </a:p>
+          <a:p>
+            <a:pPr lvl="2"/>
+            <a:r>
+              <a:rPr lang="en-US" dirty="0"/>
+              <a:t>Third level</a:t>
+            </a:r>
+          </a:p>
+          <a:p>
+            <a:pPr lvl="3"/>
+            <a:r>
+              <a:rPr lang="en-US" dirty="0"/>
+              <a:t>Fourth level</a:t>
+            </a:r>
+          </a:p>
+          <a:p>
+            <a:pPr lvl="4"/>
+            <a:r>
+              <a:rPr lang="en-US" dirty="0"/>
+              <a:t>Fifth level</a:t>
+            </a:r>
+          </a:p>
+        </p:txBody>
+      </p:sp>
     </p:spTree>
     <p:extLst>
       <p:ext uri="{BB962C8B-B14F-4D97-AF65-F5344CB8AC3E}">
-        <p14:creationId xmlns:p14="http://schemas.microsoft.com/office/powerpoint/2010/main" val="995411821"/>
+        <p14:creationId xmlns:p14="http://schemas.microsoft.com/office/powerpoint/2010/main" val="857619913"/>
       </p:ext>
     </p:extLst>
   </p:cSld>
@@ -5064,7 +3113,7 @@
 </p:sldLayout>
 </file>
 
-<file path=ppt/slideLayouts/slideLayout6.xml><?xml version="1.0" encoding="utf-8"?>
+<file path=ppt/slideLayouts/slideLayout5.xml><?xml version="1.0" encoding="utf-8"?>
 <p:sldLayout xmlns:a="http://schemas.openxmlformats.org/drawingml/2006/main" xmlns:r="http://schemas.openxmlformats.org/officeDocument/2006/relationships" xmlns:p="http://schemas.openxmlformats.org/presentationml/2006/main" type="obj" preserve="1">
   <p:cSld name="7_Title and Content">
     <p:bg>
@@ -5204,7 +3253,7 @@
 </p:sldLayout>
 </file>
 
-<file path=ppt/slideLayouts/slideLayout7.xml><?xml version="1.0" encoding="utf-8"?>
+<file path=ppt/slideLayouts/slideLayout6.xml><?xml version="1.0" encoding="utf-8"?>
 <p:sldLayout xmlns:a="http://schemas.openxmlformats.org/drawingml/2006/main" xmlns:r="http://schemas.openxmlformats.org/officeDocument/2006/relationships" xmlns:p="http://schemas.openxmlformats.org/presentationml/2006/main" type="obj" preserve="1">
   <p:cSld name="4_Title and Content">
     <p:bg>
@@ -5343,7 +3392,7 @@
           <a:p>
             <a:fld id="{5BCAD085-E8A6-8845-BD4E-CB4CCA059FC4}" type="datetimeFigureOut">
               <a:rPr lang="en-US" smtClean="0"/>
-              <a:t>2/18/2026</a:t>
+              <a:t>2/19/2026</a:t>
             </a:fld>
             <a:endParaRPr lang="en-US"/>
           </a:p>
@@ -5404,7 +3453,7 @@
 </p:sldLayout>
 </file>
 
-<file path=ppt/slideLayouts/slideLayout8.xml><?xml version="1.0" encoding="utf-8"?>
+<file path=ppt/slideLayouts/slideLayout7.xml><?xml version="1.0" encoding="utf-8"?>
 <p:sldLayout xmlns:a="http://schemas.openxmlformats.org/drawingml/2006/main" xmlns:r="http://schemas.openxmlformats.org/officeDocument/2006/relationships" xmlns:p="http://schemas.openxmlformats.org/presentationml/2006/main" type="secHead" preserve="1">
   <p:cSld name="Section Header">
     <p:spTree>
@@ -5588,7 +3637,7 @@
           <a:p>
             <a:fld id="{5BCAD085-E8A6-8845-BD4E-CB4CCA059FC4}" type="datetimeFigureOut">
               <a:rPr lang="en-US" smtClean="0"/>
-              <a:t>2/18/2026</a:t>
+              <a:t>2/19/2026</a:t>
             </a:fld>
             <a:endParaRPr lang="en-US"/>
           </a:p>
@@ -5649,7 +3698,7 @@
 </p:sldLayout>
 </file>
 
-<file path=ppt/slideLayouts/slideLayout9.xml><?xml version="1.0" encoding="utf-8"?>
+<file path=ppt/slideLayouts/slideLayout8.xml><?xml version="1.0" encoding="utf-8"?>
 <p:sldLayout xmlns:a="http://schemas.openxmlformats.org/drawingml/2006/main" xmlns:r="http://schemas.openxmlformats.org/officeDocument/2006/relationships" xmlns:p="http://schemas.openxmlformats.org/presentationml/2006/main" type="twoObj" preserve="1">
   <p:cSld name="Two Content">
     <p:spTree>
@@ -5873,7 +3922,7 @@
           <a:p>
             <a:fld id="{5BCAD085-E8A6-8845-BD4E-CB4CCA059FC4}" type="datetimeFigureOut">
               <a:rPr lang="en-US" smtClean="0"/>
-              <a:t>2/18/2026</a:t>
+              <a:t>2/19/2026</a:t>
             </a:fld>
             <a:endParaRPr lang="en-US"/>
           </a:p>
@@ -5925,6 +3974,425 @@
     <p:extLst>
       <p:ext uri="{BB962C8B-B14F-4D97-AF65-F5344CB8AC3E}">
         <p14:creationId xmlns:p14="http://schemas.microsoft.com/office/powerpoint/2010/main" val="2782244947"/>
+      </p:ext>
+    </p:extLst>
+  </p:cSld>
+  <p:clrMapOvr>
+    <a:masterClrMapping/>
+  </p:clrMapOvr>
+</p:sldLayout>
+</file>
+
+<file path=ppt/slideLayouts/slideLayout9.xml><?xml version="1.0" encoding="utf-8"?>
+<p:sldLayout xmlns:a="http://schemas.openxmlformats.org/drawingml/2006/main" xmlns:r="http://schemas.openxmlformats.org/officeDocument/2006/relationships" xmlns:p="http://schemas.openxmlformats.org/presentationml/2006/main" type="twoTxTwoObj" preserve="1">
+  <p:cSld name="Comparison">
+    <p:spTree>
+      <p:nvGrpSpPr>
+        <p:cNvPr id="1" name=""/>
+        <p:cNvGrpSpPr/>
+        <p:nvPr/>
+      </p:nvGrpSpPr>
+      <p:grpSpPr>
+        <a:xfrm>
+          <a:off x="0" y="0"/>
+          <a:ext cx="0" cy="0"/>
+          <a:chOff x="0" y="0"/>
+          <a:chExt cx="0" cy="0"/>
+        </a:xfrm>
+      </p:grpSpPr>
+      <p:sp>
+        <p:nvSpPr>
+          <p:cNvPr id="2" name="Title 1"/>
+          <p:cNvSpPr>
+            <a:spLocks noGrp="1"/>
+          </p:cNvSpPr>
+          <p:nvPr>
+            <p:ph type="title"/>
+          </p:nvPr>
+        </p:nvSpPr>
+        <p:spPr/>
+        <p:txBody>
+          <a:bodyPr/>
+          <a:lstStyle>
+            <a:lvl1pPr>
+              <a:defRPr/>
+            </a:lvl1pPr>
+          </a:lstStyle>
+          <a:p>
+            <a:r>
+              <a:rPr lang="en-US"/>
+              <a:t>Click to edit Master title style</a:t>
+            </a:r>
+          </a:p>
+        </p:txBody>
+      </p:sp>
+      <p:sp>
+        <p:nvSpPr>
+          <p:cNvPr id="3" name="Text Placeholder 2"/>
+          <p:cNvSpPr>
+            <a:spLocks noGrp="1"/>
+          </p:cNvSpPr>
+          <p:nvPr>
+            <p:ph type="body" idx="1"/>
+          </p:nvPr>
+        </p:nvSpPr>
+        <p:spPr>
+          <a:xfrm>
+            <a:off x="457200" y="1535113"/>
+            <a:ext cx="4040188" cy="639762"/>
+          </a:xfrm>
+        </p:spPr>
+        <p:txBody>
+          <a:bodyPr anchor="b"/>
+          <a:lstStyle>
+            <a:lvl1pPr marL="0" indent="0">
+              <a:buNone/>
+              <a:defRPr sz="2400" b="1"/>
+            </a:lvl1pPr>
+            <a:lvl2pPr marL="457200" indent="0">
+              <a:buNone/>
+              <a:defRPr sz="2000" b="1"/>
+            </a:lvl2pPr>
+            <a:lvl3pPr marL="914400" indent="0">
+              <a:buNone/>
+              <a:defRPr sz="1800" b="1"/>
+            </a:lvl3pPr>
+            <a:lvl4pPr marL="1371600" indent="0">
+              <a:buNone/>
+              <a:defRPr sz="1600" b="1"/>
+            </a:lvl4pPr>
+            <a:lvl5pPr marL="1828800" indent="0">
+              <a:buNone/>
+              <a:defRPr sz="1600" b="1"/>
+            </a:lvl5pPr>
+            <a:lvl6pPr marL="2286000" indent="0">
+              <a:buNone/>
+              <a:defRPr sz="1600" b="1"/>
+            </a:lvl6pPr>
+            <a:lvl7pPr marL="2743200" indent="0">
+              <a:buNone/>
+              <a:defRPr sz="1600" b="1"/>
+            </a:lvl7pPr>
+            <a:lvl8pPr marL="3200400" indent="0">
+              <a:buNone/>
+              <a:defRPr sz="1600" b="1"/>
+            </a:lvl8pPr>
+            <a:lvl9pPr marL="3657600" indent="0">
+              <a:buNone/>
+              <a:defRPr sz="1600" b="1"/>
+            </a:lvl9pPr>
+          </a:lstStyle>
+          <a:p>
+            <a:pPr lvl="0"/>
+            <a:r>
+              <a:rPr lang="en-US"/>
+              <a:t>Click to edit Master text styles</a:t>
+            </a:r>
+          </a:p>
+        </p:txBody>
+      </p:sp>
+      <p:sp>
+        <p:nvSpPr>
+          <p:cNvPr id="4" name="Content Placeholder 3"/>
+          <p:cNvSpPr>
+            <a:spLocks noGrp="1"/>
+          </p:cNvSpPr>
+          <p:nvPr>
+            <p:ph sz="half" idx="2"/>
+          </p:nvPr>
+        </p:nvSpPr>
+        <p:spPr>
+          <a:xfrm>
+            <a:off x="457200" y="2174875"/>
+            <a:ext cx="4040188" cy="3951288"/>
+          </a:xfrm>
+        </p:spPr>
+        <p:txBody>
+          <a:bodyPr/>
+          <a:lstStyle>
+            <a:lvl1pPr>
+              <a:defRPr sz="2400"/>
+            </a:lvl1pPr>
+            <a:lvl2pPr>
+              <a:defRPr sz="2000"/>
+            </a:lvl2pPr>
+            <a:lvl3pPr>
+              <a:defRPr sz="1800"/>
+            </a:lvl3pPr>
+            <a:lvl4pPr>
+              <a:defRPr sz="1600"/>
+            </a:lvl4pPr>
+            <a:lvl5pPr>
+              <a:defRPr sz="1600"/>
+            </a:lvl5pPr>
+            <a:lvl6pPr>
+              <a:defRPr sz="1600"/>
+            </a:lvl6pPr>
+            <a:lvl7pPr>
+              <a:defRPr sz="1600"/>
+            </a:lvl7pPr>
+            <a:lvl8pPr>
+              <a:defRPr sz="1600"/>
+            </a:lvl8pPr>
+            <a:lvl9pPr>
+              <a:defRPr sz="1600"/>
+            </a:lvl9pPr>
+          </a:lstStyle>
+          <a:p>
+            <a:pPr lvl="0"/>
+            <a:r>
+              <a:rPr lang="en-US"/>
+              <a:t>Click to edit Master text styles</a:t>
+            </a:r>
+          </a:p>
+          <a:p>
+            <a:pPr lvl="1"/>
+            <a:r>
+              <a:rPr lang="en-US"/>
+              <a:t>Second level</a:t>
+            </a:r>
+          </a:p>
+          <a:p>
+            <a:pPr lvl="2"/>
+            <a:r>
+              <a:rPr lang="en-US"/>
+              <a:t>Third level</a:t>
+            </a:r>
+          </a:p>
+          <a:p>
+            <a:pPr lvl="3"/>
+            <a:r>
+              <a:rPr lang="en-US"/>
+              <a:t>Fourth level</a:t>
+            </a:r>
+          </a:p>
+          <a:p>
+            <a:pPr lvl="4"/>
+            <a:r>
+              <a:rPr lang="en-US"/>
+              <a:t>Fifth level</a:t>
+            </a:r>
+          </a:p>
+        </p:txBody>
+      </p:sp>
+      <p:sp>
+        <p:nvSpPr>
+          <p:cNvPr id="5" name="Text Placeholder 4"/>
+          <p:cNvSpPr>
+            <a:spLocks noGrp="1"/>
+          </p:cNvSpPr>
+          <p:nvPr>
+            <p:ph type="body" sz="quarter" idx="3"/>
+          </p:nvPr>
+        </p:nvSpPr>
+        <p:spPr>
+          <a:xfrm>
+            <a:off x="4645025" y="1535113"/>
+            <a:ext cx="4041775" cy="639762"/>
+          </a:xfrm>
+        </p:spPr>
+        <p:txBody>
+          <a:bodyPr anchor="b"/>
+          <a:lstStyle>
+            <a:lvl1pPr marL="0" indent="0">
+              <a:buNone/>
+              <a:defRPr sz="2400" b="1"/>
+            </a:lvl1pPr>
+            <a:lvl2pPr marL="457200" indent="0">
+              <a:buNone/>
+              <a:defRPr sz="2000" b="1"/>
+            </a:lvl2pPr>
+            <a:lvl3pPr marL="914400" indent="0">
+              <a:buNone/>
+              <a:defRPr sz="1800" b="1"/>
+            </a:lvl3pPr>
+            <a:lvl4pPr marL="1371600" indent="0">
+              <a:buNone/>
+              <a:defRPr sz="1600" b="1"/>
+            </a:lvl4pPr>
+            <a:lvl5pPr marL="1828800" indent="0">
+              <a:buNone/>
+              <a:defRPr sz="1600" b="1"/>
+            </a:lvl5pPr>
+            <a:lvl6pPr marL="2286000" indent="0">
+              <a:buNone/>
+              <a:defRPr sz="1600" b="1"/>
+            </a:lvl6pPr>
+            <a:lvl7pPr marL="2743200" indent="0">
+              <a:buNone/>
+              <a:defRPr sz="1600" b="1"/>
+            </a:lvl7pPr>
+            <a:lvl8pPr marL="3200400" indent="0">
+              <a:buNone/>
+              <a:defRPr sz="1600" b="1"/>
+            </a:lvl8pPr>
+            <a:lvl9pPr marL="3657600" indent="0">
+              <a:buNone/>
+              <a:defRPr sz="1600" b="1"/>
+            </a:lvl9pPr>
+          </a:lstStyle>
+          <a:p>
+            <a:pPr lvl="0"/>
+            <a:r>
+              <a:rPr lang="en-US"/>
+              <a:t>Click to edit Master text styles</a:t>
+            </a:r>
+          </a:p>
+        </p:txBody>
+      </p:sp>
+      <p:sp>
+        <p:nvSpPr>
+          <p:cNvPr id="6" name="Content Placeholder 5"/>
+          <p:cNvSpPr>
+            <a:spLocks noGrp="1"/>
+          </p:cNvSpPr>
+          <p:nvPr>
+            <p:ph sz="quarter" idx="4"/>
+          </p:nvPr>
+        </p:nvSpPr>
+        <p:spPr>
+          <a:xfrm>
+            <a:off x="4645025" y="2174875"/>
+            <a:ext cx="4041775" cy="3951288"/>
+          </a:xfrm>
+        </p:spPr>
+        <p:txBody>
+          <a:bodyPr/>
+          <a:lstStyle>
+            <a:lvl1pPr>
+              <a:defRPr sz="2400"/>
+            </a:lvl1pPr>
+            <a:lvl2pPr>
+              <a:defRPr sz="2000"/>
+            </a:lvl2pPr>
+            <a:lvl3pPr>
+              <a:defRPr sz="1800"/>
+            </a:lvl3pPr>
+            <a:lvl4pPr>
+              <a:defRPr sz="1600"/>
+            </a:lvl4pPr>
+            <a:lvl5pPr>
+              <a:defRPr sz="1600"/>
+            </a:lvl5pPr>
+            <a:lvl6pPr>
+              <a:defRPr sz="1600"/>
+            </a:lvl6pPr>
+            <a:lvl7pPr>
+              <a:defRPr sz="1600"/>
+            </a:lvl7pPr>
+            <a:lvl8pPr>
+              <a:defRPr sz="1600"/>
+            </a:lvl8pPr>
+            <a:lvl9pPr>
+              <a:defRPr sz="1600"/>
+            </a:lvl9pPr>
+          </a:lstStyle>
+          <a:p>
+            <a:pPr lvl="0"/>
+            <a:r>
+              <a:rPr lang="en-US"/>
+              <a:t>Click to edit Master text styles</a:t>
+            </a:r>
+          </a:p>
+          <a:p>
+            <a:pPr lvl="1"/>
+            <a:r>
+              <a:rPr lang="en-US"/>
+              <a:t>Second level</a:t>
+            </a:r>
+          </a:p>
+          <a:p>
+            <a:pPr lvl="2"/>
+            <a:r>
+              <a:rPr lang="en-US"/>
+              <a:t>Third level</a:t>
+            </a:r>
+          </a:p>
+          <a:p>
+            <a:pPr lvl="3"/>
+            <a:r>
+              <a:rPr lang="en-US"/>
+              <a:t>Fourth level</a:t>
+            </a:r>
+          </a:p>
+          <a:p>
+            <a:pPr lvl="4"/>
+            <a:r>
+              <a:rPr lang="en-US"/>
+              <a:t>Fifth level</a:t>
+            </a:r>
+          </a:p>
+        </p:txBody>
+      </p:sp>
+      <p:sp>
+        <p:nvSpPr>
+          <p:cNvPr id="7" name="Date Placeholder 6"/>
+          <p:cNvSpPr>
+            <a:spLocks noGrp="1"/>
+          </p:cNvSpPr>
+          <p:nvPr>
+            <p:ph type="dt" sz="half" idx="10"/>
+          </p:nvPr>
+        </p:nvSpPr>
+        <p:spPr/>
+        <p:txBody>
+          <a:bodyPr/>
+          <a:lstStyle/>
+          <a:p>
+            <a:fld id="{5BCAD085-E8A6-8845-BD4E-CB4CCA059FC4}" type="datetimeFigureOut">
+              <a:rPr lang="en-US" smtClean="0"/>
+              <a:t>2/19/2026</a:t>
+            </a:fld>
+            <a:endParaRPr lang="en-US"/>
+          </a:p>
+        </p:txBody>
+      </p:sp>
+      <p:sp>
+        <p:nvSpPr>
+          <p:cNvPr id="8" name="Footer Placeholder 7"/>
+          <p:cNvSpPr>
+            <a:spLocks noGrp="1"/>
+          </p:cNvSpPr>
+          <p:nvPr>
+            <p:ph type="ftr" sz="quarter" idx="11"/>
+          </p:nvPr>
+        </p:nvSpPr>
+        <p:spPr/>
+        <p:txBody>
+          <a:bodyPr/>
+          <a:lstStyle/>
+          <a:p>
+            <a:endParaRPr lang="en-US"/>
+          </a:p>
+        </p:txBody>
+      </p:sp>
+      <p:sp>
+        <p:nvSpPr>
+          <p:cNvPr id="9" name="Slide Number Placeholder 8"/>
+          <p:cNvSpPr>
+            <a:spLocks noGrp="1"/>
+          </p:cNvSpPr>
+          <p:nvPr>
+            <p:ph type="sldNum" sz="quarter" idx="12"/>
+          </p:nvPr>
+        </p:nvSpPr>
+        <p:spPr/>
+        <p:txBody>
+          <a:bodyPr/>
+          <a:lstStyle/>
+          <a:p>
+            <a:fld id="{C1FF6DA9-008F-8B48-92A6-B652298478BF}" type="slidenum">
+              <a:rPr lang="en-US" smtClean="0"/>
+              <a:t>‹#›</a:t>
+            </a:fld>
+            <a:endParaRPr lang="en-US"/>
+          </a:p>
+        </p:txBody>
+      </p:sp>
+    </p:spTree>
+    <p:extLst>
+      <p:ext uri="{BB962C8B-B14F-4D97-AF65-F5344CB8AC3E}">
+        <p14:creationId xmlns:p14="http://schemas.microsoft.com/office/powerpoint/2010/main" val="990158736"/>
       </p:ext>
     </p:extLst>
   </p:cSld>
@@ -6084,7 +4552,7 @@
           <a:p>
             <a:fld id="{5BCAD085-E8A6-8845-BD4E-CB4CCA059FC4}" type="datetimeFigureOut">
               <a:rPr lang="en-US" smtClean="0"/>
-              <a:t>2/18/2026</a:t>
+              <a:t>2/19/2026</a:t>
             </a:fld>
             <a:endParaRPr lang="en-US"/>
           </a:p>
@@ -6179,20 +4647,19 @@
   <p:sldLayoutIdLst>
     <p:sldLayoutId id="2147483665" r:id="rId1"/>
     <p:sldLayoutId id="2147483660" r:id="rId2"/>
-    <p:sldLayoutId id="2147483667" r:id="rId3"/>
-    <p:sldLayoutId id="2147483664" r:id="rId4"/>
-    <p:sldLayoutId id="2147483662" r:id="rId5"/>
-    <p:sldLayoutId id="2147483668" r:id="rId6"/>
-    <p:sldLayoutId id="2147483663" r:id="rId7"/>
-    <p:sldLayoutId id="2147483651" r:id="rId8"/>
-    <p:sldLayoutId id="2147483652" r:id="rId9"/>
-    <p:sldLayoutId id="2147483653" r:id="rId10"/>
-    <p:sldLayoutId id="2147483654" r:id="rId11"/>
-    <p:sldLayoutId id="2147483655" r:id="rId12"/>
-    <p:sldLayoutId id="2147483656" r:id="rId13"/>
-    <p:sldLayoutId id="2147483657" r:id="rId14"/>
-    <p:sldLayoutId id="2147483658" r:id="rId15"/>
-    <p:sldLayoutId id="2147483659" r:id="rId16"/>
+    <p:sldLayoutId id="2147483669" r:id="rId3"/>
+    <p:sldLayoutId id="2147483670" r:id="rId4"/>
+    <p:sldLayoutId id="2147483668" r:id="rId5"/>
+    <p:sldLayoutId id="2147483663" r:id="rId6"/>
+    <p:sldLayoutId id="2147483651" r:id="rId7"/>
+    <p:sldLayoutId id="2147483652" r:id="rId8"/>
+    <p:sldLayoutId id="2147483653" r:id="rId9"/>
+    <p:sldLayoutId id="2147483654" r:id="rId10"/>
+    <p:sldLayoutId id="2147483655" r:id="rId11"/>
+    <p:sldLayoutId id="2147483656" r:id="rId12"/>
+    <p:sldLayoutId id="2147483657" r:id="rId13"/>
+    <p:sldLayoutId id="2147483658" r:id="rId14"/>
+    <p:sldLayoutId id="2147483659" r:id="rId15"/>
   </p:sldLayoutIdLst>
   <p:txStyles>
     <p:titleStyle>
@@ -7297,49 +5764,6 @@
 </a:themeOverride>
 </file>
 
-<file path=ppt/theme/themeOverride6.xml><?xml version="1.0" encoding="utf-8"?>
-<a:themeOverride xmlns:a="http://schemas.openxmlformats.org/drawingml/2006/main">
-  <a:clrScheme name="Office">
-    <a:dk1>
-      <a:sysClr val="windowText" lastClr="000000"/>
-    </a:dk1>
-    <a:lt1>
-      <a:sysClr val="window" lastClr="FFFFFF"/>
-    </a:lt1>
-    <a:dk2>
-      <a:srgbClr val="1F497D"/>
-    </a:dk2>
-    <a:lt2>
-      <a:srgbClr val="EEECE1"/>
-    </a:lt2>
-    <a:accent1>
-      <a:srgbClr val="4F81BD"/>
-    </a:accent1>
-    <a:accent2>
-      <a:srgbClr val="C0504D"/>
-    </a:accent2>
-    <a:accent3>
-      <a:srgbClr val="9BBB59"/>
-    </a:accent3>
-    <a:accent4>
-      <a:srgbClr val="8064A2"/>
-    </a:accent4>
-    <a:accent5>
-      <a:srgbClr val="4BACC6"/>
-    </a:accent5>
-    <a:accent6>
-      <a:srgbClr val="F79646"/>
-    </a:accent6>
-    <a:hlink>
-      <a:srgbClr val="0000FF"/>
-    </a:hlink>
-    <a:folHlink>
-      <a:srgbClr val="800080"/>
-    </a:folHlink>
-  </a:clrScheme>
-</a:themeOverride>
-</file>
-
 <file path=customXml/item1.xml><?xml version="1.0" encoding="utf-8"?>
 <?mso-contentType ?>
 <FormTemplates xmlns="http://schemas.microsoft.com/sharepoint/v3/contenttype/forms">
@@ -7350,9 +5774,141 @@
 </file>
 
 <file path=customXml/item2.xml><?xml version="1.0" encoding="utf-8"?>
-<p:properties xmlns:p="http://schemas.microsoft.com/office/2006/metadata/properties" xmlns:xsi="http://www.w3.org/2001/XMLSchema-instance" xmlns:pc="http://schemas.microsoft.com/office/infopath/2007/PartnerControls">
-  <documentManagement/>
-</p:properties>
+<ct:contentTypeSchema xmlns:ct="http://schemas.microsoft.com/office/2006/metadata/contentType" xmlns:ma="http://schemas.microsoft.com/office/2006/metadata/properties/metaAttributes" ct:_="" ma:_="" ma:contentTypeName="Document" ma:contentTypeID="0x010100E69987ED4D0F3F47BA33116175D6C093" ma:contentTypeVersion="3" ma:contentTypeDescription="Create a new document." ma:contentTypeScope="" ma:versionID="b377e87a9fdb0adfbe59c8cbc16d9e06">
+  <xsd:schema xmlns:xsd="http://www.w3.org/2001/XMLSchema" xmlns:xs="http://www.w3.org/2001/XMLSchema" xmlns:p="http://schemas.microsoft.com/office/2006/metadata/properties" xmlns:ns2="4d118d9b-448c-4a54-90d4-6d126d04e28f" targetNamespace="http://schemas.microsoft.com/office/2006/metadata/properties" ma:root="true" ma:fieldsID="142a0c039391e3f54e2425d6548dcea2" ns2:_="">
+    <xsd:import namespace="4d118d9b-448c-4a54-90d4-6d126d04e28f"/>
+    <xsd:element name="properties">
+      <xsd:complexType>
+        <xsd:sequence>
+          <xsd:element name="documentManagement">
+            <xsd:complexType>
+              <xsd:all>
+                <xsd:element ref="ns2:MediaServiceMetadata" minOccurs="0"/>
+                <xsd:element ref="ns2:MediaServiceFastMetadata" minOccurs="0"/>
+                <xsd:element ref="ns2:MediaServiceSearchProperties" minOccurs="0"/>
+              </xsd:all>
+            </xsd:complexType>
+          </xsd:element>
+        </xsd:sequence>
+      </xsd:complexType>
+    </xsd:element>
+  </xsd:schema>
+  <xsd:schema xmlns:xsd="http://www.w3.org/2001/XMLSchema" xmlns:xs="http://www.w3.org/2001/XMLSchema" xmlns:dms="http://schemas.microsoft.com/office/2006/documentManagement/types" xmlns:pc="http://schemas.microsoft.com/office/infopath/2007/PartnerControls" targetNamespace="4d118d9b-448c-4a54-90d4-6d126d04e28f" elementFormDefault="qualified">
+    <xsd:import namespace="http://schemas.microsoft.com/office/2006/documentManagement/types"/>
+    <xsd:import namespace="http://schemas.microsoft.com/office/infopath/2007/PartnerControls"/>
+    <xsd:element name="MediaServiceMetadata" ma:index="8" nillable="true" ma:displayName="MediaServiceMetadata" ma:hidden="true" ma:internalName="MediaServiceMetadata" ma:readOnly="true">
+      <xsd:simpleType>
+        <xsd:restriction base="dms:Note"/>
+      </xsd:simpleType>
+    </xsd:element>
+    <xsd:element name="MediaServiceFastMetadata" ma:index="9" nillable="true" ma:displayName="MediaServiceFastMetadata" ma:hidden="true" ma:internalName="MediaServiceFastMetadata" ma:readOnly="true">
+      <xsd:simpleType>
+        <xsd:restriction base="dms:Note"/>
+      </xsd:simpleType>
+    </xsd:element>
+    <xsd:element name="MediaServiceSearchProperties" ma:index="10" nillable="true" ma:displayName="MediaServiceSearchProperties" ma:hidden="true" ma:internalName="MediaServiceSearchProperties" ma:readOnly="true">
+      <xsd:simpleType>
+        <xsd:restriction base="dms:Note"/>
+      </xsd:simpleType>
+    </xsd:element>
+  </xsd:schema>
+  <xsd:schema xmlns="http://schemas.openxmlformats.org/package/2006/metadata/core-properties" xmlns:xsd="http://www.w3.org/2001/XMLSchema" xmlns:xsi="http://www.w3.org/2001/XMLSchema-instance" xmlns:dc="http://purl.org/dc/elements/1.1/" xmlns:dcterms="http://purl.org/dc/terms/" xmlns:odoc="http://schemas.microsoft.com/internal/obd" targetNamespace="http://schemas.openxmlformats.org/package/2006/metadata/core-properties" elementFormDefault="qualified" attributeFormDefault="unqualified" blockDefault="#all">
+    <xsd:import namespace="http://purl.org/dc/elements/1.1/" schemaLocation="http://dublincore.org/schemas/xmls/qdc/2003/04/02/dc.xsd"/>
+    <xsd:import namespace="http://purl.org/dc/terms/" schemaLocation="http://dublincore.org/schemas/xmls/qdc/2003/04/02/dcterms.xsd"/>
+    <xsd:element name="coreProperties" type="CT_coreProperties"/>
+    <xsd:complexType name="CT_coreProperties">
+      <xsd:all>
+        <xsd:element ref="dc:creator" minOccurs="0" maxOccurs="1"/>
+        <xsd:element ref="dcterms:created" minOccurs="0" maxOccurs="1"/>
+        <xsd:element ref="dc:identifier" minOccurs="0" maxOccurs="1"/>
+        <xsd:element name="contentType" minOccurs="0" maxOccurs="1" type="xsd:string" ma:index="0" ma:displayName="Content Type"/>
+        <xsd:element ref="dc:title" minOccurs="0" maxOccurs="1" ma:index="4" ma:displayName="Title"/>
+        <xsd:element ref="dc:subject" minOccurs="0" maxOccurs="1"/>
+        <xsd:element ref="dc:description" minOccurs="0" maxOccurs="1"/>
+        <xsd:element name="keywords" minOccurs="0" maxOccurs="1" type="xsd:string"/>
+        <xsd:element ref="dc:language" minOccurs="0" maxOccurs="1"/>
+        <xsd:element name="category" minOccurs="0" maxOccurs="1" type="xsd:string"/>
+        <xsd:element name="version" minOccurs="0" maxOccurs="1" type="xsd:string"/>
+        <xsd:element name="revision" minOccurs="0" maxOccurs="1" type="xsd:string">
+          <xsd:annotation>
+            <xsd:documentation>
+                        This value indicates the number of saves or revisions. The application is responsible for updating this value after each revision.
+                    </xsd:documentation>
+          </xsd:annotation>
+        </xsd:element>
+        <xsd:element name="lastModifiedBy" minOccurs="0" maxOccurs="1" type="xsd:string"/>
+        <xsd:element ref="dcterms:modified" minOccurs="0" maxOccurs="1"/>
+        <xsd:element name="contentStatus" minOccurs="0" maxOccurs="1" type="xsd:string"/>
+      </xsd:all>
+    </xsd:complexType>
+  </xsd:schema>
+  <xs:schema xmlns:pc="http://schemas.microsoft.com/office/infopath/2007/PartnerControls" xmlns:xs="http://www.w3.org/2001/XMLSchema" targetNamespace="http://schemas.microsoft.com/office/infopath/2007/PartnerControls" elementFormDefault="qualified" attributeFormDefault="unqualified">
+    <xs:element name="Person">
+      <xs:complexType>
+        <xs:sequence>
+          <xs:element ref="pc:DisplayName" minOccurs="0"/>
+          <xs:element ref="pc:AccountId" minOccurs="0"/>
+          <xs:element ref="pc:AccountType" minOccurs="0"/>
+        </xs:sequence>
+      </xs:complexType>
+    </xs:element>
+    <xs:element name="DisplayName" type="xs:string"/>
+    <xs:element name="AccountId" type="xs:string"/>
+    <xs:element name="AccountType" type="xs:string"/>
+    <xs:element name="BDCAssociatedEntity">
+      <xs:complexType>
+        <xs:sequence>
+          <xs:element ref="pc:BDCEntity" minOccurs="0" maxOccurs="unbounded"/>
+        </xs:sequence>
+        <xs:attribute ref="pc:EntityNamespace"/>
+        <xs:attribute ref="pc:EntityName"/>
+        <xs:attribute ref="pc:SystemInstanceName"/>
+        <xs:attribute ref="pc:AssociationName"/>
+      </xs:complexType>
+    </xs:element>
+    <xs:attribute name="EntityNamespace" type="xs:string"/>
+    <xs:attribute name="EntityName" type="xs:string"/>
+    <xs:attribute name="SystemInstanceName" type="xs:string"/>
+    <xs:attribute name="AssociationName" type="xs:string"/>
+    <xs:element name="BDCEntity">
+      <xs:complexType>
+        <xs:sequence>
+          <xs:element ref="pc:EntityDisplayName" minOccurs="0"/>
+          <xs:element ref="pc:EntityInstanceReference" minOccurs="0"/>
+          <xs:element ref="pc:EntityId1" minOccurs="0"/>
+          <xs:element ref="pc:EntityId2" minOccurs="0"/>
+          <xs:element ref="pc:EntityId3" minOccurs="0"/>
+          <xs:element ref="pc:EntityId4" minOccurs="0"/>
+          <xs:element ref="pc:EntityId5" minOccurs="0"/>
+        </xs:sequence>
+      </xs:complexType>
+    </xs:element>
+    <xs:element name="EntityDisplayName" type="xs:string"/>
+    <xs:element name="EntityInstanceReference" type="xs:string"/>
+    <xs:element name="EntityId1" type="xs:string"/>
+    <xs:element name="EntityId2" type="xs:string"/>
+    <xs:element name="EntityId3" type="xs:string"/>
+    <xs:element name="EntityId4" type="xs:string"/>
+    <xs:element name="EntityId5" type="xs:string"/>
+    <xs:element name="Terms">
+      <xs:complexType>
+        <xs:sequence>
+          <xs:element ref="pc:TermInfo" minOccurs="0" maxOccurs="unbounded"/>
+        </xs:sequence>
+      </xs:complexType>
+    </xs:element>
+    <xs:element name="TermInfo">
+      <xs:complexType>
+        <xs:sequence>
+          <xs:element ref="pc:TermName" minOccurs="0"/>
+          <xs:element ref="pc:TermId" minOccurs="0"/>
+        </xs:sequence>
+      </xs:complexType>
+    </xs:element>
+    <xs:element name="TermName" type="xs:string"/>
+    <xs:element name="TermId" type="xs:string"/>
+  </xs:schema>
+</ct:contentTypeSchema>
 </file>
 
 <file path=customXml/item3.xml><?xml version="1.0" encoding="utf-8"?>
@@ -7494,141 +6050,9 @@
 </file>
 
 <file path=customXml/item4.xml><?xml version="1.0" encoding="utf-8"?>
-<ct:contentTypeSchema xmlns:ct="http://schemas.microsoft.com/office/2006/metadata/contentType" xmlns:ma="http://schemas.microsoft.com/office/2006/metadata/properties/metaAttributes" ct:_="" ma:_="" ma:contentTypeName="Document" ma:contentTypeID="0x010100E69987ED4D0F3F47BA33116175D6C093" ma:contentTypeVersion="3" ma:contentTypeDescription="Create a new document." ma:contentTypeScope="" ma:versionID="b377e87a9fdb0adfbe59c8cbc16d9e06">
-  <xsd:schema xmlns:xsd="http://www.w3.org/2001/XMLSchema" xmlns:xs="http://www.w3.org/2001/XMLSchema" xmlns:p="http://schemas.microsoft.com/office/2006/metadata/properties" xmlns:ns2="4d118d9b-448c-4a54-90d4-6d126d04e28f" targetNamespace="http://schemas.microsoft.com/office/2006/metadata/properties" ma:root="true" ma:fieldsID="142a0c039391e3f54e2425d6548dcea2" ns2:_="">
-    <xsd:import namespace="4d118d9b-448c-4a54-90d4-6d126d04e28f"/>
-    <xsd:element name="properties">
-      <xsd:complexType>
-        <xsd:sequence>
-          <xsd:element name="documentManagement">
-            <xsd:complexType>
-              <xsd:all>
-                <xsd:element ref="ns2:MediaServiceMetadata" minOccurs="0"/>
-                <xsd:element ref="ns2:MediaServiceFastMetadata" minOccurs="0"/>
-                <xsd:element ref="ns2:MediaServiceSearchProperties" minOccurs="0"/>
-              </xsd:all>
-            </xsd:complexType>
-          </xsd:element>
-        </xsd:sequence>
-      </xsd:complexType>
-    </xsd:element>
-  </xsd:schema>
-  <xsd:schema xmlns:xsd="http://www.w3.org/2001/XMLSchema" xmlns:xs="http://www.w3.org/2001/XMLSchema" xmlns:dms="http://schemas.microsoft.com/office/2006/documentManagement/types" xmlns:pc="http://schemas.microsoft.com/office/infopath/2007/PartnerControls" targetNamespace="4d118d9b-448c-4a54-90d4-6d126d04e28f" elementFormDefault="qualified">
-    <xsd:import namespace="http://schemas.microsoft.com/office/2006/documentManagement/types"/>
-    <xsd:import namespace="http://schemas.microsoft.com/office/infopath/2007/PartnerControls"/>
-    <xsd:element name="MediaServiceMetadata" ma:index="8" nillable="true" ma:displayName="MediaServiceMetadata" ma:hidden="true" ma:internalName="MediaServiceMetadata" ma:readOnly="true">
-      <xsd:simpleType>
-        <xsd:restriction base="dms:Note"/>
-      </xsd:simpleType>
-    </xsd:element>
-    <xsd:element name="MediaServiceFastMetadata" ma:index="9" nillable="true" ma:displayName="MediaServiceFastMetadata" ma:hidden="true" ma:internalName="MediaServiceFastMetadata" ma:readOnly="true">
-      <xsd:simpleType>
-        <xsd:restriction base="dms:Note"/>
-      </xsd:simpleType>
-    </xsd:element>
-    <xsd:element name="MediaServiceSearchProperties" ma:index="10" nillable="true" ma:displayName="MediaServiceSearchProperties" ma:hidden="true" ma:internalName="MediaServiceSearchProperties" ma:readOnly="true">
-      <xsd:simpleType>
-        <xsd:restriction base="dms:Note"/>
-      </xsd:simpleType>
-    </xsd:element>
-  </xsd:schema>
-  <xsd:schema xmlns="http://schemas.openxmlformats.org/package/2006/metadata/core-properties" xmlns:xsd="http://www.w3.org/2001/XMLSchema" xmlns:xsi="http://www.w3.org/2001/XMLSchema-instance" xmlns:dc="http://purl.org/dc/elements/1.1/" xmlns:dcterms="http://purl.org/dc/terms/" xmlns:odoc="http://schemas.microsoft.com/internal/obd" targetNamespace="http://schemas.openxmlformats.org/package/2006/metadata/core-properties" elementFormDefault="qualified" attributeFormDefault="unqualified" blockDefault="#all">
-    <xsd:import namespace="http://purl.org/dc/elements/1.1/" schemaLocation="http://dublincore.org/schemas/xmls/qdc/2003/04/02/dc.xsd"/>
-    <xsd:import namespace="http://purl.org/dc/terms/" schemaLocation="http://dublincore.org/schemas/xmls/qdc/2003/04/02/dcterms.xsd"/>
-    <xsd:element name="coreProperties" type="CT_coreProperties"/>
-    <xsd:complexType name="CT_coreProperties">
-      <xsd:all>
-        <xsd:element ref="dc:creator" minOccurs="0" maxOccurs="1"/>
-        <xsd:element ref="dcterms:created" minOccurs="0" maxOccurs="1"/>
-        <xsd:element ref="dc:identifier" minOccurs="0" maxOccurs="1"/>
-        <xsd:element name="contentType" minOccurs="0" maxOccurs="1" type="xsd:string" ma:index="0" ma:displayName="Content Type"/>
-        <xsd:element ref="dc:title" minOccurs="0" maxOccurs="1" ma:index="4" ma:displayName="Title"/>
-        <xsd:element ref="dc:subject" minOccurs="0" maxOccurs="1"/>
-        <xsd:element ref="dc:description" minOccurs="0" maxOccurs="1"/>
-        <xsd:element name="keywords" minOccurs="0" maxOccurs="1" type="xsd:string"/>
-        <xsd:element ref="dc:language" minOccurs="0" maxOccurs="1"/>
-        <xsd:element name="category" minOccurs="0" maxOccurs="1" type="xsd:string"/>
-        <xsd:element name="version" minOccurs="0" maxOccurs="1" type="xsd:string"/>
-        <xsd:element name="revision" minOccurs="0" maxOccurs="1" type="xsd:string">
-          <xsd:annotation>
-            <xsd:documentation>
-                        This value indicates the number of saves or revisions. The application is responsible for updating this value after each revision.
-                    </xsd:documentation>
-          </xsd:annotation>
-        </xsd:element>
-        <xsd:element name="lastModifiedBy" minOccurs="0" maxOccurs="1" type="xsd:string"/>
-        <xsd:element ref="dcterms:modified" minOccurs="0" maxOccurs="1"/>
-        <xsd:element name="contentStatus" minOccurs="0" maxOccurs="1" type="xsd:string"/>
-      </xsd:all>
-    </xsd:complexType>
-  </xsd:schema>
-  <xs:schema xmlns:pc="http://schemas.microsoft.com/office/infopath/2007/PartnerControls" xmlns:xs="http://www.w3.org/2001/XMLSchema" targetNamespace="http://schemas.microsoft.com/office/infopath/2007/PartnerControls" elementFormDefault="qualified" attributeFormDefault="unqualified">
-    <xs:element name="Person">
-      <xs:complexType>
-        <xs:sequence>
-          <xs:element ref="pc:DisplayName" minOccurs="0"/>
-          <xs:element ref="pc:AccountId" minOccurs="0"/>
-          <xs:element ref="pc:AccountType" minOccurs="0"/>
-        </xs:sequence>
-      </xs:complexType>
-    </xs:element>
-    <xs:element name="DisplayName" type="xs:string"/>
-    <xs:element name="AccountId" type="xs:string"/>
-    <xs:element name="AccountType" type="xs:string"/>
-    <xs:element name="BDCAssociatedEntity">
-      <xs:complexType>
-        <xs:sequence>
-          <xs:element ref="pc:BDCEntity" minOccurs="0" maxOccurs="unbounded"/>
-        </xs:sequence>
-        <xs:attribute ref="pc:EntityNamespace"/>
-        <xs:attribute ref="pc:EntityName"/>
-        <xs:attribute ref="pc:SystemInstanceName"/>
-        <xs:attribute ref="pc:AssociationName"/>
-      </xs:complexType>
-    </xs:element>
-    <xs:attribute name="EntityNamespace" type="xs:string"/>
-    <xs:attribute name="EntityName" type="xs:string"/>
-    <xs:attribute name="SystemInstanceName" type="xs:string"/>
-    <xs:attribute name="AssociationName" type="xs:string"/>
-    <xs:element name="BDCEntity">
-      <xs:complexType>
-        <xs:sequence>
-          <xs:element ref="pc:EntityDisplayName" minOccurs="0"/>
-          <xs:element ref="pc:EntityInstanceReference" minOccurs="0"/>
-          <xs:element ref="pc:EntityId1" minOccurs="0"/>
-          <xs:element ref="pc:EntityId2" minOccurs="0"/>
-          <xs:element ref="pc:EntityId3" minOccurs="0"/>
-          <xs:element ref="pc:EntityId4" minOccurs="0"/>
-          <xs:element ref="pc:EntityId5" minOccurs="0"/>
-        </xs:sequence>
-      </xs:complexType>
-    </xs:element>
-    <xs:element name="EntityDisplayName" type="xs:string"/>
-    <xs:element name="EntityInstanceReference" type="xs:string"/>
-    <xs:element name="EntityId1" type="xs:string"/>
-    <xs:element name="EntityId2" type="xs:string"/>
-    <xs:element name="EntityId3" type="xs:string"/>
-    <xs:element name="EntityId4" type="xs:string"/>
-    <xs:element name="EntityId5" type="xs:string"/>
-    <xs:element name="Terms">
-      <xs:complexType>
-        <xs:sequence>
-          <xs:element ref="pc:TermInfo" minOccurs="0" maxOccurs="unbounded"/>
-        </xs:sequence>
-      </xs:complexType>
-    </xs:element>
-    <xs:element name="TermInfo">
-      <xs:complexType>
-        <xs:sequence>
-          <xs:element ref="pc:TermName" minOccurs="0"/>
-          <xs:element ref="pc:TermId" minOccurs="0"/>
-        </xs:sequence>
-      </xs:complexType>
-    </xs:element>
-    <xs:element name="TermName" type="xs:string"/>
-    <xs:element name="TermId" type="xs:string"/>
-  </xs:schema>
-</ct:contentTypeSchema>
+<p:properties xmlns:p="http://schemas.microsoft.com/office/2006/metadata/properties" xmlns:xsi="http://www.w3.org/2001/XMLSchema-instance" xmlns:pc="http://schemas.microsoft.com/office/infopath/2007/PartnerControls">
+  <documentManagement/>
+</p:properties>
 </file>
 
 <file path=customXml/itemProps1.xml><?xml version="1.0" encoding="utf-8"?>
@@ -7640,10 +6064,19 @@
 </file>
 
 <file path=customXml/itemProps2.xml><?xml version="1.0" encoding="utf-8"?>
-<ds:datastoreItem xmlns:ds="http://schemas.openxmlformats.org/officeDocument/2006/customXml" ds:itemID="{9D39D6F7-DEC6-43E0-B150-2B295957F91D}">
+<ds:datastoreItem xmlns:ds="http://schemas.openxmlformats.org/officeDocument/2006/customXml" ds:itemID="{10BB2122-50FB-4777-8728-D52F7CF1AED8}">
   <ds:schemaRefs>
+    <ds:schemaRef ds:uri="4d118d9b-448c-4a54-90d4-6d126d04e28f"/>
+    <ds:schemaRef ds:uri="http://purl.org/dc/elements/1.1/"/>
+    <ds:schemaRef ds:uri="http://purl.org/dc/terms/"/>
+    <ds:schemaRef ds:uri="http://schemas.microsoft.com/internal/obd"/>
+    <ds:schemaRef ds:uri="http://schemas.microsoft.com/office/2006/documentManagement/types"/>
+    <ds:schemaRef ds:uri="http://schemas.microsoft.com/office/2006/metadata/contentType"/>
     <ds:schemaRef ds:uri="http://schemas.microsoft.com/office/2006/metadata/properties"/>
+    <ds:schemaRef ds:uri="http://schemas.microsoft.com/office/2006/metadata/properties/metaAttributes"/>
     <ds:schemaRef ds:uri="http://schemas.microsoft.com/office/infopath/2007/PartnerControls"/>
+    <ds:schemaRef ds:uri="http://schemas.openxmlformats.org/package/2006/metadata/core-properties"/>
+    <ds:schemaRef ds:uri="http://www.w3.org/2001/XMLSchema"/>
   </ds:schemaRefs>
 </ds:datastoreItem>
 </file>
@@ -7667,19 +6100,10 @@
 </file>
 
 <file path=customXml/itemProps4.xml><?xml version="1.0" encoding="utf-8"?>
-<ds:datastoreItem xmlns:ds="http://schemas.openxmlformats.org/officeDocument/2006/customXml" ds:itemID="{10BB2122-50FB-4777-8728-D52F7CF1AED8}">
+<ds:datastoreItem xmlns:ds="http://schemas.openxmlformats.org/officeDocument/2006/customXml" ds:itemID="{9D39D6F7-DEC6-43E0-B150-2B295957F91D}">
   <ds:schemaRefs>
-    <ds:schemaRef ds:uri="4d118d9b-448c-4a54-90d4-6d126d04e28f"/>
-    <ds:schemaRef ds:uri="http://purl.org/dc/elements/1.1/"/>
-    <ds:schemaRef ds:uri="http://purl.org/dc/terms/"/>
-    <ds:schemaRef ds:uri="http://schemas.microsoft.com/internal/obd"/>
-    <ds:schemaRef ds:uri="http://schemas.microsoft.com/office/2006/documentManagement/types"/>
-    <ds:schemaRef ds:uri="http://schemas.microsoft.com/office/2006/metadata/contentType"/>
     <ds:schemaRef ds:uri="http://schemas.microsoft.com/office/2006/metadata/properties"/>
-    <ds:schemaRef ds:uri="http://schemas.microsoft.com/office/2006/metadata/properties/metaAttributes"/>
     <ds:schemaRef ds:uri="http://schemas.microsoft.com/office/infopath/2007/PartnerControls"/>
-    <ds:schemaRef ds:uri="http://schemas.openxmlformats.org/package/2006/metadata/core-properties"/>
-    <ds:schemaRef ds:uri="http://www.w3.org/2001/XMLSchema"/>
   </ds:schemaRefs>
 </ds:datastoreItem>
 </file>
</xml_diff>

<commit_message>
- Enhanced the script to generate user guide from Markdown files to support images and links. - Updated Documentation to include `SSB Retuning Automations - Interfaces` section into the User Guide. - Adjusted PPT image layouts and placeholders by section.
</commit_message>
<xml_diff>
--- a/assets/templates_pptx/UserGuideTemplate.pptx
+++ b/assets/templates_pptx/UserGuideTemplate.pptx
@@ -2375,7 +2375,7 @@
           </a:bodyPr>
           <a:lstStyle>
             <a:lvl1pPr algn="l">
-              <a:defRPr sz="3600"/>
+              <a:defRPr sz="3200"/>
             </a:lvl1pPr>
           </a:lstStyle>
           <a:p>
@@ -2550,7 +2550,7 @@
           </a:bodyPr>
           <a:lstStyle>
             <a:lvl1pPr algn="l">
-              <a:defRPr sz="3600"/>
+              <a:defRPr sz="3200"/>
             </a:lvl1pPr>
           </a:lstStyle>
           <a:p>
@@ -2810,7 +2810,7 @@
           </a:bodyPr>
           <a:lstStyle>
             <a:lvl1pPr algn="l">
-              <a:defRPr sz="3600"/>
+              <a:defRPr sz="3200"/>
             </a:lvl1pPr>
           </a:lstStyle>
           <a:p>
@@ -3155,7 +3155,7 @@
           </a:bodyPr>
           <a:lstStyle>
             <a:lvl1pPr algn="l">
-              <a:defRPr sz="3600"/>
+              <a:defRPr sz="3200"/>
             </a:lvl1pPr>
           </a:lstStyle>
           <a:p>
@@ -3295,7 +3295,7 @@
           </a:bodyPr>
           <a:lstStyle>
             <a:lvl1pPr algn="l">
-              <a:defRPr sz="3600"/>
+              <a:defRPr sz="3200"/>
             </a:lvl1pPr>
           </a:lstStyle>
           <a:p>
@@ -5774,141 +5774,9 @@
 </file>
 
 <file path=customXml/item2.xml><?xml version="1.0" encoding="utf-8"?>
-<ct:contentTypeSchema xmlns:ct="http://schemas.microsoft.com/office/2006/metadata/contentType" xmlns:ma="http://schemas.microsoft.com/office/2006/metadata/properties/metaAttributes" ct:_="" ma:_="" ma:contentTypeName="Document" ma:contentTypeID="0x010100E69987ED4D0F3F47BA33116175D6C093" ma:contentTypeVersion="3" ma:contentTypeDescription="Create a new document." ma:contentTypeScope="" ma:versionID="b377e87a9fdb0adfbe59c8cbc16d9e06">
-  <xsd:schema xmlns:xsd="http://www.w3.org/2001/XMLSchema" xmlns:xs="http://www.w3.org/2001/XMLSchema" xmlns:p="http://schemas.microsoft.com/office/2006/metadata/properties" xmlns:ns2="4d118d9b-448c-4a54-90d4-6d126d04e28f" targetNamespace="http://schemas.microsoft.com/office/2006/metadata/properties" ma:root="true" ma:fieldsID="142a0c039391e3f54e2425d6548dcea2" ns2:_="">
-    <xsd:import namespace="4d118d9b-448c-4a54-90d4-6d126d04e28f"/>
-    <xsd:element name="properties">
-      <xsd:complexType>
-        <xsd:sequence>
-          <xsd:element name="documentManagement">
-            <xsd:complexType>
-              <xsd:all>
-                <xsd:element ref="ns2:MediaServiceMetadata" minOccurs="0"/>
-                <xsd:element ref="ns2:MediaServiceFastMetadata" minOccurs="0"/>
-                <xsd:element ref="ns2:MediaServiceSearchProperties" minOccurs="0"/>
-              </xsd:all>
-            </xsd:complexType>
-          </xsd:element>
-        </xsd:sequence>
-      </xsd:complexType>
-    </xsd:element>
-  </xsd:schema>
-  <xsd:schema xmlns:xsd="http://www.w3.org/2001/XMLSchema" xmlns:xs="http://www.w3.org/2001/XMLSchema" xmlns:dms="http://schemas.microsoft.com/office/2006/documentManagement/types" xmlns:pc="http://schemas.microsoft.com/office/infopath/2007/PartnerControls" targetNamespace="4d118d9b-448c-4a54-90d4-6d126d04e28f" elementFormDefault="qualified">
-    <xsd:import namespace="http://schemas.microsoft.com/office/2006/documentManagement/types"/>
-    <xsd:import namespace="http://schemas.microsoft.com/office/infopath/2007/PartnerControls"/>
-    <xsd:element name="MediaServiceMetadata" ma:index="8" nillable="true" ma:displayName="MediaServiceMetadata" ma:hidden="true" ma:internalName="MediaServiceMetadata" ma:readOnly="true">
-      <xsd:simpleType>
-        <xsd:restriction base="dms:Note"/>
-      </xsd:simpleType>
-    </xsd:element>
-    <xsd:element name="MediaServiceFastMetadata" ma:index="9" nillable="true" ma:displayName="MediaServiceFastMetadata" ma:hidden="true" ma:internalName="MediaServiceFastMetadata" ma:readOnly="true">
-      <xsd:simpleType>
-        <xsd:restriction base="dms:Note"/>
-      </xsd:simpleType>
-    </xsd:element>
-    <xsd:element name="MediaServiceSearchProperties" ma:index="10" nillable="true" ma:displayName="MediaServiceSearchProperties" ma:hidden="true" ma:internalName="MediaServiceSearchProperties" ma:readOnly="true">
-      <xsd:simpleType>
-        <xsd:restriction base="dms:Note"/>
-      </xsd:simpleType>
-    </xsd:element>
-  </xsd:schema>
-  <xsd:schema xmlns="http://schemas.openxmlformats.org/package/2006/metadata/core-properties" xmlns:xsd="http://www.w3.org/2001/XMLSchema" xmlns:xsi="http://www.w3.org/2001/XMLSchema-instance" xmlns:dc="http://purl.org/dc/elements/1.1/" xmlns:dcterms="http://purl.org/dc/terms/" xmlns:odoc="http://schemas.microsoft.com/internal/obd" targetNamespace="http://schemas.openxmlformats.org/package/2006/metadata/core-properties" elementFormDefault="qualified" attributeFormDefault="unqualified" blockDefault="#all">
-    <xsd:import namespace="http://purl.org/dc/elements/1.1/" schemaLocation="http://dublincore.org/schemas/xmls/qdc/2003/04/02/dc.xsd"/>
-    <xsd:import namespace="http://purl.org/dc/terms/" schemaLocation="http://dublincore.org/schemas/xmls/qdc/2003/04/02/dcterms.xsd"/>
-    <xsd:element name="coreProperties" type="CT_coreProperties"/>
-    <xsd:complexType name="CT_coreProperties">
-      <xsd:all>
-        <xsd:element ref="dc:creator" minOccurs="0" maxOccurs="1"/>
-        <xsd:element ref="dcterms:created" minOccurs="0" maxOccurs="1"/>
-        <xsd:element ref="dc:identifier" minOccurs="0" maxOccurs="1"/>
-        <xsd:element name="contentType" minOccurs="0" maxOccurs="1" type="xsd:string" ma:index="0" ma:displayName="Content Type"/>
-        <xsd:element ref="dc:title" minOccurs="0" maxOccurs="1" ma:index="4" ma:displayName="Title"/>
-        <xsd:element ref="dc:subject" minOccurs="0" maxOccurs="1"/>
-        <xsd:element ref="dc:description" minOccurs="0" maxOccurs="1"/>
-        <xsd:element name="keywords" minOccurs="0" maxOccurs="1" type="xsd:string"/>
-        <xsd:element ref="dc:language" minOccurs="0" maxOccurs="1"/>
-        <xsd:element name="category" minOccurs="0" maxOccurs="1" type="xsd:string"/>
-        <xsd:element name="version" minOccurs="0" maxOccurs="1" type="xsd:string"/>
-        <xsd:element name="revision" minOccurs="0" maxOccurs="1" type="xsd:string">
-          <xsd:annotation>
-            <xsd:documentation>
-                        This value indicates the number of saves or revisions. The application is responsible for updating this value after each revision.
-                    </xsd:documentation>
-          </xsd:annotation>
-        </xsd:element>
-        <xsd:element name="lastModifiedBy" minOccurs="0" maxOccurs="1" type="xsd:string"/>
-        <xsd:element ref="dcterms:modified" minOccurs="0" maxOccurs="1"/>
-        <xsd:element name="contentStatus" minOccurs="0" maxOccurs="1" type="xsd:string"/>
-      </xsd:all>
-    </xsd:complexType>
-  </xsd:schema>
-  <xs:schema xmlns:pc="http://schemas.microsoft.com/office/infopath/2007/PartnerControls" xmlns:xs="http://www.w3.org/2001/XMLSchema" targetNamespace="http://schemas.microsoft.com/office/infopath/2007/PartnerControls" elementFormDefault="qualified" attributeFormDefault="unqualified">
-    <xs:element name="Person">
-      <xs:complexType>
-        <xs:sequence>
-          <xs:element ref="pc:DisplayName" minOccurs="0"/>
-          <xs:element ref="pc:AccountId" minOccurs="0"/>
-          <xs:element ref="pc:AccountType" minOccurs="0"/>
-        </xs:sequence>
-      </xs:complexType>
-    </xs:element>
-    <xs:element name="DisplayName" type="xs:string"/>
-    <xs:element name="AccountId" type="xs:string"/>
-    <xs:element name="AccountType" type="xs:string"/>
-    <xs:element name="BDCAssociatedEntity">
-      <xs:complexType>
-        <xs:sequence>
-          <xs:element ref="pc:BDCEntity" minOccurs="0" maxOccurs="unbounded"/>
-        </xs:sequence>
-        <xs:attribute ref="pc:EntityNamespace"/>
-        <xs:attribute ref="pc:EntityName"/>
-        <xs:attribute ref="pc:SystemInstanceName"/>
-        <xs:attribute ref="pc:AssociationName"/>
-      </xs:complexType>
-    </xs:element>
-    <xs:attribute name="EntityNamespace" type="xs:string"/>
-    <xs:attribute name="EntityName" type="xs:string"/>
-    <xs:attribute name="SystemInstanceName" type="xs:string"/>
-    <xs:attribute name="AssociationName" type="xs:string"/>
-    <xs:element name="BDCEntity">
-      <xs:complexType>
-        <xs:sequence>
-          <xs:element ref="pc:EntityDisplayName" minOccurs="0"/>
-          <xs:element ref="pc:EntityInstanceReference" minOccurs="0"/>
-          <xs:element ref="pc:EntityId1" minOccurs="0"/>
-          <xs:element ref="pc:EntityId2" minOccurs="0"/>
-          <xs:element ref="pc:EntityId3" minOccurs="0"/>
-          <xs:element ref="pc:EntityId4" minOccurs="0"/>
-          <xs:element ref="pc:EntityId5" minOccurs="0"/>
-        </xs:sequence>
-      </xs:complexType>
-    </xs:element>
-    <xs:element name="EntityDisplayName" type="xs:string"/>
-    <xs:element name="EntityInstanceReference" type="xs:string"/>
-    <xs:element name="EntityId1" type="xs:string"/>
-    <xs:element name="EntityId2" type="xs:string"/>
-    <xs:element name="EntityId3" type="xs:string"/>
-    <xs:element name="EntityId4" type="xs:string"/>
-    <xs:element name="EntityId5" type="xs:string"/>
-    <xs:element name="Terms">
-      <xs:complexType>
-        <xs:sequence>
-          <xs:element ref="pc:TermInfo" minOccurs="0" maxOccurs="unbounded"/>
-        </xs:sequence>
-      </xs:complexType>
-    </xs:element>
-    <xs:element name="TermInfo">
-      <xs:complexType>
-        <xs:sequence>
-          <xs:element ref="pc:TermName" minOccurs="0"/>
-          <xs:element ref="pc:TermId" minOccurs="0"/>
-        </xs:sequence>
-      </xs:complexType>
-    </xs:element>
-    <xs:element name="TermName" type="xs:string"/>
-    <xs:element name="TermId" type="xs:string"/>
-  </xs:schema>
-</ct:contentTypeSchema>
+<p:properties xmlns:p="http://schemas.microsoft.com/office/2006/metadata/properties" xmlns:xsi="http://www.w3.org/2001/XMLSchema-instance" xmlns:pc="http://schemas.microsoft.com/office/infopath/2007/PartnerControls">
+  <documentManagement/>
+</p:properties>
 </file>
 
 <file path=customXml/item3.xml><?xml version="1.0" encoding="utf-8"?>
@@ -6050,9 +5918,141 @@
 </file>
 
 <file path=customXml/item4.xml><?xml version="1.0" encoding="utf-8"?>
-<p:properties xmlns:p="http://schemas.microsoft.com/office/2006/metadata/properties" xmlns:xsi="http://www.w3.org/2001/XMLSchema-instance" xmlns:pc="http://schemas.microsoft.com/office/infopath/2007/PartnerControls">
-  <documentManagement/>
-</p:properties>
+<ct:contentTypeSchema xmlns:ct="http://schemas.microsoft.com/office/2006/metadata/contentType" xmlns:ma="http://schemas.microsoft.com/office/2006/metadata/properties/metaAttributes" ct:_="" ma:_="" ma:contentTypeName="Document" ma:contentTypeID="0x010100E69987ED4D0F3F47BA33116175D6C093" ma:contentTypeVersion="3" ma:contentTypeDescription="Create a new document." ma:contentTypeScope="" ma:versionID="b377e87a9fdb0adfbe59c8cbc16d9e06">
+  <xsd:schema xmlns:xsd="http://www.w3.org/2001/XMLSchema" xmlns:xs="http://www.w3.org/2001/XMLSchema" xmlns:p="http://schemas.microsoft.com/office/2006/metadata/properties" xmlns:ns2="4d118d9b-448c-4a54-90d4-6d126d04e28f" targetNamespace="http://schemas.microsoft.com/office/2006/metadata/properties" ma:root="true" ma:fieldsID="142a0c039391e3f54e2425d6548dcea2" ns2:_="">
+    <xsd:import namespace="4d118d9b-448c-4a54-90d4-6d126d04e28f"/>
+    <xsd:element name="properties">
+      <xsd:complexType>
+        <xsd:sequence>
+          <xsd:element name="documentManagement">
+            <xsd:complexType>
+              <xsd:all>
+                <xsd:element ref="ns2:MediaServiceMetadata" minOccurs="0"/>
+                <xsd:element ref="ns2:MediaServiceFastMetadata" minOccurs="0"/>
+                <xsd:element ref="ns2:MediaServiceSearchProperties" minOccurs="0"/>
+              </xsd:all>
+            </xsd:complexType>
+          </xsd:element>
+        </xsd:sequence>
+      </xsd:complexType>
+    </xsd:element>
+  </xsd:schema>
+  <xsd:schema xmlns:xsd="http://www.w3.org/2001/XMLSchema" xmlns:xs="http://www.w3.org/2001/XMLSchema" xmlns:dms="http://schemas.microsoft.com/office/2006/documentManagement/types" xmlns:pc="http://schemas.microsoft.com/office/infopath/2007/PartnerControls" targetNamespace="4d118d9b-448c-4a54-90d4-6d126d04e28f" elementFormDefault="qualified">
+    <xsd:import namespace="http://schemas.microsoft.com/office/2006/documentManagement/types"/>
+    <xsd:import namespace="http://schemas.microsoft.com/office/infopath/2007/PartnerControls"/>
+    <xsd:element name="MediaServiceMetadata" ma:index="8" nillable="true" ma:displayName="MediaServiceMetadata" ma:hidden="true" ma:internalName="MediaServiceMetadata" ma:readOnly="true">
+      <xsd:simpleType>
+        <xsd:restriction base="dms:Note"/>
+      </xsd:simpleType>
+    </xsd:element>
+    <xsd:element name="MediaServiceFastMetadata" ma:index="9" nillable="true" ma:displayName="MediaServiceFastMetadata" ma:hidden="true" ma:internalName="MediaServiceFastMetadata" ma:readOnly="true">
+      <xsd:simpleType>
+        <xsd:restriction base="dms:Note"/>
+      </xsd:simpleType>
+    </xsd:element>
+    <xsd:element name="MediaServiceSearchProperties" ma:index="10" nillable="true" ma:displayName="MediaServiceSearchProperties" ma:hidden="true" ma:internalName="MediaServiceSearchProperties" ma:readOnly="true">
+      <xsd:simpleType>
+        <xsd:restriction base="dms:Note"/>
+      </xsd:simpleType>
+    </xsd:element>
+  </xsd:schema>
+  <xsd:schema xmlns="http://schemas.openxmlformats.org/package/2006/metadata/core-properties" xmlns:xsd="http://www.w3.org/2001/XMLSchema" xmlns:xsi="http://www.w3.org/2001/XMLSchema-instance" xmlns:dc="http://purl.org/dc/elements/1.1/" xmlns:dcterms="http://purl.org/dc/terms/" xmlns:odoc="http://schemas.microsoft.com/internal/obd" targetNamespace="http://schemas.openxmlformats.org/package/2006/metadata/core-properties" elementFormDefault="qualified" attributeFormDefault="unqualified" blockDefault="#all">
+    <xsd:import namespace="http://purl.org/dc/elements/1.1/" schemaLocation="http://dublincore.org/schemas/xmls/qdc/2003/04/02/dc.xsd"/>
+    <xsd:import namespace="http://purl.org/dc/terms/" schemaLocation="http://dublincore.org/schemas/xmls/qdc/2003/04/02/dcterms.xsd"/>
+    <xsd:element name="coreProperties" type="CT_coreProperties"/>
+    <xsd:complexType name="CT_coreProperties">
+      <xsd:all>
+        <xsd:element ref="dc:creator" minOccurs="0" maxOccurs="1"/>
+        <xsd:element ref="dcterms:created" minOccurs="0" maxOccurs="1"/>
+        <xsd:element ref="dc:identifier" minOccurs="0" maxOccurs="1"/>
+        <xsd:element name="contentType" minOccurs="0" maxOccurs="1" type="xsd:string" ma:index="0" ma:displayName="Content Type"/>
+        <xsd:element ref="dc:title" minOccurs="0" maxOccurs="1" ma:index="4" ma:displayName="Title"/>
+        <xsd:element ref="dc:subject" minOccurs="0" maxOccurs="1"/>
+        <xsd:element ref="dc:description" minOccurs="0" maxOccurs="1"/>
+        <xsd:element name="keywords" minOccurs="0" maxOccurs="1" type="xsd:string"/>
+        <xsd:element ref="dc:language" minOccurs="0" maxOccurs="1"/>
+        <xsd:element name="category" minOccurs="0" maxOccurs="1" type="xsd:string"/>
+        <xsd:element name="version" minOccurs="0" maxOccurs="1" type="xsd:string"/>
+        <xsd:element name="revision" minOccurs="0" maxOccurs="1" type="xsd:string">
+          <xsd:annotation>
+            <xsd:documentation>
+                        This value indicates the number of saves or revisions. The application is responsible for updating this value after each revision.
+                    </xsd:documentation>
+          </xsd:annotation>
+        </xsd:element>
+        <xsd:element name="lastModifiedBy" minOccurs="0" maxOccurs="1" type="xsd:string"/>
+        <xsd:element ref="dcterms:modified" minOccurs="0" maxOccurs="1"/>
+        <xsd:element name="contentStatus" minOccurs="0" maxOccurs="1" type="xsd:string"/>
+      </xsd:all>
+    </xsd:complexType>
+  </xsd:schema>
+  <xs:schema xmlns:pc="http://schemas.microsoft.com/office/infopath/2007/PartnerControls" xmlns:xs="http://www.w3.org/2001/XMLSchema" targetNamespace="http://schemas.microsoft.com/office/infopath/2007/PartnerControls" elementFormDefault="qualified" attributeFormDefault="unqualified">
+    <xs:element name="Person">
+      <xs:complexType>
+        <xs:sequence>
+          <xs:element ref="pc:DisplayName" minOccurs="0"/>
+          <xs:element ref="pc:AccountId" minOccurs="0"/>
+          <xs:element ref="pc:AccountType" minOccurs="0"/>
+        </xs:sequence>
+      </xs:complexType>
+    </xs:element>
+    <xs:element name="DisplayName" type="xs:string"/>
+    <xs:element name="AccountId" type="xs:string"/>
+    <xs:element name="AccountType" type="xs:string"/>
+    <xs:element name="BDCAssociatedEntity">
+      <xs:complexType>
+        <xs:sequence>
+          <xs:element ref="pc:BDCEntity" minOccurs="0" maxOccurs="unbounded"/>
+        </xs:sequence>
+        <xs:attribute ref="pc:EntityNamespace"/>
+        <xs:attribute ref="pc:EntityName"/>
+        <xs:attribute ref="pc:SystemInstanceName"/>
+        <xs:attribute ref="pc:AssociationName"/>
+      </xs:complexType>
+    </xs:element>
+    <xs:attribute name="EntityNamespace" type="xs:string"/>
+    <xs:attribute name="EntityName" type="xs:string"/>
+    <xs:attribute name="SystemInstanceName" type="xs:string"/>
+    <xs:attribute name="AssociationName" type="xs:string"/>
+    <xs:element name="BDCEntity">
+      <xs:complexType>
+        <xs:sequence>
+          <xs:element ref="pc:EntityDisplayName" minOccurs="0"/>
+          <xs:element ref="pc:EntityInstanceReference" minOccurs="0"/>
+          <xs:element ref="pc:EntityId1" minOccurs="0"/>
+          <xs:element ref="pc:EntityId2" minOccurs="0"/>
+          <xs:element ref="pc:EntityId3" minOccurs="0"/>
+          <xs:element ref="pc:EntityId4" minOccurs="0"/>
+          <xs:element ref="pc:EntityId5" minOccurs="0"/>
+        </xs:sequence>
+      </xs:complexType>
+    </xs:element>
+    <xs:element name="EntityDisplayName" type="xs:string"/>
+    <xs:element name="EntityInstanceReference" type="xs:string"/>
+    <xs:element name="EntityId1" type="xs:string"/>
+    <xs:element name="EntityId2" type="xs:string"/>
+    <xs:element name="EntityId3" type="xs:string"/>
+    <xs:element name="EntityId4" type="xs:string"/>
+    <xs:element name="EntityId5" type="xs:string"/>
+    <xs:element name="Terms">
+      <xs:complexType>
+        <xs:sequence>
+          <xs:element ref="pc:TermInfo" minOccurs="0" maxOccurs="unbounded"/>
+        </xs:sequence>
+      </xs:complexType>
+    </xs:element>
+    <xs:element name="TermInfo">
+      <xs:complexType>
+        <xs:sequence>
+          <xs:element ref="pc:TermName" minOccurs="0"/>
+          <xs:element ref="pc:TermId" minOccurs="0"/>
+        </xs:sequence>
+      </xs:complexType>
+    </xs:element>
+    <xs:element name="TermName" type="xs:string"/>
+    <xs:element name="TermId" type="xs:string"/>
+  </xs:schema>
+</ct:contentTypeSchema>
 </file>
 
 <file path=customXml/itemProps1.xml><?xml version="1.0" encoding="utf-8"?>
@@ -6064,19 +6064,10 @@
 </file>
 
 <file path=customXml/itemProps2.xml><?xml version="1.0" encoding="utf-8"?>
-<ds:datastoreItem xmlns:ds="http://schemas.openxmlformats.org/officeDocument/2006/customXml" ds:itemID="{10BB2122-50FB-4777-8728-D52F7CF1AED8}">
+<ds:datastoreItem xmlns:ds="http://schemas.openxmlformats.org/officeDocument/2006/customXml" ds:itemID="{9D39D6F7-DEC6-43E0-B150-2B295957F91D}">
   <ds:schemaRefs>
-    <ds:schemaRef ds:uri="4d118d9b-448c-4a54-90d4-6d126d04e28f"/>
-    <ds:schemaRef ds:uri="http://purl.org/dc/elements/1.1/"/>
-    <ds:schemaRef ds:uri="http://purl.org/dc/terms/"/>
-    <ds:schemaRef ds:uri="http://schemas.microsoft.com/internal/obd"/>
-    <ds:schemaRef ds:uri="http://schemas.microsoft.com/office/2006/documentManagement/types"/>
-    <ds:schemaRef ds:uri="http://schemas.microsoft.com/office/2006/metadata/contentType"/>
     <ds:schemaRef ds:uri="http://schemas.microsoft.com/office/2006/metadata/properties"/>
-    <ds:schemaRef ds:uri="http://schemas.microsoft.com/office/2006/metadata/properties/metaAttributes"/>
     <ds:schemaRef ds:uri="http://schemas.microsoft.com/office/infopath/2007/PartnerControls"/>
-    <ds:schemaRef ds:uri="http://schemas.openxmlformats.org/package/2006/metadata/core-properties"/>
-    <ds:schemaRef ds:uri="http://www.w3.org/2001/XMLSchema"/>
   </ds:schemaRefs>
 </ds:datastoreItem>
 </file>
@@ -6100,10 +6091,19 @@
 </file>
 
 <file path=customXml/itemProps4.xml><?xml version="1.0" encoding="utf-8"?>
-<ds:datastoreItem xmlns:ds="http://schemas.openxmlformats.org/officeDocument/2006/customXml" ds:itemID="{9D39D6F7-DEC6-43E0-B150-2B295957F91D}">
+<ds:datastoreItem xmlns:ds="http://schemas.openxmlformats.org/officeDocument/2006/customXml" ds:itemID="{10BB2122-50FB-4777-8728-D52F7CF1AED8}">
   <ds:schemaRefs>
+    <ds:schemaRef ds:uri="4d118d9b-448c-4a54-90d4-6d126d04e28f"/>
+    <ds:schemaRef ds:uri="http://purl.org/dc/elements/1.1/"/>
+    <ds:schemaRef ds:uri="http://purl.org/dc/terms/"/>
+    <ds:schemaRef ds:uri="http://schemas.microsoft.com/internal/obd"/>
+    <ds:schemaRef ds:uri="http://schemas.microsoft.com/office/2006/documentManagement/types"/>
+    <ds:schemaRef ds:uri="http://schemas.microsoft.com/office/2006/metadata/contentType"/>
     <ds:schemaRef ds:uri="http://schemas.microsoft.com/office/2006/metadata/properties"/>
+    <ds:schemaRef ds:uri="http://schemas.microsoft.com/office/2006/metadata/properties/metaAttributes"/>
     <ds:schemaRef ds:uri="http://schemas.microsoft.com/office/infopath/2007/PartnerControls"/>
+    <ds:schemaRef ds:uri="http://schemas.openxmlformats.org/package/2006/metadata/core-properties"/>
+    <ds:schemaRef ds:uri="http://www.w3.org/2001/XMLSchema"/>
   </ds:schemaRefs>
 </ds:datastoreItem>
 </file>
</xml_diff>

<commit_message>
## Release: v0.7.6 ### Release Date: 2026-02-19
- #### 🚨 Breaking Changes:

- #### 🌟 New Features:

- #### 🚀 Enhancements:
  - Enhanced the script to generate user guide from Markdown files to support images and links.
  - Compact GUI dialog by reducing `SSB frequencies` section to adapt the resolution for a small screen.
  - Compact GUI dialog by reducing `Allowed SSB & ARFCN` section to adapt the resolution for a small screen.
  - GUI dialog now has a dimension of 940x770 pixels.

- #### 🐛 Bug fixes:

- #### 📚 Documentation:
  - Updated Documentation to include `SSB Retuning Automations - Interfaces` section into the User Guide.
  - Adjusted PPT image layouts and placeholders by section.
</commit_message>
<xml_diff>
--- a/assets/templates_pptx/UserGuideTemplate.pptx
+++ b/assets/templates_pptx/UserGuideTemplate.pptx
@@ -7,7 +7,7 @@
   <p:handoutMasterIdLst>
     <p:handoutMasterId r:id="rId6"/>
   </p:handoutMasterIdLst>
-  <p:sldSz cx="9144000" cy="6858000" type="screen4x3"/>
+  <p:sldSz cx="12192000" cy="6858000"/>
   <p:notesSz cx="6858000" cy="9144000"/>
   <p:defaultTextStyle>
     <a:defPPr>
@@ -107,12 +107,12 @@
   <p:extLst>
     <p:ext uri="{EFAFB233-063F-42B5-8137-9DF3F51BA10A}">
       <p15:sldGuideLst xmlns:p15="http://schemas.microsoft.com/office/powerpoint/2012/main">
-        <p15:guide id="1" orient="horz" pos="2160">
+        <p15:guide id="1" orient="horz" pos="2160" userDrawn="1">
           <p15:clr>
             <a:srgbClr val="A4A3A4"/>
           </p15:clr>
         </p15:guide>
-        <p15:guide id="2" pos="2880">
+        <p15:guide id="2" pos="3840" userDrawn="1">
           <p15:clr>
             <a:srgbClr val="A4A3A4"/>
           </p15:clr>
@@ -1015,29 +1015,117 @@
       </p:grpSpPr>
       <p:sp>
         <p:nvSpPr>
-          <p:cNvPr id="2" name="Title 1"/>
-          <p:cNvSpPr>
-            <a:spLocks noGrp="1"/>
-          </p:cNvSpPr>
-          <p:nvPr>
-            <p:ph type="ctrTitle" hasCustomPrompt="1"/>
-          </p:nvPr>
-        </p:nvSpPr>
+          <p:cNvPr id="7" name="Rectangle 6">
+            <a:extLst>
+              <a:ext uri="{FF2B5EF4-FFF2-40B4-BE49-F238E27FC236}">
+                <a16:creationId xmlns:a16="http://schemas.microsoft.com/office/drawing/2014/main" id="{33D8C08C-CAA2-0BE1-C083-696B5B7BDA70}"/>
+              </a:ext>
+            </a:extLst>
+          </p:cNvPr>
+          <p:cNvSpPr/>
+          <p:nvPr userDrawn="1"/>
+        </p:nvSpPr>
+        <p:spPr bwMode="auto">
+          <a:xfrm>
+            <a:off x="0" y="0"/>
+            <a:ext cx="5501640" cy="6858000"/>
+          </a:xfrm>
+          <a:prstGeom prst="rect">
+            <a:avLst/>
+          </a:prstGeom>
+          <a:solidFill>
+            <a:srgbClr val="85CCFF"/>
+          </a:solidFill>
+          <a:ln w="12700" cap="flat" cmpd="sng" algn="ctr">
+            <a:noFill/>
+            <a:prstDash val="solid"/>
+            <a:round/>
+            <a:headEnd type="none" w="med" len="med"/>
+            <a:tailEnd type="none" w="med" len="med"/>
+          </a:ln>
+          <a:effectLst/>
+        </p:spPr>
+        <p:txBody>
+          <a:bodyPr rot="0" spcFirstLastPara="0" vertOverflow="overflow" horzOverflow="overflow" vert="horz" wrap="square" lIns="72000" tIns="36000" rIns="73152" bIns="36576" numCol="1" spcCol="0" rtlCol="0" fromWordArt="0" anchor="t" anchorCtr="0" forceAA="0" compatLnSpc="1">
+            <a:prstTxWarp prst="textNoShape">
+              <a:avLst/>
+            </a:prstTxWarp>
+            <a:noAutofit/>
+          </a:bodyPr>
+          <a:lstStyle/>
+          <a:p>
+            <a:pPr marL="180000" indent="-180000" algn="l">
+              <a:spcBef>
+                <a:spcPts val="800"/>
+              </a:spcBef>
+              <a:buFont typeface="Ericsson Hilda" panose="00000500000000000000" pitchFamily="2" charset="0"/>
+              <a:buChar char="●"/>
+            </a:pPr>
+            <a:endParaRPr lang="en-US" sz="1800" err="1">
+              <a:solidFill>
+                <a:srgbClr val="FFFFFF"/>
+              </a:solidFill>
+              <a:latin typeface="+mn-lt"/>
+            </a:endParaRPr>
+          </a:p>
+        </p:txBody>
+      </p:sp>
+      <p:pic>
+        <p:nvPicPr>
+          <p:cNvPr id="8" name="Picture 7" descr="A colorful logo with text&#10;&#10;AI-generated content may be incorrect.">
+            <a:extLst>
+              <a:ext uri="{FF2B5EF4-FFF2-40B4-BE49-F238E27FC236}">
+                <a16:creationId xmlns:a16="http://schemas.microsoft.com/office/drawing/2014/main" id="{4CD53B24-4BDC-974B-673B-F94258AFBEE4}"/>
+              </a:ext>
+            </a:extLst>
+          </p:cNvPr>
+          <p:cNvPicPr>
+            <a:picLocks/>
+          </p:cNvPicPr>
+          <p:nvPr userDrawn="1"/>
+        </p:nvPicPr>
+        <p:blipFill>
+          <a:blip r:embed="rId2"/>
+          <a:stretch>
+            <a:fillRect/>
+          </a:stretch>
+        </p:blipFill>
         <p:spPr>
           <a:xfrm>
-            <a:off x="685800" y="2130425"/>
-            <a:ext cx="7772400" cy="1470025"/>
+            <a:off x="5501641" y="0"/>
+            <a:ext cx="6690361" cy="6858000"/>
+          </a:xfrm>
+          <a:prstGeom prst="rect">
+            <a:avLst/>
+          </a:prstGeom>
+          <a:noFill/>
+        </p:spPr>
+      </p:pic>
+      <p:sp>
+        <p:nvSpPr>
+          <p:cNvPr id="2" name="Title 1"/>
+          <p:cNvSpPr>
+            <a:spLocks noGrp="1"/>
+          </p:cNvSpPr>
+          <p:nvPr>
+            <p:ph type="ctrTitle" hasCustomPrompt="1"/>
+          </p:nvPr>
+        </p:nvSpPr>
+        <p:spPr>
+          <a:xfrm>
+            <a:off x="233680" y="2130426"/>
+            <a:ext cx="5115560" cy="1470025"/>
           </a:xfrm>
         </p:spPr>
         <p:txBody>
           <a:bodyPr>
-            <a:normAutofit/>
+            <a:noAutofit/>
           </a:bodyPr>
           <a:lstStyle>
             <a:lvl1pPr algn="ctr">
               <a:defRPr sz="4800">
                 <a:solidFill>
-                  <a:schemeClr val="accent2"/>
+                  <a:srgbClr val="002060"/>
                 </a:solidFill>
               </a:defRPr>
             </a:lvl1pPr>
@@ -1062,8 +1150,8 @@
         </p:nvSpPr>
         <p:spPr>
           <a:xfrm>
-            <a:off x="1371600" y="3886200"/>
-            <a:ext cx="6400800" cy="1752600"/>
+            <a:off x="233680" y="3886200"/>
+            <a:ext cx="5166360" cy="1752600"/>
           </a:xfrm>
         </p:spPr>
         <p:txBody>
@@ -1073,11 +1161,9 @@
           <a:lstStyle>
             <a:lvl1pPr marL="0" indent="0" algn="ctr">
               <a:buNone/>
-              <a:defRPr sz="2800">
+              <a:defRPr sz="3200">
                 <a:solidFill>
-                  <a:schemeClr val="tx1">
-                    <a:tint val="75000"/>
-                  </a:schemeClr>
+                  <a:srgbClr val="0070C0"/>
                 </a:solidFill>
               </a:defRPr>
             </a:lvl1pPr>
@@ -1249,6 +1335,425 @@
 </file>
 
 <file path=ppt/slideLayouts/slideLayout10.xml><?xml version="1.0" encoding="utf-8"?>
+<p:sldLayout xmlns:a="http://schemas.openxmlformats.org/drawingml/2006/main" xmlns:r="http://schemas.openxmlformats.org/officeDocument/2006/relationships" xmlns:p="http://schemas.openxmlformats.org/presentationml/2006/main" type="twoTxTwoObj" preserve="1">
+  <p:cSld name="Comparison">
+    <p:spTree>
+      <p:nvGrpSpPr>
+        <p:cNvPr id="1" name=""/>
+        <p:cNvGrpSpPr/>
+        <p:nvPr/>
+      </p:nvGrpSpPr>
+      <p:grpSpPr>
+        <a:xfrm>
+          <a:off x="0" y="0"/>
+          <a:ext cx="0" cy="0"/>
+          <a:chOff x="0" y="0"/>
+          <a:chExt cx="0" cy="0"/>
+        </a:xfrm>
+      </p:grpSpPr>
+      <p:sp>
+        <p:nvSpPr>
+          <p:cNvPr id="2" name="Title 1"/>
+          <p:cNvSpPr>
+            <a:spLocks noGrp="1"/>
+          </p:cNvSpPr>
+          <p:nvPr>
+            <p:ph type="title"/>
+          </p:nvPr>
+        </p:nvSpPr>
+        <p:spPr/>
+        <p:txBody>
+          <a:bodyPr/>
+          <a:lstStyle>
+            <a:lvl1pPr>
+              <a:defRPr/>
+            </a:lvl1pPr>
+          </a:lstStyle>
+          <a:p>
+            <a:r>
+              <a:rPr lang="en-US"/>
+              <a:t>Click to edit Master title style</a:t>
+            </a:r>
+          </a:p>
+        </p:txBody>
+      </p:sp>
+      <p:sp>
+        <p:nvSpPr>
+          <p:cNvPr id="3" name="Text Placeholder 2"/>
+          <p:cNvSpPr>
+            <a:spLocks noGrp="1"/>
+          </p:cNvSpPr>
+          <p:nvPr>
+            <p:ph type="body" idx="1"/>
+          </p:nvPr>
+        </p:nvSpPr>
+        <p:spPr>
+          <a:xfrm>
+            <a:off x="609600" y="1535113"/>
+            <a:ext cx="5386917" cy="639762"/>
+          </a:xfrm>
+        </p:spPr>
+        <p:txBody>
+          <a:bodyPr anchor="b"/>
+          <a:lstStyle>
+            <a:lvl1pPr marL="0" indent="0">
+              <a:buNone/>
+              <a:defRPr sz="2400" b="1"/>
+            </a:lvl1pPr>
+            <a:lvl2pPr marL="457200" indent="0">
+              <a:buNone/>
+              <a:defRPr sz="2000" b="1"/>
+            </a:lvl2pPr>
+            <a:lvl3pPr marL="914400" indent="0">
+              <a:buNone/>
+              <a:defRPr sz="1800" b="1"/>
+            </a:lvl3pPr>
+            <a:lvl4pPr marL="1371600" indent="0">
+              <a:buNone/>
+              <a:defRPr sz="1600" b="1"/>
+            </a:lvl4pPr>
+            <a:lvl5pPr marL="1828800" indent="0">
+              <a:buNone/>
+              <a:defRPr sz="1600" b="1"/>
+            </a:lvl5pPr>
+            <a:lvl6pPr marL="2286000" indent="0">
+              <a:buNone/>
+              <a:defRPr sz="1600" b="1"/>
+            </a:lvl6pPr>
+            <a:lvl7pPr marL="2743200" indent="0">
+              <a:buNone/>
+              <a:defRPr sz="1600" b="1"/>
+            </a:lvl7pPr>
+            <a:lvl8pPr marL="3200400" indent="0">
+              <a:buNone/>
+              <a:defRPr sz="1600" b="1"/>
+            </a:lvl8pPr>
+            <a:lvl9pPr marL="3657600" indent="0">
+              <a:buNone/>
+              <a:defRPr sz="1600" b="1"/>
+            </a:lvl9pPr>
+          </a:lstStyle>
+          <a:p>
+            <a:pPr lvl="0"/>
+            <a:r>
+              <a:rPr lang="en-US"/>
+              <a:t>Click to edit Master text styles</a:t>
+            </a:r>
+          </a:p>
+        </p:txBody>
+      </p:sp>
+      <p:sp>
+        <p:nvSpPr>
+          <p:cNvPr id="4" name="Content Placeholder 3"/>
+          <p:cNvSpPr>
+            <a:spLocks noGrp="1"/>
+          </p:cNvSpPr>
+          <p:nvPr>
+            <p:ph sz="half" idx="2"/>
+          </p:nvPr>
+        </p:nvSpPr>
+        <p:spPr>
+          <a:xfrm>
+            <a:off x="609600" y="2174875"/>
+            <a:ext cx="5386917" cy="3951288"/>
+          </a:xfrm>
+        </p:spPr>
+        <p:txBody>
+          <a:bodyPr/>
+          <a:lstStyle>
+            <a:lvl1pPr>
+              <a:defRPr sz="2400"/>
+            </a:lvl1pPr>
+            <a:lvl2pPr>
+              <a:defRPr sz="2000"/>
+            </a:lvl2pPr>
+            <a:lvl3pPr>
+              <a:defRPr sz="1800"/>
+            </a:lvl3pPr>
+            <a:lvl4pPr>
+              <a:defRPr sz="1600"/>
+            </a:lvl4pPr>
+            <a:lvl5pPr>
+              <a:defRPr sz="1600"/>
+            </a:lvl5pPr>
+            <a:lvl6pPr>
+              <a:defRPr sz="1600"/>
+            </a:lvl6pPr>
+            <a:lvl7pPr>
+              <a:defRPr sz="1600"/>
+            </a:lvl7pPr>
+            <a:lvl8pPr>
+              <a:defRPr sz="1600"/>
+            </a:lvl8pPr>
+            <a:lvl9pPr>
+              <a:defRPr sz="1600"/>
+            </a:lvl9pPr>
+          </a:lstStyle>
+          <a:p>
+            <a:pPr lvl="0"/>
+            <a:r>
+              <a:rPr lang="en-US"/>
+              <a:t>Click to edit Master text styles</a:t>
+            </a:r>
+          </a:p>
+          <a:p>
+            <a:pPr lvl="1"/>
+            <a:r>
+              <a:rPr lang="en-US"/>
+              <a:t>Second level</a:t>
+            </a:r>
+          </a:p>
+          <a:p>
+            <a:pPr lvl="2"/>
+            <a:r>
+              <a:rPr lang="en-US"/>
+              <a:t>Third level</a:t>
+            </a:r>
+          </a:p>
+          <a:p>
+            <a:pPr lvl="3"/>
+            <a:r>
+              <a:rPr lang="en-US"/>
+              <a:t>Fourth level</a:t>
+            </a:r>
+          </a:p>
+          <a:p>
+            <a:pPr lvl="4"/>
+            <a:r>
+              <a:rPr lang="en-US"/>
+              <a:t>Fifth level</a:t>
+            </a:r>
+          </a:p>
+        </p:txBody>
+      </p:sp>
+      <p:sp>
+        <p:nvSpPr>
+          <p:cNvPr id="5" name="Text Placeholder 4"/>
+          <p:cNvSpPr>
+            <a:spLocks noGrp="1"/>
+          </p:cNvSpPr>
+          <p:nvPr>
+            <p:ph type="body" sz="quarter" idx="3"/>
+          </p:nvPr>
+        </p:nvSpPr>
+        <p:spPr>
+          <a:xfrm>
+            <a:off x="6193368" y="1535113"/>
+            <a:ext cx="5389033" cy="639762"/>
+          </a:xfrm>
+        </p:spPr>
+        <p:txBody>
+          <a:bodyPr anchor="b"/>
+          <a:lstStyle>
+            <a:lvl1pPr marL="0" indent="0">
+              <a:buNone/>
+              <a:defRPr sz="2400" b="1"/>
+            </a:lvl1pPr>
+            <a:lvl2pPr marL="457200" indent="0">
+              <a:buNone/>
+              <a:defRPr sz="2000" b="1"/>
+            </a:lvl2pPr>
+            <a:lvl3pPr marL="914400" indent="0">
+              <a:buNone/>
+              <a:defRPr sz="1800" b="1"/>
+            </a:lvl3pPr>
+            <a:lvl4pPr marL="1371600" indent="0">
+              <a:buNone/>
+              <a:defRPr sz="1600" b="1"/>
+            </a:lvl4pPr>
+            <a:lvl5pPr marL="1828800" indent="0">
+              <a:buNone/>
+              <a:defRPr sz="1600" b="1"/>
+            </a:lvl5pPr>
+            <a:lvl6pPr marL="2286000" indent="0">
+              <a:buNone/>
+              <a:defRPr sz="1600" b="1"/>
+            </a:lvl6pPr>
+            <a:lvl7pPr marL="2743200" indent="0">
+              <a:buNone/>
+              <a:defRPr sz="1600" b="1"/>
+            </a:lvl7pPr>
+            <a:lvl8pPr marL="3200400" indent="0">
+              <a:buNone/>
+              <a:defRPr sz="1600" b="1"/>
+            </a:lvl8pPr>
+            <a:lvl9pPr marL="3657600" indent="0">
+              <a:buNone/>
+              <a:defRPr sz="1600" b="1"/>
+            </a:lvl9pPr>
+          </a:lstStyle>
+          <a:p>
+            <a:pPr lvl="0"/>
+            <a:r>
+              <a:rPr lang="en-US"/>
+              <a:t>Click to edit Master text styles</a:t>
+            </a:r>
+          </a:p>
+        </p:txBody>
+      </p:sp>
+      <p:sp>
+        <p:nvSpPr>
+          <p:cNvPr id="6" name="Content Placeholder 5"/>
+          <p:cNvSpPr>
+            <a:spLocks noGrp="1"/>
+          </p:cNvSpPr>
+          <p:nvPr>
+            <p:ph sz="quarter" idx="4"/>
+          </p:nvPr>
+        </p:nvSpPr>
+        <p:spPr>
+          <a:xfrm>
+            <a:off x="6193368" y="2174875"/>
+            <a:ext cx="5389033" cy="3951288"/>
+          </a:xfrm>
+        </p:spPr>
+        <p:txBody>
+          <a:bodyPr/>
+          <a:lstStyle>
+            <a:lvl1pPr>
+              <a:defRPr sz="2400"/>
+            </a:lvl1pPr>
+            <a:lvl2pPr>
+              <a:defRPr sz="2000"/>
+            </a:lvl2pPr>
+            <a:lvl3pPr>
+              <a:defRPr sz="1800"/>
+            </a:lvl3pPr>
+            <a:lvl4pPr>
+              <a:defRPr sz="1600"/>
+            </a:lvl4pPr>
+            <a:lvl5pPr>
+              <a:defRPr sz="1600"/>
+            </a:lvl5pPr>
+            <a:lvl6pPr>
+              <a:defRPr sz="1600"/>
+            </a:lvl6pPr>
+            <a:lvl7pPr>
+              <a:defRPr sz="1600"/>
+            </a:lvl7pPr>
+            <a:lvl8pPr>
+              <a:defRPr sz="1600"/>
+            </a:lvl8pPr>
+            <a:lvl9pPr>
+              <a:defRPr sz="1600"/>
+            </a:lvl9pPr>
+          </a:lstStyle>
+          <a:p>
+            <a:pPr lvl="0"/>
+            <a:r>
+              <a:rPr lang="en-US"/>
+              <a:t>Click to edit Master text styles</a:t>
+            </a:r>
+          </a:p>
+          <a:p>
+            <a:pPr lvl="1"/>
+            <a:r>
+              <a:rPr lang="en-US"/>
+              <a:t>Second level</a:t>
+            </a:r>
+          </a:p>
+          <a:p>
+            <a:pPr lvl="2"/>
+            <a:r>
+              <a:rPr lang="en-US"/>
+              <a:t>Third level</a:t>
+            </a:r>
+          </a:p>
+          <a:p>
+            <a:pPr lvl="3"/>
+            <a:r>
+              <a:rPr lang="en-US"/>
+              <a:t>Fourth level</a:t>
+            </a:r>
+          </a:p>
+          <a:p>
+            <a:pPr lvl="4"/>
+            <a:r>
+              <a:rPr lang="en-US"/>
+              <a:t>Fifth level</a:t>
+            </a:r>
+          </a:p>
+        </p:txBody>
+      </p:sp>
+      <p:sp>
+        <p:nvSpPr>
+          <p:cNvPr id="7" name="Date Placeholder 6"/>
+          <p:cNvSpPr>
+            <a:spLocks noGrp="1"/>
+          </p:cNvSpPr>
+          <p:nvPr>
+            <p:ph type="dt" sz="half" idx="10"/>
+          </p:nvPr>
+        </p:nvSpPr>
+        <p:spPr/>
+        <p:txBody>
+          <a:bodyPr/>
+          <a:lstStyle/>
+          <a:p>
+            <a:fld id="{5BCAD085-E8A6-8845-BD4E-CB4CCA059FC4}" type="datetimeFigureOut">
+              <a:rPr lang="en-US" smtClean="0"/>
+              <a:t>2/19/2026</a:t>
+            </a:fld>
+            <a:endParaRPr lang="en-US"/>
+          </a:p>
+        </p:txBody>
+      </p:sp>
+      <p:sp>
+        <p:nvSpPr>
+          <p:cNvPr id="8" name="Footer Placeholder 7"/>
+          <p:cNvSpPr>
+            <a:spLocks noGrp="1"/>
+          </p:cNvSpPr>
+          <p:nvPr>
+            <p:ph type="ftr" sz="quarter" idx="11"/>
+          </p:nvPr>
+        </p:nvSpPr>
+        <p:spPr/>
+        <p:txBody>
+          <a:bodyPr/>
+          <a:lstStyle/>
+          <a:p>
+            <a:endParaRPr lang="en-US"/>
+          </a:p>
+        </p:txBody>
+      </p:sp>
+      <p:sp>
+        <p:nvSpPr>
+          <p:cNvPr id="9" name="Slide Number Placeholder 8"/>
+          <p:cNvSpPr>
+            <a:spLocks noGrp="1"/>
+          </p:cNvSpPr>
+          <p:nvPr>
+            <p:ph type="sldNum" sz="quarter" idx="12"/>
+          </p:nvPr>
+        </p:nvSpPr>
+        <p:spPr/>
+        <p:txBody>
+          <a:bodyPr/>
+          <a:lstStyle/>
+          <a:p>
+            <a:fld id="{C1FF6DA9-008F-8B48-92A6-B652298478BF}" type="slidenum">
+              <a:rPr lang="en-US" smtClean="0"/>
+              <a:t>‹#›</a:t>
+            </a:fld>
+            <a:endParaRPr lang="en-US"/>
+          </a:p>
+        </p:txBody>
+      </p:sp>
+    </p:spTree>
+    <p:extLst>
+      <p:ext uri="{BB962C8B-B14F-4D97-AF65-F5344CB8AC3E}">
+        <p14:creationId xmlns:p14="http://schemas.microsoft.com/office/powerpoint/2010/main" val="990158736"/>
+      </p:ext>
+    </p:extLst>
+  </p:cSld>
+  <p:clrMapOvr>
+    <a:masterClrMapping/>
+  </p:clrMapOvr>
+</p:sldLayout>
+</file>
+
+<file path=ppt/slideLayouts/slideLayout11.xml><?xml version="1.0" encoding="utf-8"?>
 <p:sldLayout xmlns:a="http://schemas.openxmlformats.org/drawingml/2006/main" xmlns:r="http://schemas.openxmlformats.org/officeDocument/2006/relationships" xmlns:p="http://schemas.openxmlformats.org/presentationml/2006/main" type="titleOnly" preserve="1">
   <p:cSld name="Title Only">
     <p:spTree>
@@ -1365,7 +1870,7 @@
 </p:sldLayout>
 </file>
 
-<file path=ppt/slideLayouts/slideLayout11.xml><?xml version="1.0" encoding="utf-8"?>
+<file path=ppt/slideLayouts/slideLayout12.xml><?xml version="1.0" encoding="utf-8"?>
 <p:sldLayout xmlns:a="http://schemas.openxmlformats.org/drawingml/2006/main" xmlns:r="http://schemas.openxmlformats.org/officeDocument/2006/relationships" xmlns:p="http://schemas.openxmlformats.org/presentationml/2006/main" type="blank" preserve="1">
   <p:cSld name="Blank">
     <p:spTree>
@@ -1460,7 +1965,7 @@
 </p:sldLayout>
 </file>
 
-<file path=ppt/slideLayouts/slideLayout12.xml><?xml version="1.0" encoding="utf-8"?>
+<file path=ppt/slideLayouts/slideLayout13.xml><?xml version="1.0" encoding="utf-8"?>
 <p:sldLayout xmlns:a="http://schemas.openxmlformats.org/drawingml/2006/main" xmlns:r="http://schemas.openxmlformats.org/officeDocument/2006/relationships" xmlns:p="http://schemas.openxmlformats.org/presentationml/2006/main" type="objTx" preserve="1">
   <p:cSld name="Content with Caption">
     <p:spTree>
@@ -1489,8 +1994,8 @@
         </p:nvSpPr>
         <p:spPr>
           <a:xfrm>
-            <a:off x="457200" y="273050"/>
-            <a:ext cx="3008313" cy="1162050"/>
+            <a:off x="609601" y="273050"/>
+            <a:ext cx="4011084" cy="1162050"/>
           </a:xfrm>
         </p:spPr>
         <p:txBody>
@@ -1520,8 +2025,8 @@
         </p:nvSpPr>
         <p:spPr>
           <a:xfrm>
-            <a:off x="3575050" y="273050"/>
-            <a:ext cx="5111750" cy="5853113"/>
+            <a:off x="4766733" y="273051"/>
+            <a:ext cx="6815667" cy="5853113"/>
           </a:xfrm>
         </p:spPr>
         <p:txBody>
@@ -1604,8 +2109,8 @@
         </p:nvSpPr>
         <p:spPr>
           <a:xfrm>
-            <a:off x="457200" y="1435100"/>
-            <a:ext cx="3008313" cy="4691063"/>
+            <a:off x="609601" y="1435101"/>
+            <a:ext cx="4011084" cy="4691063"/>
           </a:xfrm>
         </p:spPr>
         <p:txBody>
@@ -1735,7 +2240,7 @@
 </p:sldLayout>
 </file>
 
-<file path=ppt/slideLayouts/slideLayout13.xml><?xml version="1.0" encoding="utf-8"?>
+<file path=ppt/slideLayouts/slideLayout14.xml><?xml version="1.0" encoding="utf-8"?>
 <p:sldLayout xmlns:a="http://schemas.openxmlformats.org/drawingml/2006/main" xmlns:r="http://schemas.openxmlformats.org/officeDocument/2006/relationships" xmlns:p="http://schemas.openxmlformats.org/presentationml/2006/main" type="picTx" preserve="1">
   <p:cSld name="Picture with Caption">
     <p:spTree>
@@ -1764,8 +2269,8 @@
         </p:nvSpPr>
         <p:spPr>
           <a:xfrm>
-            <a:off x="1792288" y="4800600"/>
-            <a:ext cx="5486400" cy="566738"/>
+            <a:off x="2389717" y="4800600"/>
+            <a:ext cx="7315200" cy="566738"/>
           </a:xfrm>
         </p:spPr>
         <p:txBody>
@@ -1795,8 +2300,8 @@
         </p:nvSpPr>
         <p:spPr>
           <a:xfrm>
-            <a:off x="1792288" y="612775"/>
-            <a:ext cx="5486400" cy="4114800"/>
+            <a:off x="2389717" y="612775"/>
+            <a:ext cx="7315200" cy="4114800"/>
           </a:xfrm>
         </p:spPr>
         <p:txBody>
@@ -1856,8 +2361,8 @@
         </p:nvSpPr>
         <p:spPr>
           <a:xfrm>
-            <a:off x="1792288" y="5367338"/>
-            <a:ext cx="5486400" cy="804862"/>
+            <a:off x="2389717" y="5367338"/>
+            <a:ext cx="7315200" cy="804862"/>
           </a:xfrm>
         </p:spPr>
         <p:txBody>
@@ -1987,7 +2492,7 @@
 </p:sldLayout>
 </file>
 
-<file path=ppt/slideLayouts/slideLayout14.xml><?xml version="1.0" encoding="utf-8"?>
+<file path=ppt/slideLayouts/slideLayout15.xml><?xml version="1.0" encoding="utf-8"?>
 <p:sldLayout xmlns:a="http://schemas.openxmlformats.org/drawingml/2006/main" xmlns:r="http://schemas.openxmlformats.org/officeDocument/2006/relationships" xmlns:p="http://schemas.openxmlformats.org/presentationml/2006/main" type="vertTx" preserve="1">
   <p:cSld name="Title and Vertical Text">
     <p:spTree>
@@ -2155,7 +2660,7 @@
 </p:sldLayout>
 </file>
 
-<file path=ppt/slideLayouts/slideLayout15.xml><?xml version="1.0" encoding="utf-8"?>
+<file path=ppt/slideLayouts/slideLayout16.xml><?xml version="1.0" encoding="utf-8"?>
 <p:sldLayout xmlns:a="http://schemas.openxmlformats.org/drawingml/2006/main" xmlns:r="http://schemas.openxmlformats.org/officeDocument/2006/relationships" xmlns:p="http://schemas.openxmlformats.org/presentationml/2006/main" type="vertTitleAndTx" preserve="1">
   <p:cSld name="Vertical Title and Text">
     <p:spTree>
@@ -2184,8 +2689,8 @@
         </p:nvSpPr>
         <p:spPr>
           <a:xfrm>
-            <a:off x="6629400" y="274638"/>
-            <a:ext cx="2057400" cy="5851525"/>
+            <a:off x="8839200" y="274639"/>
+            <a:ext cx="2743200" cy="5851525"/>
           </a:xfrm>
         </p:spPr>
         <p:txBody>
@@ -2211,8 +2716,8 @@
         </p:nvSpPr>
         <p:spPr>
           <a:xfrm>
-            <a:off x="457200" y="274638"/>
-            <a:ext cx="6019800" cy="5851525"/>
+            <a:off x="609600" y="274639"/>
+            <a:ext cx="8026400" cy="5851525"/>
           </a:xfrm>
         </p:spPr>
         <p:txBody>
@@ -2368,7 +2873,12 @@
             <p:ph type="title"/>
           </p:nvPr>
         </p:nvSpPr>
-        <p:spPr/>
+        <p:spPr>
+          <a:xfrm>
+            <a:off x="609600" y="274638"/>
+            <a:ext cx="10972800" cy="921702"/>
+          </a:xfrm>
+        </p:spPr>
         <p:txBody>
           <a:bodyPr>
             <a:normAutofit/>
@@ -2398,8 +2908,8 @@
         </p:nvSpPr>
         <p:spPr>
           <a:xfrm>
-            <a:off x="457200" y="1706033"/>
-            <a:ext cx="8229600" cy="4971032"/>
+            <a:off x="609600" y="1437111"/>
+            <a:ext cx="10972800" cy="5239955"/>
           </a:xfrm>
         </p:spPr>
         <p:txBody>
@@ -2411,19 +2921,19 @@
               <a:buNone/>
               <a:defRPr sz="2000"/>
             </a:lvl1pPr>
-            <a:lvl2pPr>
+            <a:lvl2pPr marL="540000">
               <a:buNone/>
               <a:defRPr sz="1800"/>
             </a:lvl2pPr>
-            <a:lvl3pPr>
+            <a:lvl3pPr marL="720000">
               <a:buNone/>
               <a:defRPr sz="1600"/>
             </a:lvl3pPr>
-            <a:lvl4pPr>
+            <a:lvl4pPr marL="900000">
               <a:buNone/>
               <a:defRPr sz="1400"/>
             </a:lvl4pPr>
-            <a:lvl5pPr>
+            <a:lvl5pPr marL="1080000">
               <a:buNone/>
               <a:defRPr sz="1400"/>
             </a:lvl5pPr>
@@ -2487,8 +2997,8 @@
         </p:blipFill>
         <p:spPr>
           <a:xfrm>
-            <a:off x="389466" y="1430337"/>
-            <a:ext cx="8373533" cy="199496"/>
+            <a:off x="519289" y="1216977"/>
+            <a:ext cx="11164711" cy="199496"/>
           </a:xfrm>
           <a:prstGeom prst="rect">
             <a:avLst/>
@@ -2543,7 +3053,12 @@
             <p:ph type="title"/>
           </p:nvPr>
         </p:nvSpPr>
-        <p:spPr/>
+        <p:spPr>
+          <a:xfrm>
+            <a:off x="609600" y="274638"/>
+            <a:ext cx="10972800" cy="925512"/>
+          </a:xfrm>
+        </p:spPr>
         <p:txBody>
           <a:bodyPr>
             <a:normAutofit/>
@@ -2573,8 +3088,8 @@
         </p:nvSpPr>
         <p:spPr>
           <a:xfrm>
-            <a:off x="457200" y="1706033"/>
-            <a:ext cx="4076700" cy="4971032"/>
+            <a:off x="609600" y="1440920"/>
+            <a:ext cx="5430520" cy="5236145"/>
           </a:xfrm>
         </p:spPr>
         <p:txBody>
@@ -2586,19 +3101,19 @@
               <a:buNone/>
               <a:defRPr sz="2000"/>
             </a:lvl1pPr>
-            <a:lvl2pPr>
+            <a:lvl2pPr marL="540000">
               <a:buNone/>
               <a:defRPr sz="1800"/>
             </a:lvl2pPr>
-            <a:lvl3pPr>
+            <a:lvl3pPr marL="720000">
               <a:buNone/>
               <a:defRPr sz="1600"/>
             </a:lvl3pPr>
-            <a:lvl4pPr>
+            <a:lvl4pPr marL="900000">
               <a:buNone/>
               <a:defRPr sz="1400"/>
             </a:lvl4pPr>
-            <a:lvl5pPr>
+            <a:lvl5pPr marL="1080000">
               <a:buNone/>
               <a:defRPr sz="1400"/>
             </a:lvl5pPr>
@@ -2662,8 +3177,8 @@
         </p:blipFill>
         <p:spPr>
           <a:xfrm>
-            <a:off x="389466" y="1430337"/>
-            <a:ext cx="8373533" cy="199496"/>
+            <a:off x="519289" y="1220787"/>
+            <a:ext cx="11164711" cy="199496"/>
           </a:xfrm>
           <a:prstGeom prst="rect">
             <a:avLst/>
@@ -2688,8 +3203,8 @@
         </p:nvSpPr>
         <p:spPr>
           <a:xfrm>
-            <a:off x="4610102" y="1706033"/>
-            <a:ext cx="4114800" cy="4971032"/>
+            <a:off x="6096000" y="1440920"/>
+            <a:ext cx="5486400" cy="5236145"/>
           </a:xfrm>
         </p:spPr>
         <p:txBody>
@@ -2699,23 +3214,23 @@
           <a:lstStyle>
             <a:lvl1pPr marL="0">
               <a:buNone/>
-              <a:defRPr sz="2000"/>
+              <a:defRPr sz="1800"/>
             </a:lvl1pPr>
-            <a:lvl2pPr>
-              <a:buNone/>
-              <a:defRPr sz="1800"/>
+            <a:lvl2pPr marL="540000">
+              <a:buNone/>
+              <a:defRPr sz="1600"/>
             </a:lvl2pPr>
-            <a:lvl3pPr>
-              <a:buNone/>
-              <a:defRPr sz="1600"/>
+            <a:lvl3pPr marL="720000">
+              <a:buNone/>
+              <a:defRPr sz="1400"/>
             </a:lvl3pPr>
-            <a:lvl4pPr>
-              <a:buNone/>
-              <a:defRPr sz="1400"/>
+            <a:lvl4pPr marL="900000">
+              <a:buNone/>
+              <a:defRPr sz="1200"/>
             </a:lvl4pPr>
-            <a:lvl5pPr>
-              <a:buNone/>
-              <a:defRPr sz="1400"/>
+            <a:lvl5pPr marL="1080000">
+              <a:buNone/>
+              <a:defRPr sz="1200"/>
             </a:lvl5pPr>
           </a:lstStyle>
           <a:p>
@@ -2770,7 +3285,7 @@
 
 <file path=ppt/slideLayouts/slideLayout4.xml><?xml version="1.0" encoding="utf-8"?>
 <p:sldLayout xmlns:a="http://schemas.openxmlformats.org/drawingml/2006/main" xmlns:r="http://schemas.openxmlformats.org/officeDocument/2006/relationships" xmlns:p="http://schemas.openxmlformats.org/presentationml/2006/main" preserve="1" userDrawn="1">
-  <p:cSld name="3_Title and Content">
+  <p:cSld name="5_Title and Content">
     <p:bg>
       <p:bgPr>
         <a:solidFill>
@@ -2803,7 +3318,12 @@
             <p:ph type="title"/>
           </p:nvPr>
         </p:nvSpPr>
-        <p:spPr/>
+        <p:spPr>
+          <a:xfrm>
+            <a:off x="609600" y="274638"/>
+            <a:ext cx="10972800" cy="925512"/>
+          </a:xfrm>
+        </p:spPr>
         <p:txBody>
           <a:bodyPr>
             <a:normAutofit/>
@@ -2833,8 +3353,8 @@
         </p:nvSpPr>
         <p:spPr>
           <a:xfrm>
-            <a:off x="457200" y="1706033"/>
-            <a:ext cx="4076700" cy="2439797"/>
+            <a:off x="609600" y="1440921"/>
+            <a:ext cx="5435600" cy="2612920"/>
           </a:xfrm>
         </p:spPr>
         <p:txBody>
@@ -2846,19 +3366,19 @@
               <a:buNone/>
               <a:defRPr sz="2000"/>
             </a:lvl1pPr>
-            <a:lvl2pPr>
+            <a:lvl2pPr marL="540000">
               <a:buNone/>
               <a:defRPr sz="1800"/>
             </a:lvl2pPr>
-            <a:lvl3pPr>
+            <a:lvl3pPr marL="720000">
               <a:buNone/>
               <a:defRPr sz="1600"/>
             </a:lvl3pPr>
-            <a:lvl4pPr>
+            <a:lvl4pPr marL="900000">
               <a:buNone/>
               <a:defRPr sz="1400"/>
             </a:lvl4pPr>
-            <a:lvl5pPr>
+            <a:lvl5pPr marL="1080000">
               <a:buNone/>
               <a:defRPr sz="1400"/>
             </a:lvl5pPr>
@@ -2922,8 +3442,8 @@
         </p:blipFill>
         <p:spPr>
           <a:xfrm>
-            <a:off x="389466" y="1430337"/>
-            <a:ext cx="8373533" cy="199496"/>
+            <a:off x="519289" y="1220787"/>
+            <a:ext cx="11164711" cy="199496"/>
           </a:xfrm>
           <a:prstGeom prst="rect">
             <a:avLst/>
@@ -2948,8 +3468,8 @@
         </p:nvSpPr>
         <p:spPr>
           <a:xfrm>
-            <a:off x="4610102" y="1706033"/>
-            <a:ext cx="4114800" cy="4971032"/>
+            <a:off x="609601" y="4130041"/>
+            <a:ext cx="5435597" cy="2547025"/>
           </a:xfrm>
         </p:spPr>
         <p:txBody>
@@ -2959,23 +3479,23 @@
           <a:lstStyle>
             <a:lvl1pPr marL="0">
               <a:buNone/>
-              <a:defRPr sz="2000"/>
+              <a:defRPr sz="1800"/>
             </a:lvl1pPr>
-            <a:lvl2pPr>
-              <a:buNone/>
-              <a:defRPr sz="1800"/>
+            <a:lvl2pPr marL="540000">
+              <a:buNone/>
+              <a:defRPr sz="1600"/>
             </a:lvl2pPr>
-            <a:lvl3pPr>
-              <a:buNone/>
-              <a:defRPr sz="1600"/>
+            <a:lvl3pPr marL="720000">
+              <a:buNone/>
+              <a:defRPr sz="1400"/>
             </a:lvl3pPr>
-            <a:lvl4pPr>
-              <a:buNone/>
-              <a:defRPr sz="1400"/>
+            <a:lvl4pPr marL="900000">
+              <a:buNone/>
+              <a:defRPr sz="1200"/>
             </a:lvl4pPr>
-            <a:lvl5pPr>
-              <a:buNone/>
-              <a:defRPr sz="1400"/>
+            <a:lvl5pPr marL="1080000">
+              <a:buNone/>
+              <a:defRPr sz="1200"/>
             </a:lvl5pPr>
           </a:lstStyle>
           <a:p>
@@ -3017,10 +3537,10 @@
       </p:sp>
       <p:sp>
         <p:nvSpPr>
-          <p:cNvPr id="6" name="Content Placeholder 2">
+          <p:cNvPr id="7" name="Content Placeholder 2">
             <a:extLst>
               <a:ext uri="{FF2B5EF4-FFF2-40B4-BE49-F238E27FC236}">
-                <a16:creationId xmlns:a16="http://schemas.microsoft.com/office/drawing/2014/main" id="{5C44160D-EF70-386D-E6CD-DB9E002A32BA}"/>
+                <a16:creationId xmlns:a16="http://schemas.microsoft.com/office/drawing/2014/main" id="{1373BBEB-A4CB-84AC-BA26-0B6CA5A17919}"/>
               </a:ext>
             </a:extLst>
           </p:cNvPr>
@@ -3033,8 +3553,8 @@
         </p:nvSpPr>
         <p:spPr>
           <a:xfrm>
-            <a:off x="457199" y="4240530"/>
-            <a:ext cx="4076700" cy="2439796"/>
+            <a:off x="6096000" y="1440920"/>
+            <a:ext cx="5486400" cy="5236145"/>
           </a:xfrm>
         </p:spPr>
         <p:txBody>
@@ -3044,23 +3564,23 @@
           <a:lstStyle>
             <a:lvl1pPr marL="0">
               <a:buNone/>
-              <a:defRPr sz="2000"/>
+              <a:defRPr sz="1800"/>
             </a:lvl1pPr>
-            <a:lvl2pPr>
-              <a:buNone/>
-              <a:defRPr sz="1800"/>
+            <a:lvl2pPr marL="540000">
+              <a:buNone/>
+              <a:defRPr sz="1600"/>
             </a:lvl2pPr>
-            <a:lvl3pPr>
-              <a:buNone/>
-              <a:defRPr sz="1600"/>
+            <a:lvl3pPr marL="720000">
+              <a:buNone/>
+              <a:defRPr sz="1400"/>
             </a:lvl3pPr>
-            <a:lvl4pPr>
-              <a:buNone/>
-              <a:defRPr sz="1400"/>
+            <a:lvl4pPr marL="900000">
+              <a:buNone/>
+              <a:defRPr sz="1200"/>
             </a:lvl4pPr>
-            <a:lvl5pPr>
-              <a:buNone/>
-              <a:defRPr sz="1400"/>
+            <a:lvl5pPr marL="1080000">
+              <a:buNone/>
+              <a:defRPr sz="1200"/>
             </a:lvl5pPr>
           </a:lstStyle>
           <a:p>
@@ -3103,7 +3623,7 @@
     </p:spTree>
     <p:extLst>
       <p:ext uri="{BB962C8B-B14F-4D97-AF65-F5344CB8AC3E}">
-        <p14:creationId xmlns:p14="http://schemas.microsoft.com/office/powerpoint/2010/main" val="857619913"/>
+        <p14:creationId xmlns:p14="http://schemas.microsoft.com/office/powerpoint/2010/main" val="3756926647"/>
       </p:ext>
     </p:extLst>
   </p:cSld>
@@ -3114,6 +3634,258 @@
 </file>
 
 <file path=ppt/slideLayouts/slideLayout5.xml><?xml version="1.0" encoding="utf-8"?>
+<p:sldLayout xmlns:a="http://schemas.openxmlformats.org/drawingml/2006/main" xmlns:r="http://schemas.openxmlformats.org/officeDocument/2006/relationships" xmlns:p="http://schemas.openxmlformats.org/presentationml/2006/main" type="title" preserve="1">
+  <p:cSld name="2_Title Slide">
+    <p:spTree>
+      <p:nvGrpSpPr>
+        <p:cNvPr id="1" name=""/>
+        <p:cNvGrpSpPr/>
+        <p:nvPr/>
+      </p:nvGrpSpPr>
+      <p:grpSpPr>
+        <a:xfrm>
+          <a:off x="0" y="0"/>
+          <a:ext cx="0" cy="0"/>
+          <a:chOff x="0" y="0"/>
+          <a:chExt cx="0" cy="0"/>
+        </a:xfrm>
+      </p:grpSpPr>
+      <p:sp>
+        <p:nvSpPr>
+          <p:cNvPr id="2" name="Title 1"/>
+          <p:cNvSpPr>
+            <a:spLocks noGrp="1"/>
+          </p:cNvSpPr>
+          <p:nvPr>
+            <p:ph type="ctrTitle" hasCustomPrompt="1"/>
+          </p:nvPr>
+        </p:nvSpPr>
+        <p:spPr>
+          <a:xfrm>
+            <a:off x="914400" y="2130426"/>
+            <a:ext cx="10363200" cy="1470025"/>
+          </a:xfrm>
+        </p:spPr>
+        <p:txBody>
+          <a:bodyPr>
+            <a:normAutofit/>
+          </a:bodyPr>
+          <a:lstStyle>
+            <a:lvl1pPr algn="ctr">
+              <a:defRPr sz="4800">
+                <a:solidFill>
+                  <a:schemeClr val="accent2"/>
+                </a:solidFill>
+              </a:defRPr>
+            </a:lvl1pPr>
+          </a:lstStyle>
+          <a:p>
+            <a:r>
+              <a:rPr lang="en-US" dirty="0"/>
+              <a:t>Click To Edit Master Title Style</a:t>
+            </a:r>
+          </a:p>
+        </p:txBody>
+      </p:sp>
+      <p:sp>
+        <p:nvSpPr>
+          <p:cNvPr id="3" name="Subtitle 2"/>
+          <p:cNvSpPr>
+            <a:spLocks noGrp="1"/>
+          </p:cNvSpPr>
+          <p:nvPr>
+            <p:ph type="subTitle" idx="1"/>
+          </p:nvPr>
+        </p:nvSpPr>
+        <p:spPr>
+          <a:xfrm>
+            <a:off x="1828800" y="3886200"/>
+            <a:ext cx="8534400" cy="1752600"/>
+          </a:xfrm>
+        </p:spPr>
+        <p:txBody>
+          <a:bodyPr>
+            <a:normAutofit/>
+          </a:bodyPr>
+          <a:lstStyle>
+            <a:lvl1pPr marL="0" indent="0" algn="ctr">
+              <a:buNone/>
+              <a:defRPr sz="2800">
+                <a:solidFill>
+                  <a:schemeClr val="tx1">
+                    <a:tint val="75000"/>
+                  </a:schemeClr>
+                </a:solidFill>
+              </a:defRPr>
+            </a:lvl1pPr>
+            <a:lvl2pPr marL="457200" indent="0" algn="ctr">
+              <a:buNone/>
+              <a:defRPr>
+                <a:solidFill>
+                  <a:schemeClr val="tx1">
+                    <a:tint val="75000"/>
+                  </a:schemeClr>
+                </a:solidFill>
+              </a:defRPr>
+            </a:lvl2pPr>
+            <a:lvl3pPr marL="914400" indent="0" algn="ctr">
+              <a:buNone/>
+              <a:defRPr>
+                <a:solidFill>
+                  <a:schemeClr val="tx1">
+                    <a:tint val="75000"/>
+                  </a:schemeClr>
+                </a:solidFill>
+              </a:defRPr>
+            </a:lvl3pPr>
+            <a:lvl4pPr marL="1371600" indent="0" algn="ctr">
+              <a:buNone/>
+              <a:defRPr>
+                <a:solidFill>
+                  <a:schemeClr val="tx1">
+                    <a:tint val="75000"/>
+                  </a:schemeClr>
+                </a:solidFill>
+              </a:defRPr>
+            </a:lvl4pPr>
+            <a:lvl5pPr marL="1828800" indent="0" algn="ctr">
+              <a:buNone/>
+              <a:defRPr>
+                <a:solidFill>
+                  <a:schemeClr val="tx1">
+                    <a:tint val="75000"/>
+                  </a:schemeClr>
+                </a:solidFill>
+              </a:defRPr>
+            </a:lvl5pPr>
+            <a:lvl6pPr marL="2286000" indent="0" algn="ctr">
+              <a:buNone/>
+              <a:defRPr>
+                <a:solidFill>
+                  <a:schemeClr val="tx1">
+                    <a:tint val="75000"/>
+                  </a:schemeClr>
+                </a:solidFill>
+              </a:defRPr>
+            </a:lvl6pPr>
+            <a:lvl7pPr marL="2743200" indent="0" algn="ctr">
+              <a:buNone/>
+              <a:defRPr>
+                <a:solidFill>
+                  <a:schemeClr val="tx1">
+                    <a:tint val="75000"/>
+                  </a:schemeClr>
+                </a:solidFill>
+              </a:defRPr>
+            </a:lvl7pPr>
+            <a:lvl8pPr marL="3200400" indent="0" algn="ctr">
+              <a:buNone/>
+              <a:defRPr>
+                <a:solidFill>
+                  <a:schemeClr val="tx1">
+                    <a:tint val="75000"/>
+                  </a:schemeClr>
+                </a:solidFill>
+              </a:defRPr>
+            </a:lvl8pPr>
+            <a:lvl9pPr marL="3657600" indent="0" algn="ctr">
+              <a:buNone/>
+              <a:defRPr>
+                <a:solidFill>
+                  <a:schemeClr val="tx1">
+                    <a:tint val="75000"/>
+                  </a:schemeClr>
+                </a:solidFill>
+              </a:defRPr>
+            </a:lvl9pPr>
+          </a:lstStyle>
+          <a:p>
+            <a:r>
+              <a:rPr lang="en-US" dirty="0"/>
+              <a:t>Click to edit Master subtitle style</a:t>
+            </a:r>
+          </a:p>
+        </p:txBody>
+      </p:sp>
+      <p:sp>
+        <p:nvSpPr>
+          <p:cNvPr id="4" name="Date Placeholder 3"/>
+          <p:cNvSpPr>
+            <a:spLocks noGrp="1"/>
+          </p:cNvSpPr>
+          <p:nvPr>
+            <p:ph type="dt" sz="half" idx="10"/>
+          </p:nvPr>
+        </p:nvSpPr>
+        <p:spPr/>
+        <p:txBody>
+          <a:bodyPr/>
+          <a:lstStyle/>
+          <a:p>
+            <a:fld id="{5BCAD085-E8A6-8845-BD4E-CB4CCA059FC4}" type="datetimeFigureOut">
+              <a:rPr lang="en-US" smtClean="0"/>
+              <a:t>2/19/2026</a:t>
+            </a:fld>
+            <a:endParaRPr lang="en-US" dirty="0"/>
+          </a:p>
+        </p:txBody>
+      </p:sp>
+      <p:sp>
+        <p:nvSpPr>
+          <p:cNvPr id="5" name="Footer Placeholder 4"/>
+          <p:cNvSpPr>
+            <a:spLocks noGrp="1"/>
+          </p:cNvSpPr>
+          <p:nvPr>
+            <p:ph type="ftr" sz="quarter" idx="11"/>
+          </p:nvPr>
+        </p:nvSpPr>
+        <p:spPr/>
+        <p:txBody>
+          <a:bodyPr/>
+          <a:lstStyle/>
+          <a:p>
+            <a:endParaRPr lang="en-US"/>
+          </a:p>
+        </p:txBody>
+      </p:sp>
+      <p:sp>
+        <p:nvSpPr>
+          <p:cNvPr id="6" name="Slide Number Placeholder 5"/>
+          <p:cNvSpPr>
+            <a:spLocks noGrp="1"/>
+          </p:cNvSpPr>
+          <p:nvPr>
+            <p:ph type="sldNum" sz="quarter" idx="12"/>
+          </p:nvPr>
+        </p:nvSpPr>
+        <p:spPr/>
+        <p:txBody>
+          <a:bodyPr/>
+          <a:lstStyle/>
+          <a:p>
+            <a:fld id="{C1FF6DA9-008F-8B48-92A6-B652298478BF}" type="slidenum">
+              <a:rPr lang="en-US" smtClean="0"/>
+              <a:t>‹#›</a:t>
+            </a:fld>
+            <a:endParaRPr lang="en-US"/>
+          </a:p>
+        </p:txBody>
+      </p:sp>
+    </p:spTree>
+    <p:extLst>
+      <p:ext uri="{BB962C8B-B14F-4D97-AF65-F5344CB8AC3E}">
+        <p14:creationId xmlns:p14="http://schemas.microsoft.com/office/powerpoint/2010/main" val="2464015717"/>
+      </p:ext>
+    </p:extLst>
+  </p:cSld>
+  <p:clrMapOvr>
+    <a:masterClrMapping/>
+  </p:clrMapOvr>
+</p:sldLayout>
+</file>
+
+<file path=ppt/slideLayouts/slideLayout6.xml><?xml version="1.0" encoding="utf-8"?>
 <p:sldLayout xmlns:a="http://schemas.openxmlformats.org/drawingml/2006/main" xmlns:r="http://schemas.openxmlformats.org/officeDocument/2006/relationships" xmlns:p="http://schemas.openxmlformats.org/presentationml/2006/main" type="obj" preserve="1">
   <p:cSld name="7_Title and Content">
     <p:bg>
@@ -3178,8 +3950,8 @@
         </p:nvSpPr>
         <p:spPr>
           <a:xfrm>
-            <a:off x="457200" y="1600200"/>
-            <a:ext cx="8229600" cy="5089566"/>
+            <a:off x="609600" y="1600200"/>
+            <a:ext cx="10972800" cy="5089566"/>
           </a:xfrm>
         </p:spPr>
         <p:txBody>
@@ -3253,7 +4025,7 @@
 </p:sldLayout>
 </file>
 
-<file path=ppt/slideLayouts/slideLayout6.xml><?xml version="1.0" encoding="utf-8"?>
+<file path=ppt/slideLayouts/slideLayout7.xml><?xml version="1.0" encoding="utf-8"?>
 <p:sldLayout xmlns:a="http://schemas.openxmlformats.org/drawingml/2006/main" xmlns:r="http://schemas.openxmlformats.org/officeDocument/2006/relationships" xmlns:p="http://schemas.openxmlformats.org/presentationml/2006/main" type="obj" preserve="1">
   <p:cSld name="4_Title and Content">
     <p:bg>
@@ -3453,7 +4225,7 @@
 </p:sldLayout>
 </file>
 
-<file path=ppt/slideLayouts/slideLayout7.xml><?xml version="1.0" encoding="utf-8"?>
+<file path=ppt/slideLayouts/slideLayout8.xml><?xml version="1.0" encoding="utf-8"?>
 <p:sldLayout xmlns:a="http://schemas.openxmlformats.org/drawingml/2006/main" xmlns:r="http://schemas.openxmlformats.org/officeDocument/2006/relationships" xmlns:p="http://schemas.openxmlformats.org/presentationml/2006/main" type="secHead" preserve="1">
   <p:cSld name="Section Header">
     <p:spTree>
@@ -3482,8 +4254,8 @@
         </p:nvSpPr>
         <p:spPr>
           <a:xfrm>
-            <a:off x="722313" y="4406900"/>
-            <a:ext cx="7772400" cy="1362075"/>
+            <a:off x="963084" y="4406901"/>
+            <a:ext cx="10363200" cy="1362075"/>
           </a:xfrm>
         </p:spPr>
         <p:txBody>
@@ -3513,8 +4285,8 @@
         </p:nvSpPr>
         <p:spPr>
           <a:xfrm>
-            <a:off x="722313" y="2906713"/>
-            <a:ext cx="7772400" cy="1500187"/>
+            <a:off x="963084" y="2906713"/>
+            <a:ext cx="10363200" cy="1500187"/>
           </a:xfrm>
         </p:spPr>
         <p:txBody>
@@ -3698,7 +4470,7 @@
 </p:sldLayout>
 </file>
 
-<file path=ppt/slideLayouts/slideLayout8.xml><?xml version="1.0" encoding="utf-8"?>
+<file path=ppt/slideLayouts/slideLayout9.xml><?xml version="1.0" encoding="utf-8"?>
 <p:sldLayout xmlns:a="http://schemas.openxmlformats.org/drawingml/2006/main" xmlns:r="http://schemas.openxmlformats.org/officeDocument/2006/relationships" xmlns:p="http://schemas.openxmlformats.org/presentationml/2006/main" type="twoObj" preserve="1">
   <p:cSld name="Two Content">
     <p:spTree>
@@ -3749,8 +4521,8 @@
         </p:nvSpPr>
         <p:spPr>
           <a:xfrm>
-            <a:off x="457200" y="1600200"/>
-            <a:ext cx="4038600" cy="4525963"/>
+            <a:off x="609600" y="1600201"/>
+            <a:ext cx="5384800" cy="4525963"/>
           </a:xfrm>
         </p:spPr>
         <p:txBody>
@@ -3833,8 +4605,8 @@
         </p:nvSpPr>
         <p:spPr>
           <a:xfrm>
-            <a:off x="4648200" y="1600200"/>
-            <a:ext cx="4038600" cy="4525963"/>
+            <a:off x="6197600" y="1600201"/>
+            <a:ext cx="5384800" cy="4525963"/>
           </a:xfrm>
         </p:spPr>
         <p:txBody>
@@ -3974,425 +4746,6 @@
     <p:extLst>
       <p:ext uri="{BB962C8B-B14F-4D97-AF65-F5344CB8AC3E}">
         <p14:creationId xmlns:p14="http://schemas.microsoft.com/office/powerpoint/2010/main" val="2782244947"/>
-      </p:ext>
-    </p:extLst>
-  </p:cSld>
-  <p:clrMapOvr>
-    <a:masterClrMapping/>
-  </p:clrMapOvr>
-</p:sldLayout>
-</file>
-
-<file path=ppt/slideLayouts/slideLayout9.xml><?xml version="1.0" encoding="utf-8"?>
-<p:sldLayout xmlns:a="http://schemas.openxmlformats.org/drawingml/2006/main" xmlns:r="http://schemas.openxmlformats.org/officeDocument/2006/relationships" xmlns:p="http://schemas.openxmlformats.org/presentationml/2006/main" type="twoTxTwoObj" preserve="1">
-  <p:cSld name="Comparison">
-    <p:spTree>
-      <p:nvGrpSpPr>
-        <p:cNvPr id="1" name=""/>
-        <p:cNvGrpSpPr/>
-        <p:nvPr/>
-      </p:nvGrpSpPr>
-      <p:grpSpPr>
-        <a:xfrm>
-          <a:off x="0" y="0"/>
-          <a:ext cx="0" cy="0"/>
-          <a:chOff x="0" y="0"/>
-          <a:chExt cx="0" cy="0"/>
-        </a:xfrm>
-      </p:grpSpPr>
-      <p:sp>
-        <p:nvSpPr>
-          <p:cNvPr id="2" name="Title 1"/>
-          <p:cNvSpPr>
-            <a:spLocks noGrp="1"/>
-          </p:cNvSpPr>
-          <p:nvPr>
-            <p:ph type="title"/>
-          </p:nvPr>
-        </p:nvSpPr>
-        <p:spPr/>
-        <p:txBody>
-          <a:bodyPr/>
-          <a:lstStyle>
-            <a:lvl1pPr>
-              <a:defRPr/>
-            </a:lvl1pPr>
-          </a:lstStyle>
-          <a:p>
-            <a:r>
-              <a:rPr lang="en-US"/>
-              <a:t>Click to edit Master title style</a:t>
-            </a:r>
-          </a:p>
-        </p:txBody>
-      </p:sp>
-      <p:sp>
-        <p:nvSpPr>
-          <p:cNvPr id="3" name="Text Placeholder 2"/>
-          <p:cNvSpPr>
-            <a:spLocks noGrp="1"/>
-          </p:cNvSpPr>
-          <p:nvPr>
-            <p:ph type="body" idx="1"/>
-          </p:nvPr>
-        </p:nvSpPr>
-        <p:spPr>
-          <a:xfrm>
-            <a:off x="457200" y="1535113"/>
-            <a:ext cx="4040188" cy="639762"/>
-          </a:xfrm>
-        </p:spPr>
-        <p:txBody>
-          <a:bodyPr anchor="b"/>
-          <a:lstStyle>
-            <a:lvl1pPr marL="0" indent="0">
-              <a:buNone/>
-              <a:defRPr sz="2400" b="1"/>
-            </a:lvl1pPr>
-            <a:lvl2pPr marL="457200" indent="0">
-              <a:buNone/>
-              <a:defRPr sz="2000" b="1"/>
-            </a:lvl2pPr>
-            <a:lvl3pPr marL="914400" indent="0">
-              <a:buNone/>
-              <a:defRPr sz="1800" b="1"/>
-            </a:lvl3pPr>
-            <a:lvl4pPr marL="1371600" indent="0">
-              <a:buNone/>
-              <a:defRPr sz="1600" b="1"/>
-            </a:lvl4pPr>
-            <a:lvl5pPr marL="1828800" indent="0">
-              <a:buNone/>
-              <a:defRPr sz="1600" b="1"/>
-            </a:lvl5pPr>
-            <a:lvl6pPr marL="2286000" indent="0">
-              <a:buNone/>
-              <a:defRPr sz="1600" b="1"/>
-            </a:lvl6pPr>
-            <a:lvl7pPr marL="2743200" indent="0">
-              <a:buNone/>
-              <a:defRPr sz="1600" b="1"/>
-            </a:lvl7pPr>
-            <a:lvl8pPr marL="3200400" indent="0">
-              <a:buNone/>
-              <a:defRPr sz="1600" b="1"/>
-            </a:lvl8pPr>
-            <a:lvl9pPr marL="3657600" indent="0">
-              <a:buNone/>
-              <a:defRPr sz="1600" b="1"/>
-            </a:lvl9pPr>
-          </a:lstStyle>
-          <a:p>
-            <a:pPr lvl="0"/>
-            <a:r>
-              <a:rPr lang="en-US"/>
-              <a:t>Click to edit Master text styles</a:t>
-            </a:r>
-          </a:p>
-        </p:txBody>
-      </p:sp>
-      <p:sp>
-        <p:nvSpPr>
-          <p:cNvPr id="4" name="Content Placeholder 3"/>
-          <p:cNvSpPr>
-            <a:spLocks noGrp="1"/>
-          </p:cNvSpPr>
-          <p:nvPr>
-            <p:ph sz="half" idx="2"/>
-          </p:nvPr>
-        </p:nvSpPr>
-        <p:spPr>
-          <a:xfrm>
-            <a:off x="457200" y="2174875"/>
-            <a:ext cx="4040188" cy="3951288"/>
-          </a:xfrm>
-        </p:spPr>
-        <p:txBody>
-          <a:bodyPr/>
-          <a:lstStyle>
-            <a:lvl1pPr>
-              <a:defRPr sz="2400"/>
-            </a:lvl1pPr>
-            <a:lvl2pPr>
-              <a:defRPr sz="2000"/>
-            </a:lvl2pPr>
-            <a:lvl3pPr>
-              <a:defRPr sz="1800"/>
-            </a:lvl3pPr>
-            <a:lvl4pPr>
-              <a:defRPr sz="1600"/>
-            </a:lvl4pPr>
-            <a:lvl5pPr>
-              <a:defRPr sz="1600"/>
-            </a:lvl5pPr>
-            <a:lvl6pPr>
-              <a:defRPr sz="1600"/>
-            </a:lvl6pPr>
-            <a:lvl7pPr>
-              <a:defRPr sz="1600"/>
-            </a:lvl7pPr>
-            <a:lvl8pPr>
-              <a:defRPr sz="1600"/>
-            </a:lvl8pPr>
-            <a:lvl9pPr>
-              <a:defRPr sz="1600"/>
-            </a:lvl9pPr>
-          </a:lstStyle>
-          <a:p>
-            <a:pPr lvl="0"/>
-            <a:r>
-              <a:rPr lang="en-US"/>
-              <a:t>Click to edit Master text styles</a:t>
-            </a:r>
-          </a:p>
-          <a:p>
-            <a:pPr lvl="1"/>
-            <a:r>
-              <a:rPr lang="en-US"/>
-              <a:t>Second level</a:t>
-            </a:r>
-          </a:p>
-          <a:p>
-            <a:pPr lvl="2"/>
-            <a:r>
-              <a:rPr lang="en-US"/>
-              <a:t>Third level</a:t>
-            </a:r>
-          </a:p>
-          <a:p>
-            <a:pPr lvl="3"/>
-            <a:r>
-              <a:rPr lang="en-US"/>
-              <a:t>Fourth level</a:t>
-            </a:r>
-          </a:p>
-          <a:p>
-            <a:pPr lvl="4"/>
-            <a:r>
-              <a:rPr lang="en-US"/>
-              <a:t>Fifth level</a:t>
-            </a:r>
-          </a:p>
-        </p:txBody>
-      </p:sp>
-      <p:sp>
-        <p:nvSpPr>
-          <p:cNvPr id="5" name="Text Placeholder 4"/>
-          <p:cNvSpPr>
-            <a:spLocks noGrp="1"/>
-          </p:cNvSpPr>
-          <p:nvPr>
-            <p:ph type="body" sz="quarter" idx="3"/>
-          </p:nvPr>
-        </p:nvSpPr>
-        <p:spPr>
-          <a:xfrm>
-            <a:off x="4645025" y="1535113"/>
-            <a:ext cx="4041775" cy="639762"/>
-          </a:xfrm>
-        </p:spPr>
-        <p:txBody>
-          <a:bodyPr anchor="b"/>
-          <a:lstStyle>
-            <a:lvl1pPr marL="0" indent="0">
-              <a:buNone/>
-              <a:defRPr sz="2400" b="1"/>
-            </a:lvl1pPr>
-            <a:lvl2pPr marL="457200" indent="0">
-              <a:buNone/>
-              <a:defRPr sz="2000" b="1"/>
-            </a:lvl2pPr>
-            <a:lvl3pPr marL="914400" indent="0">
-              <a:buNone/>
-              <a:defRPr sz="1800" b="1"/>
-            </a:lvl3pPr>
-            <a:lvl4pPr marL="1371600" indent="0">
-              <a:buNone/>
-              <a:defRPr sz="1600" b="1"/>
-            </a:lvl4pPr>
-            <a:lvl5pPr marL="1828800" indent="0">
-              <a:buNone/>
-              <a:defRPr sz="1600" b="1"/>
-            </a:lvl5pPr>
-            <a:lvl6pPr marL="2286000" indent="0">
-              <a:buNone/>
-              <a:defRPr sz="1600" b="1"/>
-            </a:lvl6pPr>
-            <a:lvl7pPr marL="2743200" indent="0">
-              <a:buNone/>
-              <a:defRPr sz="1600" b="1"/>
-            </a:lvl7pPr>
-            <a:lvl8pPr marL="3200400" indent="0">
-              <a:buNone/>
-              <a:defRPr sz="1600" b="1"/>
-            </a:lvl8pPr>
-            <a:lvl9pPr marL="3657600" indent="0">
-              <a:buNone/>
-              <a:defRPr sz="1600" b="1"/>
-            </a:lvl9pPr>
-          </a:lstStyle>
-          <a:p>
-            <a:pPr lvl="0"/>
-            <a:r>
-              <a:rPr lang="en-US"/>
-              <a:t>Click to edit Master text styles</a:t>
-            </a:r>
-          </a:p>
-        </p:txBody>
-      </p:sp>
-      <p:sp>
-        <p:nvSpPr>
-          <p:cNvPr id="6" name="Content Placeholder 5"/>
-          <p:cNvSpPr>
-            <a:spLocks noGrp="1"/>
-          </p:cNvSpPr>
-          <p:nvPr>
-            <p:ph sz="quarter" idx="4"/>
-          </p:nvPr>
-        </p:nvSpPr>
-        <p:spPr>
-          <a:xfrm>
-            <a:off x="4645025" y="2174875"/>
-            <a:ext cx="4041775" cy="3951288"/>
-          </a:xfrm>
-        </p:spPr>
-        <p:txBody>
-          <a:bodyPr/>
-          <a:lstStyle>
-            <a:lvl1pPr>
-              <a:defRPr sz="2400"/>
-            </a:lvl1pPr>
-            <a:lvl2pPr>
-              <a:defRPr sz="2000"/>
-            </a:lvl2pPr>
-            <a:lvl3pPr>
-              <a:defRPr sz="1800"/>
-            </a:lvl3pPr>
-            <a:lvl4pPr>
-              <a:defRPr sz="1600"/>
-            </a:lvl4pPr>
-            <a:lvl5pPr>
-              <a:defRPr sz="1600"/>
-            </a:lvl5pPr>
-            <a:lvl6pPr>
-              <a:defRPr sz="1600"/>
-            </a:lvl6pPr>
-            <a:lvl7pPr>
-              <a:defRPr sz="1600"/>
-            </a:lvl7pPr>
-            <a:lvl8pPr>
-              <a:defRPr sz="1600"/>
-            </a:lvl8pPr>
-            <a:lvl9pPr>
-              <a:defRPr sz="1600"/>
-            </a:lvl9pPr>
-          </a:lstStyle>
-          <a:p>
-            <a:pPr lvl="0"/>
-            <a:r>
-              <a:rPr lang="en-US"/>
-              <a:t>Click to edit Master text styles</a:t>
-            </a:r>
-          </a:p>
-          <a:p>
-            <a:pPr lvl="1"/>
-            <a:r>
-              <a:rPr lang="en-US"/>
-              <a:t>Second level</a:t>
-            </a:r>
-          </a:p>
-          <a:p>
-            <a:pPr lvl="2"/>
-            <a:r>
-              <a:rPr lang="en-US"/>
-              <a:t>Third level</a:t>
-            </a:r>
-          </a:p>
-          <a:p>
-            <a:pPr lvl="3"/>
-            <a:r>
-              <a:rPr lang="en-US"/>
-              <a:t>Fourth level</a:t>
-            </a:r>
-          </a:p>
-          <a:p>
-            <a:pPr lvl="4"/>
-            <a:r>
-              <a:rPr lang="en-US"/>
-              <a:t>Fifth level</a:t>
-            </a:r>
-          </a:p>
-        </p:txBody>
-      </p:sp>
-      <p:sp>
-        <p:nvSpPr>
-          <p:cNvPr id="7" name="Date Placeholder 6"/>
-          <p:cNvSpPr>
-            <a:spLocks noGrp="1"/>
-          </p:cNvSpPr>
-          <p:nvPr>
-            <p:ph type="dt" sz="half" idx="10"/>
-          </p:nvPr>
-        </p:nvSpPr>
-        <p:spPr/>
-        <p:txBody>
-          <a:bodyPr/>
-          <a:lstStyle/>
-          <a:p>
-            <a:fld id="{5BCAD085-E8A6-8845-BD4E-CB4CCA059FC4}" type="datetimeFigureOut">
-              <a:rPr lang="en-US" smtClean="0"/>
-              <a:t>2/19/2026</a:t>
-            </a:fld>
-            <a:endParaRPr lang="en-US"/>
-          </a:p>
-        </p:txBody>
-      </p:sp>
-      <p:sp>
-        <p:nvSpPr>
-          <p:cNvPr id="8" name="Footer Placeholder 7"/>
-          <p:cNvSpPr>
-            <a:spLocks noGrp="1"/>
-          </p:cNvSpPr>
-          <p:nvPr>
-            <p:ph type="ftr" sz="quarter" idx="11"/>
-          </p:nvPr>
-        </p:nvSpPr>
-        <p:spPr/>
-        <p:txBody>
-          <a:bodyPr/>
-          <a:lstStyle/>
-          <a:p>
-            <a:endParaRPr lang="en-US"/>
-          </a:p>
-        </p:txBody>
-      </p:sp>
-      <p:sp>
-        <p:nvSpPr>
-          <p:cNvPr id="9" name="Slide Number Placeholder 8"/>
-          <p:cNvSpPr>
-            <a:spLocks noGrp="1"/>
-          </p:cNvSpPr>
-          <p:nvPr>
-            <p:ph type="sldNum" sz="quarter" idx="12"/>
-          </p:nvPr>
-        </p:nvSpPr>
-        <p:spPr/>
-        <p:txBody>
-          <a:bodyPr/>
-          <a:lstStyle/>
-          <a:p>
-            <a:fld id="{C1FF6DA9-008F-8B48-92A6-B652298478BF}" type="slidenum">
-              <a:rPr lang="en-US" smtClean="0"/>
-              <a:t>‹#›</a:t>
-            </a:fld>
-            <a:endParaRPr lang="en-US"/>
-          </a:p>
-        </p:txBody>
-      </p:sp>
-    </p:spTree>
-    <p:extLst>
-      <p:ext uri="{BB962C8B-B14F-4D97-AF65-F5344CB8AC3E}">
-        <p14:creationId xmlns:p14="http://schemas.microsoft.com/office/powerpoint/2010/main" val="990158736"/>
       </p:ext>
     </p:extLst>
   </p:cSld>
@@ -4436,8 +4789,8 @@
         </p:nvSpPr>
         <p:spPr>
           <a:xfrm>
-            <a:off x="457200" y="274638"/>
-            <a:ext cx="8229600" cy="1143000"/>
+            <a:off x="609600" y="274638"/>
+            <a:ext cx="10972800" cy="1143000"/>
           </a:xfrm>
           <a:prstGeom prst="rect">
             <a:avLst/>
@@ -4468,8 +4821,8 @@
         </p:nvSpPr>
         <p:spPr>
           <a:xfrm>
-            <a:off x="457200" y="1600200"/>
-            <a:ext cx="8229600" cy="4525963"/>
+            <a:off x="609600" y="1600201"/>
+            <a:ext cx="10972800" cy="4525963"/>
           </a:xfrm>
           <a:prstGeom prst="rect">
             <a:avLst/>
@@ -4529,8 +4882,8 @@
         </p:nvSpPr>
         <p:spPr>
           <a:xfrm>
-            <a:off x="457200" y="6356350"/>
-            <a:ext cx="2133600" cy="365125"/>
+            <a:off x="609600" y="6356351"/>
+            <a:ext cx="2844800" cy="365125"/>
           </a:xfrm>
           <a:prstGeom prst="rect">
             <a:avLst/>
@@ -4570,8 +4923,8 @@
         </p:nvSpPr>
         <p:spPr>
           <a:xfrm>
-            <a:off x="3124200" y="6356350"/>
-            <a:ext cx="2895600" cy="365125"/>
+            <a:off x="4165600" y="6356351"/>
+            <a:ext cx="3860800" cy="365125"/>
           </a:xfrm>
           <a:prstGeom prst="rect">
             <a:avLst/>
@@ -4607,8 +4960,8 @@
         </p:nvSpPr>
         <p:spPr>
           <a:xfrm>
-            <a:off x="6553200" y="6356350"/>
-            <a:ext cx="2133600" cy="365125"/>
+            <a:off x="8737600" y="6356351"/>
+            <a:ext cx="2844800" cy="365125"/>
           </a:xfrm>
           <a:prstGeom prst="rect">
             <a:avLst/>
@@ -4648,18 +5001,19 @@
     <p:sldLayoutId id="2147483665" r:id="rId1"/>
     <p:sldLayoutId id="2147483660" r:id="rId2"/>
     <p:sldLayoutId id="2147483669" r:id="rId3"/>
-    <p:sldLayoutId id="2147483670" r:id="rId4"/>
-    <p:sldLayoutId id="2147483668" r:id="rId5"/>
-    <p:sldLayoutId id="2147483663" r:id="rId6"/>
-    <p:sldLayoutId id="2147483651" r:id="rId7"/>
-    <p:sldLayoutId id="2147483652" r:id="rId8"/>
-    <p:sldLayoutId id="2147483653" r:id="rId9"/>
-    <p:sldLayoutId id="2147483654" r:id="rId10"/>
-    <p:sldLayoutId id="2147483655" r:id="rId11"/>
-    <p:sldLayoutId id="2147483656" r:id="rId12"/>
-    <p:sldLayoutId id="2147483657" r:id="rId13"/>
-    <p:sldLayoutId id="2147483658" r:id="rId14"/>
-    <p:sldLayoutId id="2147483659" r:id="rId15"/>
+    <p:sldLayoutId id="2147483671" r:id="rId4"/>
+    <p:sldLayoutId id="2147483672" r:id="rId5"/>
+    <p:sldLayoutId id="2147483668" r:id="rId6"/>
+    <p:sldLayoutId id="2147483663" r:id="rId7"/>
+    <p:sldLayoutId id="2147483651" r:id="rId8"/>
+    <p:sldLayoutId id="2147483652" r:id="rId9"/>
+    <p:sldLayoutId id="2147483653" r:id="rId10"/>
+    <p:sldLayoutId id="2147483654" r:id="rId11"/>
+    <p:sldLayoutId id="2147483655" r:id="rId12"/>
+    <p:sldLayoutId id="2147483656" r:id="rId13"/>
+    <p:sldLayoutId id="2147483657" r:id="rId14"/>
+    <p:sldLayoutId id="2147483658" r:id="rId15"/>
+    <p:sldLayoutId id="2147483659" r:id="rId16"/>
   </p:sldLayoutIdLst>
   <p:txStyles>
     <p:titleStyle>

</xml_diff>